<commit_message>
Update diagram into downloaded presentations
</commit_message>
<xml_diff>
--- a/TypeScript Workshop 10_17_2020.pptx
+++ b/TypeScript Workshop 10_17_2020.pptx
@@ -48,23 +48,24 @@
     <p:sldId id="293" r:id="rId42"/>
     <p:sldId id="294" r:id="rId43"/>
     <p:sldId id="295" r:id="rId44"/>
+    <p:sldId id="296" r:id="rId45"/>
   </p:sldIdLst>
   <p:sldSz cy="5143500" cx="9144000"/>
   <p:notesSz cx="6858000" cy="9144000"/>
   <p:embeddedFontLst>
     <p:embeddedFont>
       <p:font typeface="Nunito Sans SemiBold"/>
-      <p:regular r:id="rId45"/>
-      <p:bold r:id="rId46"/>
-      <p:italic r:id="rId47"/>
-      <p:boldItalic r:id="rId48"/>
+      <p:regular r:id="rId46"/>
+      <p:bold r:id="rId47"/>
+      <p:italic r:id="rId48"/>
+      <p:boldItalic r:id="rId49"/>
     </p:embeddedFont>
     <p:embeddedFont>
       <p:font typeface="Nunito Sans"/>
-      <p:regular r:id="rId49"/>
-      <p:bold r:id="rId50"/>
-      <p:italic r:id="rId51"/>
-      <p:boldItalic r:id="rId52"/>
+      <p:regular r:id="rId50"/>
+      <p:bold r:id="rId51"/>
+      <p:italic r:id="rId52"/>
+      <p:boldItalic r:id="rId53"/>
     </p:embeddedFont>
   </p:embeddedFontLst>
   <p:defaultTextStyle>
@@ -1041,7 +1042,7 @@
       </p:grpSpPr>
       <p:sp>
         <p:nvSpPr>
-          <p:cNvPr id="149" name="Google Shape;149;ga1c011d19f_0_84:notes"/>
+          <p:cNvPr id="149" name="Google Shape;149;ga1c011d19f_0_192:notes"/>
           <p:cNvSpPr/>
           <p:nvPr>
             <p:ph idx="2" type="sldImg"/>
@@ -1076,7 +1077,7 @@
       </p:sp>
       <p:sp>
         <p:nvSpPr>
-          <p:cNvPr id="150" name="Google Shape;150;ga1c011d19f_0_84:notes"/>
+          <p:cNvPr id="150" name="Google Shape;150;ga1c011d19f_0_192:notes"/>
           <p:cNvSpPr txBox="1"/>
           <p:nvPr>
             <p:ph idx="1" type="body"/>
@@ -1107,8 +1108,7 @@
               <a:buNone/>
             </a:pPr>
             <a:r>
-              <a:rPr lang="en"/>
-              <a:t>Follow along through TypeScript syntax and types as outlined in Workshop Template.</a:t>
+              <a:t/>
             </a:r>
             <a:endParaRPr/>
           </a:p>
@@ -1127,7 +1127,7 @@
   <p:cSld>
     <p:spTree>
       <p:nvGrpSpPr>
-        <p:cNvPr id="153" name="Shape 153"/>
+        <p:cNvPr id="163" name="Shape 163"/>
         <p:cNvGrpSpPr/>
         <p:nvPr/>
       </p:nvGrpSpPr>
@@ -1141,7 +1141,7 @@
       </p:grpSpPr>
       <p:sp>
         <p:nvSpPr>
-          <p:cNvPr id="154" name="Google Shape;154;ga1c011d19f_0_34:notes"/>
+          <p:cNvPr id="164" name="Google Shape;164;ga1c011d19f_0_84:notes"/>
           <p:cNvSpPr/>
           <p:nvPr>
             <p:ph idx="2" type="sldImg"/>
@@ -1176,7 +1176,7 @@
       </p:sp>
       <p:sp>
         <p:nvSpPr>
-          <p:cNvPr id="155" name="Google Shape;155;ga1c011d19f_0_34:notes"/>
+          <p:cNvPr id="165" name="Google Shape;165;ga1c011d19f_0_84:notes"/>
           <p:cNvSpPr txBox="1"/>
           <p:nvPr>
             <p:ph idx="1" type="body"/>
@@ -1207,7 +1207,24 @@
               <a:buNone/>
             </a:pPr>
             <a:r>
-              <a:t/>
+              <a:rPr lang="en"/>
+              <a:t>Follow along through TypeScript syntax and types as outlined in Workshop Template.</a:t>
+            </a:r>
+            <a:endParaRPr/>
+          </a:p>
+          <a:p>
+            <a:pPr indent="0" lvl="0" marL="0" rtl="0" algn="l">
+              <a:spcBef>
+                <a:spcPts val="0"/>
+              </a:spcBef>
+              <a:spcAft>
+                <a:spcPts val="0"/>
+              </a:spcAft>
+              <a:buNone/>
+            </a:pPr>
+            <a:r>
+              <a:rPr lang="en"/>
+              <a:t>https://create-react-app.dev/docs/getting-started/</a:t>
             </a:r>
             <a:endParaRPr/>
           </a:p>
@@ -1226,7 +1243,7 @@
   <p:cSld>
     <p:spTree>
       <p:nvGrpSpPr>
-        <p:cNvPr id="159" name="Shape 159"/>
+        <p:cNvPr id="168" name="Shape 168"/>
         <p:cNvGrpSpPr/>
         <p:nvPr/>
       </p:nvGrpSpPr>
@@ -1240,7 +1257,7 @@
       </p:grpSpPr>
       <p:sp>
         <p:nvSpPr>
-          <p:cNvPr id="160" name="Google Shape;160;ga1c011d19f_0_8:notes"/>
+          <p:cNvPr id="169" name="Google Shape;169;ga1c011d19f_0_34:notes"/>
           <p:cNvSpPr/>
           <p:nvPr>
             <p:ph idx="2" type="sldImg"/>
@@ -1275,7 +1292,7 @@
       </p:sp>
       <p:sp>
         <p:nvSpPr>
-          <p:cNvPr id="161" name="Google Shape;161;ga1c011d19f_0_8:notes"/>
+          <p:cNvPr id="170" name="Google Shape;170;ga1c011d19f_0_34:notes"/>
           <p:cNvSpPr txBox="1"/>
           <p:nvPr>
             <p:ph idx="1" type="body"/>
@@ -1325,7 +1342,7 @@
   <p:cSld>
     <p:spTree>
       <p:nvGrpSpPr>
-        <p:cNvPr id="164" name="Shape 164"/>
+        <p:cNvPr id="174" name="Shape 174"/>
         <p:cNvGrpSpPr/>
         <p:nvPr/>
       </p:nvGrpSpPr>
@@ -1339,7 +1356,7 @@
       </p:grpSpPr>
       <p:sp>
         <p:nvSpPr>
-          <p:cNvPr id="165" name="Google Shape;165;ga1c011d19f_0_38:notes"/>
+          <p:cNvPr id="175" name="Google Shape;175;ga1c011d19f_0_8:notes"/>
           <p:cNvSpPr/>
           <p:nvPr>
             <p:ph idx="2" type="sldImg"/>
@@ -1374,7 +1391,7 @@
       </p:sp>
       <p:sp>
         <p:nvSpPr>
-          <p:cNvPr id="166" name="Google Shape;166;ga1c011d19f_0_38:notes"/>
+          <p:cNvPr id="176" name="Google Shape;176;ga1c011d19f_0_8:notes"/>
           <p:cNvSpPr txBox="1"/>
           <p:nvPr>
             <p:ph idx="1" type="body"/>
@@ -1424,7 +1441,7 @@
   <p:cSld>
     <p:spTree>
       <p:nvGrpSpPr>
-        <p:cNvPr id="169" name="Shape 169"/>
+        <p:cNvPr id="179" name="Shape 179"/>
         <p:cNvGrpSpPr/>
         <p:nvPr/>
       </p:nvGrpSpPr>
@@ -1438,7 +1455,7 @@
       </p:grpSpPr>
       <p:sp>
         <p:nvSpPr>
-          <p:cNvPr id="170" name="Google Shape;170;ga1c011d19f_0_103:notes"/>
+          <p:cNvPr id="180" name="Google Shape;180;ga1c011d19f_0_38:notes"/>
           <p:cNvSpPr/>
           <p:nvPr>
             <p:ph idx="2" type="sldImg"/>
@@ -1473,7 +1490,7 @@
       </p:sp>
       <p:sp>
         <p:nvSpPr>
-          <p:cNvPr id="171" name="Google Shape;171;ga1c011d19f_0_103:notes"/>
+          <p:cNvPr id="181" name="Google Shape;181;ga1c011d19f_0_38:notes"/>
           <p:cNvSpPr txBox="1"/>
           <p:nvPr>
             <p:ph idx="1" type="body"/>
@@ -1523,7 +1540,7 @@
   <p:cSld>
     <p:spTree>
       <p:nvGrpSpPr>
-        <p:cNvPr id="174" name="Shape 174"/>
+        <p:cNvPr id="184" name="Shape 184"/>
         <p:cNvGrpSpPr/>
         <p:nvPr/>
       </p:nvGrpSpPr>
@@ -1537,7 +1554,7 @@
       </p:grpSpPr>
       <p:sp>
         <p:nvSpPr>
-          <p:cNvPr id="175" name="Google Shape;175;ga1c011d19f_0_50:notes"/>
+          <p:cNvPr id="185" name="Google Shape;185;ga1c011d19f_0_103:notes"/>
           <p:cNvSpPr/>
           <p:nvPr>
             <p:ph idx="2" type="sldImg"/>
@@ -1572,7 +1589,7 @@
       </p:sp>
       <p:sp>
         <p:nvSpPr>
-          <p:cNvPr id="176" name="Google Shape;176;ga1c011d19f_0_50:notes"/>
+          <p:cNvPr id="186" name="Google Shape;186;ga1c011d19f_0_103:notes"/>
           <p:cNvSpPr txBox="1"/>
           <p:nvPr>
             <p:ph idx="1" type="body"/>
@@ -1603,8 +1620,7 @@
               <a:buNone/>
             </a:pPr>
             <a:r>
-              <a:rPr lang="en"/>
-              <a:t>Files for components should be created. Basic layout set up.</a:t>
+              <a:t/>
             </a:r>
             <a:endParaRPr/>
           </a:p>
@@ -1623,7 +1639,7 @@
   <p:cSld>
     <p:spTree>
       <p:nvGrpSpPr>
-        <p:cNvPr id="179" name="Shape 179"/>
+        <p:cNvPr id="189" name="Shape 189"/>
         <p:cNvGrpSpPr/>
         <p:nvPr/>
       </p:nvGrpSpPr>
@@ -1637,7 +1653,7 @@
       </p:grpSpPr>
       <p:sp>
         <p:nvSpPr>
-          <p:cNvPr id="180" name="Google Shape;180;ga1c011d19f_0_117:notes"/>
+          <p:cNvPr id="190" name="Google Shape;190;ga1c011d19f_0_50:notes"/>
           <p:cNvSpPr/>
           <p:nvPr>
             <p:ph idx="2" type="sldImg"/>
@@ -1672,7 +1688,7 @@
       </p:sp>
       <p:sp>
         <p:nvSpPr>
-          <p:cNvPr id="181" name="Google Shape;181;ga1c011d19f_0_117:notes"/>
+          <p:cNvPr id="191" name="Google Shape;191;ga1c011d19f_0_50:notes"/>
           <p:cNvSpPr txBox="1"/>
           <p:nvPr>
             <p:ph idx="1" type="body"/>
@@ -1703,7 +1719,8 @@
               <a:buNone/>
             </a:pPr>
             <a:r>
-              <a:t/>
+              <a:rPr lang="en"/>
+              <a:t>Files for components should be created. Basic layout set up.</a:t>
             </a:r>
             <a:endParaRPr/>
           </a:p>
@@ -1722,7 +1739,7 @@
   <p:cSld>
     <p:spTree>
       <p:nvGrpSpPr>
-        <p:cNvPr id="184" name="Shape 184"/>
+        <p:cNvPr id="194" name="Shape 194"/>
         <p:cNvGrpSpPr/>
         <p:nvPr/>
       </p:nvGrpSpPr>
@@ -1736,7 +1753,7 @@
       </p:grpSpPr>
       <p:sp>
         <p:nvSpPr>
-          <p:cNvPr id="185" name="Google Shape;185;ga1c011d19f_0_121:notes"/>
+          <p:cNvPr id="195" name="Google Shape;195;ga1c011d19f_0_117:notes"/>
           <p:cNvSpPr/>
           <p:nvPr>
             <p:ph idx="2" type="sldImg"/>
@@ -1771,7 +1788,7 @@
       </p:sp>
       <p:sp>
         <p:nvSpPr>
-          <p:cNvPr id="186" name="Google Shape;186;ga1c011d19f_0_121:notes"/>
+          <p:cNvPr id="196" name="Google Shape;196;ga1c011d19f_0_117:notes"/>
           <p:cNvSpPr txBox="1"/>
           <p:nvPr>
             <p:ph idx="1" type="body"/>
@@ -1920,7 +1937,7 @@
   <p:cSld>
     <p:spTree>
       <p:nvGrpSpPr>
-        <p:cNvPr id="189" name="Shape 189"/>
+        <p:cNvPr id="199" name="Shape 199"/>
         <p:cNvGrpSpPr/>
         <p:nvPr/>
       </p:nvGrpSpPr>
@@ -1934,7 +1951,7 @@
       </p:grpSpPr>
       <p:sp>
         <p:nvSpPr>
-          <p:cNvPr id="190" name="Google Shape;190;ga1c011d19f_0_127:notes"/>
+          <p:cNvPr id="200" name="Google Shape;200;ga1c011d19f_0_121:notes"/>
           <p:cNvSpPr/>
           <p:nvPr>
             <p:ph idx="2" type="sldImg"/>
@@ -1969,7 +1986,7 @@
       </p:sp>
       <p:sp>
         <p:nvSpPr>
-          <p:cNvPr id="191" name="Google Shape;191;ga1c011d19f_0_127:notes"/>
+          <p:cNvPr id="201" name="Google Shape;201;ga1c011d19f_0_121:notes"/>
           <p:cNvSpPr txBox="1"/>
           <p:nvPr>
             <p:ph idx="1" type="body"/>
@@ -2019,7 +2036,7 @@
   <p:cSld>
     <p:spTree>
       <p:nvGrpSpPr>
-        <p:cNvPr id="194" name="Shape 194"/>
+        <p:cNvPr id="204" name="Shape 204"/>
         <p:cNvGrpSpPr/>
         <p:nvPr/>
       </p:nvGrpSpPr>
@@ -2033,7 +2050,7 @@
       </p:grpSpPr>
       <p:sp>
         <p:nvSpPr>
-          <p:cNvPr id="195" name="Google Shape;195;ga1c011d19f_0_42:notes"/>
+          <p:cNvPr id="205" name="Google Shape;205;ga1c011d19f_0_127:notes"/>
           <p:cNvSpPr/>
           <p:nvPr>
             <p:ph idx="2" type="sldImg"/>
@@ -2068,7 +2085,7 @@
       </p:sp>
       <p:sp>
         <p:nvSpPr>
-          <p:cNvPr id="196" name="Google Shape;196;ga1c011d19f_0_42:notes"/>
+          <p:cNvPr id="206" name="Google Shape;206;ga1c011d19f_0_127:notes"/>
           <p:cNvSpPr txBox="1"/>
           <p:nvPr>
             <p:ph idx="1" type="body"/>
@@ -2118,7 +2135,7 @@
   <p:cSld>
     <p:spTree>
       <p:nvGrpSpPr>
-        <p:cNvPr id="200" name="Shape 200"/>
+        <p:cNvPr id="209" name="Shape 209"/>
         <p:cNvGrpSpPr/>
         <p:nvPr/>
       </p:nvGrpSpPr>
@@ -2132,7 +2149,7 @@
       </p:grpSpPr>
       <p:sp>
         <p:nvSpPr>
-          <p:cNvPr id="201" name="Google Shape;201;ga1c011d19f_0_54:notes"/>
+          <p:cNvPr id="210" name="Google Shape;210;ga1c011d19f_0_42:notes"/>
           <p:cNvSpPr/>
           <p:nvPr>
             <p:ph idx="2" type="sldImg"/>
@@ -2167,7 +2184,7 @@
       </p:sp>
       <p:sp>
         <p:nvSpPr>
-          <p:cNvPr id="202" name="Google Shape;202;ga1c011d19f_0_54:notes"/>
+          <p:cNvPr id="211" name="Google Shape;211;ga1c011d19f_0_42:notes"/>
           <p:cNvSpPr txBox="1"/>
           <p:nvPr>
             <p:ph idx="1" type="body"/>
@@ -2217,7 +2234,7 @@
   <p:cSld>
     <p:spTree>
       <p:nvGrpSpPr>
-        <p:cNvPr id="205" name="Shape 205"/>
+        <p:cNvPr id="215" name="Shape 215"/>
         <p:cNvGrpSpPr/>
         <p:nvPr/>
       </p:nvGrpSpPr>
@@ -2231,7 +2248,7 @@
       </p:grpSpPr>
       <p:sp>
         <p:nvSpPr>
-          <p:cNvPr id="206" name="Google Shape;206;ga1c011d19f_0_58:notes"/>
+          <p:cNvPr id="216" name="Google Shape;216;ga1c011d19f_0_54:notes"/>
           <p:cNvSpPr/>
           <p:nvPr>
             <p:ph idx="2" type="sldImg"/>
@@ -2266,7 +2283,7 @@
       </p:sp>
       <p:sp>
         <p:nvSpPr>
-          <p:cNvPr id="207" name="Google Shape;207;ga1c011d19f_0_58:notes"/>
+          <p:cNvPr id="217" name="Google Shape;217;ga1c011d19f_0_54:notes"/>
           <p:cNvSpPr txBox="1"/>
           <p:nvPr>
             <p:ph idx="1" type="body"/>
@@ -2316,7 +2333,7 @@
   <p:cSld>
     <p:spTree>
       <p:nvGrpSpPr>
-        <p:cNvPr id="210" name="Shape 210"/>
+        <p:cNvPr id="220" name="Shape 220"/>
         <p:cNvGrpSpPr/>
         <p:nvPr/>
       </p:nvGrpSpPr>
@@ -2330,7 +2347,7 @@
       </p:grpSpPr>
       <p:sp>
         <p:nvSpPr>
-          <p:cNvPr id="211" name="Google Shape;211;ga1c011d19f_0_62:notes"/>
+          <p:cNvPr id="221" name="Google Shape;221;ga1c011d19f_0_58:notes"/>
           <p:cNvSpPr/>
           <p:nvPr>
             <p:ph idx="2" type="sldImg"/>
@@ -2365,7 +2382,7 @@
       </p:sp>
       <p:sp>
         <p:nvSpPr>
-          <p:cNvPr id="212" name="Google Shape;212;ga1c011d19f_0_62:notes"/>
+          <p:cNvPr id="222" name="Google Shape;222;ga1c011d19f_0_58:notes"/>
           <p:cNvSpPr txBox="1"/>
           <p:nvPr>
             <p:ph idx="1" type="body"/>
@@ -2415,7 +2432,7 @@
   <p:cSld>
     <p:spTree>
       <p:nvGrpSpPr>
-        <p:cNvPr id="215" name="Shape 215"/>
+        <p:cNvPr id="225" name="Shape 225"/>
         <p:cNvGrpSpPr/>
         <p:nvPr/>
       </p:nvGrpSpPr>
@@ -2429,7 +2446,7 @@
       </p:grpSpPr>
       <p:sp>
         <p:nvSpPr>
-          <p:cNvPr id="216" name="Google Shape;216;ga1c011d19f_0_99:notes"/>
+          <p:cNvPr id="226" name="Google Shape;226;ga1c011d19f_0_62:notes"/>
           <p:cNvSpPr/>
           <p:nvPr>
             <p:ph idx="2" type="sldImg"/>
@@ -2464,7 +2481,7 @@
       </p:sp>
       <p:sp>
         <p:nvSpPr>
-          <p:cNvPr id="217" name="Google Shape;217;ga1c011d19f_0_99:notes"/>
+          <p:cNvPr id="227" name="Google Shape;227;ga1c011d19f_0_62:notes"/>
           <p:cNvSpPr txBox="1"/>
           <p:nvPr>
             <p:ph idx="1" type="body"/>
@@ -2495,8 +2512,7 @@
               <a:buNone/>
             </a:pPr>
             <a:r>
-              <a:rPr lang="en"/>
-              <a:t>Add State to Catalog and Cart components.</a:t>
+              <a:t/>
             </a:r>
             <a:endParaRPr/>
           </a:p>
@@ -2515,7 +2531,7 @@
   <p:cSld>
     <p:spTree>
       <p:nvGrpSpPr>
-        <p:cNvPr id="220" name="Shape 220"/>
+        <p:cNvPr id="230" name="Shape 230"/>
         <p:cNvGrpSpPr/>
         <p:nvPr/>
       </p:nvGrpSpPr>
@@ -2529,7 +2545,7 @@
       </p:grpSpPr>
       <p:sp>
         <p:nvSpPr>
-          <p:cNvPr id="221" name="Google Shape;221;ga1c011d19f_0_66:notes"/>
+          <p:cNvPr id="231" name="Google Shape;231;ga1c011d19f_0_99:notes"/>
           <p:cNvSpPr/>
           <p:nvPr>
             <p:ph idx="2" type="sldImg"/>
@@ -2564,7 +2580,7 @@
       </p:sp>
       <p:sp>
         <p:nvSpPr>
-          <p:cNvPr id="222" name="Google Shape;222;ga1c011d19f_0_66:notes"/>
+          <p:cNvPr id="232" name="Google Shape;232;ga1c011d19f_0_99:notes"/>
           <p:cNvSpPr txBox="1"/>
           <p:nvPr>
             <p:ph idx="1" type="body"/>
@@ -2595,7 +2611,8 @@
               <a:buNone/>
             </a:pPr>
             <a:r>
-              <a:t/>
+              <a:rPr lang="en"/>
+              <a:t>Add State to Catalog and Cart components.</a:t>
             </a:r>
             <a:endParaRPr/>
           </a:p>
@@ -2614,7 +2631,7 @@
   <p:cSld>
     <p:spTree>
       <p:nvGrpSpPr>
-        <p:cNvPr id="225" name="Shape 225"/>
+        <p:cNvPr id="235" name="Shape 235"/>
         <p:cNvGrpSpPr/>
         <p:nvPr/>
       </p:nvGrpSpPr>
@@ -2628,7 +2645,7 @@
       </p:grpSpPr>
       <p:sp>
         <p:nvSpPr>
-          <p:cNvPr id="226" name="Google Shape;226;ga1c011d19f_0_107:notes"/>
+          <p:cNvPr id="236" name="Google Shape;236;ga1c011d19f_0_66:notes"/>
           <p:cNvSpPr/>
           <p:nvPr>
             <p:ph idx="2" type="sldImg"/>
@@ -2663,7 +2680,7 @@
       </p:sp>
       <p:sp>
         <p:nvSpPr>
-          <p:cNvPr id="227" name="Google Shape;227;ga1c011d19f_0_107:notes"/>
+          <p:cNvPr id="237" name="Google Shape;237;ga1c011d19f_0_66:notes"/>
           <p:cNvSpPr txBox="1"/>
           <p:nvPr>
             <p:ph idx="1" type="body"/>
@@ -2713,7 +2730,7 @@
   <p:cSld>
     <p:spTree>
       <p:nvGrpSpPr>
-        <p:cNvPr id="230" name="Shape 230"/>
+        <p:cNvPr id="240" name="Shape 240"/>
         <p:cNvGrpSpPr/>
         <p:nvPr/>
       </p:nvGrpSpPr>
@@ -2727,7 +2744,7 @@
       </p:grpSpPr>
       <p:sp>
         <p:nvSpPr>
-          <p:cNvPr id="231" name="Google Shape;231;ga1c011d19f_0_111:notes"/>
+          <p:cNvPr id="241" name="Google Shape;241;ga1c011d19f_0_107:notes"/>
           <p:cNvSpPr/>
           <p:nvPr>
             <p:ph idx="2" type="sldImg"/>
@@ -2762,7 +2779,7 @@
       </p:sp>
       <p:sp>
         <p:nvSpPr>
-          <p:cNvPr id="232" name="Google Shape;232;ga1c011d19f_0_111:notes"/>
+          <p:cNvPr id="242" name="Google Shape;242;ga1c011d19f_0_107:notes"/>
           <p:cNvSpPr txBox="1"/>
           <p:nvPr>
             <p:ph idx="1" type="body"/>
@@ -2812,7 +2829,7 @@
   <p:cSld>
     <p:spTree>
       <p:nvGrpSpPr>
-        <p:cNvPr id="236" name="Shape 236"/>
+        <p:cNvPr id="245" name="Shape 245"/>
         <p:cNvGrpSpPr/>
         <p:nvPr/>
       </p:nvGrpSpPr>
@@ -2826,7 +2843,7 @@
       </p:grpSpPr>
       <p:sp>
         <p:nvSpPr>
-          <p:cNvPr id="237" name="Google Shape;237;ga1c011d19f_0_131:notes"/>
+          <p:cNvPr id="246" name="Google Shape;246;ga1c011d19f_0_111:notes"/>
           <p:cNvSpPr/>
           <p:nvPr>
             <p:ph idx="2" type="sldImg"/>
@@ -2861,7 +2878,7 @@
       </p:sp>
       <p:sp>
         <p:nvSpPr>
-          <p:cNvPr id="238" name="Google Shape;238;ga1c011d19f_0_131:notes"/>
+          <p:cNvPr id="247" name="Google Shape;247;ga1c011d19f_0_111:notes"/>
           <p:cNvSpPr txBox="1"/>
           <p:nvPr>
             <p:ph idx="1" type="body"/>
@@ -3010,7 +3027,7 @@
   <p:cSld>
     <p:spTree>
       <p:nvGrpSpPr>
-        <p:cNvPr id="241" name="Shape 241"/>
+        <p:cNvPr id="251" name="Shape 251"/>
         <p:cNvGrpSpPr/>
         <p:nvPr/>
       </p:nvGrpSpPr>
@@ -3024,7 +3041,7 @@
       </p:grpSpPr>
       <p:sp>
         <p:nvSpPr>
-          <p:cNvPr id="242" name="Google Shape;242;ga1c011d19f_0_149:notes"/>
+          <p:cNvPr id="252" name="Google Shape;252;ga1c011d19f_0_131:notes"/>
           <p:cNvSpPr/>
           <p:nvPr>
             <p:ph idx="2" type="sldImg"/>
@@ -3059,7 +3076,7 @@
       </p:sp>
       <p:sp>
         <p:nvSpPr>
-          <p:cNvPr id="243" name="Google Shape;243;ga1c011d19f_0_149:notes"/>
+          <p:cNvPr id="253" name="Google Shape;253;ga1c011d19f_0_131:notes"/>
           <p:cNvSpPr txBox="1"/>
           <p:nvPr>
             <p:ph idx="1" type="body"/>
@@ -3109,7 +3126,7 @@
   <p:cSld>
     <p:spTree>
       <p:nvGrpSpPr>
-        <p:cNvPr id="246" name="Shape 246"/>
+        <p:cNvPr id="256" name="Shape 256"/>
         <p:cNvGrpSpPr/>
         <p:nvPr/>
       </p:nvGrpSpPr>
@@ -3123,7 +3140,7 @@
       </p:grpSpPr>
       <p:sp>
         <p:nvSpPr>
-          <p:cNvPr id="247" name="Google Shape;247;ga1c011d19f_0_135:notes"/>
+          <p:cNvPr id="257" name="Google Shape;257;ga1c011d19f_0_149:notes"/>
           <p:cNvSpPr/>
           <p:nvPr>
             <p:ph idx="2" type="sldImg"/>
@@ -3158,7 +3175,7 @@
       </p:sp>
       <p:sp>
         <p:nvSpPr>
-          <p:cNvPr id="248" name="Google Shape;248;ga1c011d19f_0_135:notes"/>
+          <p:cNvPr id="258" name="Google Shape;258;ga1c011d19f_0_149:notes"/>
           <p:cNvSpPr txBox="1"/>
           <p:nvPr>
             <p:ph idx="1" type="body"/>
@@ -3208,7 +3225,7 @@
   <p:cSld>
     <p:spTree>
       <p:nvGrpSpPr>
-        <p:cNvPr id="251" name="Shape 251"/>
+        <p:cNvPr id="261" name="Shape 261"/>
         <p:cNvGrpSpPr/>
         <p:nvPr/>
       </p:nvGrpSpPr>
@@ -3222,7 +3239,7 @@
       </p:grpSpPr>
       <p:sp>
         <p:nvSpPr>
-          <p:cNvPr id="252" name="Google Shape;252;ga1c011d19f_0_139:notes"/>
+          <p:cNvPr id="262" name="Google Shape;262;ga1c011d19f_0_135:notes"/>
           <p:cNvSpPr/>
           <p:nvPr>
             <p:ph idx="2" type="sldImg"/>
@@ -3257,7 +3274,7 @@
       </p:sp>
       <p:sp>
         <p:nvSpPr>
-          <p:cNvPr id="253" name="Google Shape;253;ga1c011d19f_0_139:notes"/>
+          <p:cNvPr id="263" name="Google Shape;263;ga1c011d19f_0_135:notes"/>
           <p:cNvSpPr txBox="1"/>
           <p:nvPr>
             <p:ph idx="1" type="body"/>
@@ -3307,7 +3324,7 @@
   <p:cSld>
     <p:spTree>
       <p:nvGrpSpPr>
-        <p:cNvPr id="256" name="Shape 256"/>
+        <p:cNvPr id="266" name="Shape 266"/>
         <p:cNvGrpSpPr/>
         <p:nvPr/>
       </p:nvGrpSpPr>
@@ -3321,7 +3338,7 @@
       </p:grpSpPr>
       <p:sp>
         <p:nvSpPr>
-          <p:cNvPr id="257" name="Google Shape;257;ga1c011d19f_0_157:notes"/>
+          <p:cNvPr id="267" name="Google Shape;267;ga1c011d19f_0_139:notes"/>
           <p:cNvSpPr/>
           <p:nvPr>
             <p:ph idx="2" type="sldImg"/>
@@ -3356,7 +3373,7 @@
       </p:sp>
       <p:sp>
         <p:nvSpPr>
-          <p:cNvPr id="258" name="Google Shape;258;ga1c011d19f_0_157:notes"/>
+          <p:cNvPr id="268" name="Google Shape;268;ga1c011d19f_0_139:notes"/>
           <p:cNvSpPr txBox="1"/>
           <p:nvPr>
             <p:ph idx="1" type="body"/>
@@ -3406,7 +3423,7 @@
   <p:cSld>
     <p:spTree>
       <p:nvGrpSpPr>
-        <p:cNvPr id="262" name="Shape 262"/>
+        <p:cNvPr id="271" name="Shape 271"/>
         <p:cNvGrpSpPr/>
         <p:nvPr/>
       </p:nvGrpSpPr>
@@ -3420,7 +3437,7 @@
       </p:grpSpPr>
       <p:sp>
         <p:nvSpPr>
-          <p:cNvPr id="263" name="Google Shape;263;ga1c011d19f_0_143:notes"/>
+          <p:cNvPr id="272" name="Google Shape;272;ga1c011d19f_0_157:notes"/>
           <p:cNvSpPr/>
           <p:nvPr>
             <p:ph idx="2" type="sldImg"/>
@@ -3455,7 +3472,7 @@
       </p:sp>
       <p:sp>
         <p:nvSpPr>
-          <p:cNvPr id="264" name="Google Shape;264;ga1c011d19f_0_143:notes"/>
+          <p:cNvPr id="273" name="Google Shape;273;ga1c011d19f_0_157:notes"/>
           <p:cNvSpPr txBox="1"/>
           <p:nvPr>
             <p:ph idx="1" type="body"/>
@@ -3505,7 +3522,7 @@
   <p:cSld>
     <p:spTree>
       <p:nvGrpSpPr>
-        <p:cNvPr id="267" name="Shape 267"/>
+        <p:cNvPr id="277" name="Shape 277"/>
         <p:cNvGrpSpPr/>
         <p:nvPr/>
       </p:nvGrpSpPr>
@@ -3519,7 +3536,7 @@
       </p:grpSpPr>
       <p:sp>
         <p:nvSpPr>
-          <p:cNvPr id="268" name="Google Shape;268;ga1c011d19f_0_153:notes"/>
+          <p:cNvPr id="278" name="Google Shape;278;ga1c011d19f_0_143:notes"/>
           <p:cNvSpPr/>
           <p:nvPr>
             <p:ph idx="2" type="sldImg"/>
@@ -3554,7 +3571,7 @@
       </p:sp>
       <p:sp>
         <p:nvSpPr>
-          <p:cNvPr id="269" name="Google Shape;269;ga1c011d19f_0_153:notes"/>
+          <p:cNvPr id="279" name="Google Shape;279;ga1c011d19f_0_143:notes"/>
           <p:cNvSpPr txBox="1"/>
           <p:nvPr>
             <p:ph idx="1" type="body"/>
@@ -3604,7 +3621,7 @@
   <p:cSld>
     <p:spTree>
       <p:nvGrpSpPr>
-        <p:cNvPr id="272" name="Shape 272"/>
+        <p:cNvPr id="282" name="Shape 282"/>
         <p:cNvGrpSpPr/>
         <p:nvPr/>
       </p:nvGrpSpPr>
@@ -3618,7 +3635,7 @@
       </p:grpSpPr>
       <p:sp>
         <p:nvSpPr>
-          <p:cNvPr id="273" name="Google Shape;273;ga1c011d19f_0_166:notes"/>
+          <p:cNvPr id="283" name="Google Shape;283;ga1c011d19f_0_153:notes"/>
           <p:cNvSpPr/>
           <p:nvPr>
             <p:ph idx="2" type="sldImg"/>
@@ -3653,7 +3670,7 @@
       </p:sp>
       <p:sp>
         <p:nvSpPr>
-          <p:cNvPr id="274" name="Google Shape;274;ga1c011d19f_0_166:notes"/>
+          <p:cNvPr id="284" name="Google Shape;284;ga1c011d19f_0_153:notes"/>
           <p:cNvSpPr txBox="1"/>
           <p:nvPr>
             <p:ph idx="1" type="body"/>
@@ -3703,7 +3720,7 @@
   <p:cSld>
     <p:spTree>
       <p:nvGrpSpPr>
-        <p:cNvPr id="278" name="Shape 278"/>
+        <p:cNvPr id="287" name="Shape 287"/>
         <p:cNvGrpSpPr/>
         <p:nvPr/>
       </p:nvGrpSpPr>
@@ -3717,7 +3734,7 @@
       </p:grpSpPr>
       <p:sp>
         <p:nvSpPr>
-          <p:cNvPr id="279" name="Google Shape;279;ga1c011d19f_0_162:notes"/>
+          <p:cNvPr id="288" name="Google Shape;288;ga1c011d19f_0_166:notes"/>
           <p:cNvSpPr/>
           <p:nvPr>
             <p:ph idx="2" type="sldImg"/>
@@ -3752,7 +3769,7 @@
       </p:sp>
       <p:sp>
         <p:nvSpPr>
-          <p:cNvPr id="280" name="Google Shape;280;ga1c011d19f_0_162:notes"/>
+          <p:cNvPr id="289" name="Google Shape;289;ga1c011d19f_0_166:notes"/>
           <p:cNvSpPr txBox="1"/>
           <p:nvPr>
             <p:ph idx="1" type="body"/>
@@ -3802,7 +3819,7 @@
   <p:cSld>
     <p:spTree>
       <p:nvGrpSpPr>
-        <p:cNvPr id="283" name="Shape 283"/>
+        <p:cNvPr id="293" name="Shape 293"/>
         <p:cNvGrpSpPr/>
         <p:nvPr/>
       </p:nvGrpSpPr>
@@ -3816,7 +3833,7 @@
       </p:grpSpPr>
       <p:sp>
         <p:nvSpPr>
-          <p:cNvPr id="284" name="Google Shape;284;ga1c011d19f_0_171:notes"/>
+          <p:cNvPr id="294" name="Google Shape;294;ga1c011d19f_0_162:notes"/>
           <p:cNvSpPr/>
           <p:nvPr>
             <p:ph idx="2" type="sldImg"/>
@@ -3851,7 +3868,7 @@
       </p:sp>
       <p:sp>
         <p:nvSpPr>
-          <p:cNvPr id="285" name="Google Shape;285;ga1c011d19f_0_171:notes"/>
+          <p:cNvPr id="295" name="Google Shape;295;ga1c011d19f_0_162:notes"/>
           <p:cNvSpPr txBox="1"/>
           <p:nvPr>
             <p:ph idx="1" type="body"/>
@@ -3901,7 +3918,7 @@
   <p:cSld>
     <p:spTree>
       <p:nvGrpSpPr>
-        <p:cNvPr id="289" name="Shape 289"/>
+        <p:cNvPr id="298" name="Shape 298"/>
         <p:cNvGrpSpPr/>
         <p:nvPr/>
       </p:nvGrpSpPr>
@@ -3915,7 +3932,7 @@
       </p:grpSpPr>
       <p:sp>
         <p:nvSpPr>
-          <p:cNvPr id="290" name="Google Shape;290;ga1c011d19f_0_177:notes"/>
+          <p:cNvPr id="299" name="Google Shape;299;ga1c011d19f_0_171:notes"/>
           <p:cNvSpPr/>
           <p:nvPr>
             <p:ph idx="2" type="sldImg"/>
@@ -3950,7 +3967,7 @@
       </p:sp>
       <p:sp>
         <p:nvSpPr>
-          <p:cNvPr id="291" name="Google Shape;291;ga1c011d19f_0_177:notes"/>
+          <p:cNvPr id="300" name="Google Shape;300;ga1c011d19f_0_171:notes"/>
           <p:cNvSpPr txBox="1"/>
           <p:nvPr>
             <p:ph idx="1" type="body"/>
@@ -4099,7 +4116,7 @@
   <p:cSld>
     <p:spTree>
       <p:nvGrpSpPr>
-        <p:cNvPr id="296" name="Shape 296"/>
+        <p:cNvPr id="304" name="Shape 304"/>
         <p:cNvGrpSpPr/>
         <p:nvPr/>
       </p:nvGrpSpPr>
@@ -4113,7 +4130,7 @@
       </p:grpSpPr>
       <p:sp>
         <p:nvSpPr>
-          <p:cNvPr id="297" name="Google Shape;297;g3422d60c54_0_76:notes"/>
+          <p:cNvPr id="305" name="Google Shape;305;ga1c011d19f_0_177:notes"/>
           <p:cNvSpPr/>
           <p:nvPr>
             <p:ph idx="2" type="sldImg"/>
@@ -4148,7 +4165,106 @@
       </p:sp>
       <p:sp>
         <p:nvSpPr>
-          <p:cNvPr id="298" name="Google Shape;298;g3422d60c54_0_76:notes"/>
+          <p:cNvPr id="306" name="Google Shape;306;ga1c011d19f_0_177:notes"/>
+          <p:cNvSpPr txBox="1"/>
+          <p:nvPr>
+            <p:ph idx="1" type="body"/>
+          </p:nvPr>
+        </p:nvSpPr>
+        <p:spPr>
+          <a:xfrm>
+            <a:off x="685800" y="4343400"/>
+            <a:ext cx="5486400" cy="4114800"/>
+          </a:xfrm>
+          <a:prstGeom prst="rect">
+            <a:avLst/>
+          </a:prstGeom>
+        </p:spPr>
+        <p:txBody>
+          <a:bodyPr anchorCtr="0" anchor="t" bIns="91425" lIns="91425" spcFirstLastPara="1" rIns="91425" wrap="square" tIns="91425">
+            <a:noAutofit/>
+          </a:bodyPr>
+          <a:lstStyle/>
+          <a:p>
+            <a:pPr indent="0" lvl="0" marL="0" rtl="0" algn="l">
+              <a:spcBef>
+                <a:spcPts val="0"/>
+              </a:spcBef>
+              <a:spcAft>
+                <a:spcPts val="0"/>
+              </a:spcAft>
+              <a:buNone/>
+            </a:pPr>
+            <a:r>
+              <a:t/>
+            </a:r>
+            <a:endParaRPr/>
+          </a:p>
+        </p:txBody>
+      </p:sp>
+    </p:spTree>
+  </p:cSld>
+  <p:clrMapOvr>
+    <a:masterClrMapping/>
+  </p:clrMapOvr>
+</p:notes>
+</file>
+
+<file path=ppt/notesSlides/notesSlide41.xml><?xml version="1.0" encoding="utf-8"?>
+<p:notes xmlns:a="http://schemas.openxmlformats.org/drawingml/2006/main" xmlns:r="http://schemas.openxmlformats.org/officeDocument/2006/relationships" xmlns:mc="http://schemas.openxmlformats.org/markup-compatibility/2006" xmlns:mv="urn:schemas-microsoft-com:mac:vml" xmlns:p="http://schemas.openxmlformats.org/presentationml/2006/main" xmlns:c="http://schemas.openxmlformats.org/drawingml/2006/chart" xmlns:dgm="http://schemas.openxmlformats.org/drawingml/2006/diagram" xmlns:o="urn:schemas-microsoft-com:office:office" xmlns:v="urn:schemas-microsoft-com:vml" xmlns:pvml="urn:schemas-microsoft-com:office:powerpoint" xmlns:com="http://schemas.openxmlformats.org/drawingml/2006/compatibility" xmlns:p14="http://schemas.microsoft.com/office/powerpoint/2010/main" xmlns:p15="http://schemas.microsoft.com/office/powerpoint/2012/main" xmlns:ahyp="http://schemas.microsoft.com/office/drawing/2018/hyperlinkcolor" showMasterPhAnim="0" showMasterSp="0">
+  <p:cSld>
+    <p:spTree>
+      <p:nvGrpSpPr>
+        <p:cNvPr id="311" name="Shape 311"/>
+        <p:cNvGrpSpPr/>
+        <p:nvPr/>
+      </p:nvGrpSpPr>
+      <p:grpSpPr>
+        <a:xfrm>
+          <a:off x="0" y="0"/>
+          <a:ext cx="0" cy="0"/>
+          <a:chOff x="0" y="0"/>
+          <a:chExt cx="0" cy="0"/>
+        </a:xfrm>
+      </p:grpSpPr>
+      <p:sp>
+        <p:nvSpPr>
+          <p:cNvPr id="312" name="Google Shape;312;g3422d60c54_0_76:notes"/>
+          <p:cNvSpPr/>
+          <p:nvPr>
+            <p:ph idx="2" type="sldImg"/>
+          </p:nvPr>
+        </p:nvSpPr>
+        <p:spPr>
+          <a:xfrm>
+            <a:off x="381300" y="685800"/>
+            <a:ext cx="6096000" cy="3429000"/>
+          </a:xfrm>
+          <a:custGeom>
+            <a:rect b="b" l="l" r="r" t="t"/>
+            <a:pathLst>
+              <a:path extrusionOk="0" h="120000" w="120000">
+                <a:moveTo>
+                  <a:pt x="0" y="0"/>
+                </a:moveTo>
+                <a:lnTo>
+                  <a:pt x="120000" y="0"/>
+                </a:lnTo>
+                <a:lnTo>
+                  <a:pt x="120000" y="120000"/>
+                </a:lnTo>
+                <a:lnTo>
+                  <a:pt x="0" y="120000"/>
+                </a:lnTo>
+                <a:close/>
+              </a:path>
+            </a:pathLst>
+          </a:custGeom>
+        </p:spPr>
+      </p:sp>
+      <p:sp>
+        <p:nvSpPr>
+          <p:cNvPr id="313" name="Google Shape;313;g3422d60c54_0_76:notes"/>
           <p:cNvSpPr txBox="1"/>
           <p:nvPr>
             <p:ph idx="1" type="body"/>
@@ -11681,24 +11797,74 @@
           <p:cNvPr id="152" name="Google Shape;152;p24"/>
           <p:cNvSpPr txBox="1"/>
           <p:nvPr>
-            <p:ph type="ctrTitle"/>
-          </p:nvPr>
-        </p:nvSpPr>
-        <p:spPr>
-          <a:xfrm>
-            <a:off x="311700" y="2184750"/>
-            <a:ext cx="8520600" cy="774000"/>
+            <p:ph type="title"/>
+          </p:nvPr>
+        </p:nvSpPr>
+        <p:spPr>
+          <a:xfrm>
+            <a:off x="311700" y="445025"/>
+            <a:ext cx="8520600" cy="572700"/>
           </a:xfrm>
           <a:prstGeom prst="rect">
             <a:avLst/>
           </a:prstGeom>
         </p:spPr>
         <p:txBody>
-          <a:bodyPr anchorCtr="0" anchor="b" bIns="91425" lIns="91425" spcFirstLastPara="1" rIns="91425" wrap="square" tIns="91425">
+          <a:bodyPr anchorCtr="0" anchor="t" bIns="91425" lIns="91425" spcFirstLastPara="1" rIns="91425" wrap="square" tIns="91425">
             <a:noAutofit/>
           </a:bodyPr>
           <a:lstStyle/>
           <a:p>
+            <a:pPr indent="0" lvl="0" marL="0" rtl="0" algn="l">
+              <a:spcBef>
+                <a:spcPts val="0"/>
+              </a:spcBef>
+              <a:spcAft>
+                <a:spcPts val="0"/>
+              </a:spcAft>
+              <a:buNone/>
+            </a:pPr>
+            <a:r>
+              <a:rPr lang="en"/>
+              <a:t>TypeScript Compile Process</a:t>
+            </a:r>
+            <a:endParaRPr/>
+          </a:p>
+        </p:txBody>
+      </p:sp>
+      <p:sp>
+        <p:nvSpPr>
+          <p:cNvPr id="153" name="Google Shape;153;p24"/>
+          <p:cNvSpPr/>
+          <p:nvPr/>
+        </p:nvSpPr>
+        <p:spPr>
+          <a:xfrm>
+            <a:off x="3675113" y="1949100"/>
+            <a:ext cx="1277700" cy="1245300"/>
+          </a:xfrm>
+          <a:prstGeom prst="ellipse">
+            <a:avLst/>
+          </a:prstGeom>
+          <a:solidFill>
+            <a:schemeClr val="lt2"/>
+          </a:solidFill>
+          <a:ln cap="flat" cmpd="sng" w="9525">
+            <a:solidFill>
+              <a:schemeClr val="dk2"/>
+            </a:solidFill>
+            <a:prstDash val="solid"/>
+            <a:round/>
+            <a:headEnd len="sm" w="sm" type="none"/>
+            <a:tailEnd len="sm" w="sm" type="none"/>
+          </a:ln>
+        </p:spPr>
+        <p:txBody>
+          <a:bodyPr anchorCtr="0" anchor="ctr" bIns="91425" lIns="91425" spcFirstLastPara="1" rIns="91425" wrap="square" tIns="91425">
+            <a:noAutofit/>
+          </a:bodyPr>
+          <a:lstStyle/>
+          <a:p>
             <a:pPr indent="0" lvl="0" marL="0" rtl="0" algn="ctr">
               <a:spcBef>
                 <a:spcPts val="0"/>
@@ -11710,9 +11876,442 @@
             </a:pPr>
             <a:r>
               <a:rPr lang="en"/>
-              <a:t>Follow Along Exercises</a:t>
+              <a:t>TS Compiler</a:t>
             </a:r>
             <a:endParaRPr/>
+          </a:p>
+        </p:txBody>
+      </p:sp>
+      <p:sp>
+        <p:nvSpPr>
+          <p:cNvPr id="154" name="Google Shape;154;p24"/>
+          <p:cNvSpPr/>
+          <p:nvPr/>
+        </p:nvSpPr>
+        <p:spPr>
+          <a:xfrm>
+            <a:off x="568125" y="2151150"/>
+            <a:ext cx="825000" cy="841200"/>
+          </a:xfrm>
+          <a:prstGeom prst="rect">
+            <a:avLst/>
+          </a:prstGeom>
+          <a:solidFill>
+            <a:srgbClr val="6D9EEB"/>
+          </a:solidFill>
+          <a:ln cap="flat" cmpd="sng" w="9525">
+            <a:solidFill>
+              <a:schemeClr val="dk2"/>
+            </a:solidFill>
+            <a:prstDash val="solid"/>
+            <a:round/>
+            <a:headEnd len="sm" w="sm" type="none"/>
+            <a:tailEnd len="sm" w="sm" type="none"/>
+          </a:ln>
+        </p:spPr>
+        <p:txBody>
+          <a:bodyPr anchorCtr="0" anchor="ctr" bIns="91425" lIns="91425" spcFirstLastPara="1" rIns="91425" wrap="square" tIns="91425">
+            <a:noAutofit/>
+          </a:bodyPr>
+          <a:lstStyle/>
+          <a:p>
+            <a:pPr indent="0" lvl="0" marL="0" rtl="0" algn="l">
+              <a:spcBef>
+                <a:spcPts val="0"/>
+              </a:spcBef>
+              <a:spcAft>
+                <a:spcPts val="0"/>
+              </a:spcAft>
+              <a:buNone/>
+            </a:pPr>
+            <a:r>
+              <a:rPr lang="en"/>
+              <a:t>.ts files</a:t>
+            </a:r>
+            <a:endParaRPr/>
+          </a:p>
+        </p:txBody>
+      </p:sp>
+      <p:sp>
+        <p:nvSpPr>
+          <p:cNvPr id="155" name="Google Shape;155;p24"/>
+          <p:cNvSpPr/>
+          <p:nvPr/>
+        </p:nvSpPr>
+        <p:spPr>
+          <a:xfrm>
+            <a:off x="7234825" y="2151150"/>
+            <a:ext cx="825000" cy="841200"/>
+          </a:xfrm>
+          <a:prstGeom prst="rect">
+            <a:avLst/>
+          </a:prstGeom>
+          <a:solidFill>
+            <a:srgbClr val="FFE599"/>
+          </a:solidFill>
+          <a:ln cap="flat" cmpd="sng" w="9525">
+            <a:solidFill>
+              <a:schemeClr val="dk2"/>
+            </a:solidFill>
+            <a:prstDash val="solid"/>
+            <a:round/>
+            <a:headEnd len="sm" w="sm" type="none"/>
+            <a:tailEnd len="sm" w="sm" type="none"/>
+          </a:ln>
+        </p:spPr>
+        <p:txBody>
+          <a:bodyPr anchorCtr="0" anchor="ctr" bIns="91425" lIns="91425" spcFirstLastPara="1" rIns="91425" wrap="square" tIns="91425">
+            <a:noAutofit/>
+          </a:bodyPr>
+          <a:lstStyle/>
+          <a:p>
+            <a:pPr indent="0" lvl="0" marL="0" rtl="0" algn="l">
+              <a:spcBef>
+                <a:spcPts val="0"/>
+              </a:spcBef>
+              <a:spcAft>
+                <a:spcPts val="0"/>
+              </a:spcAft>
+              <a:buNone/>
+            </a:pPr>
+            <a:r>
+              <a:rPr lang="en"/>
+              <a:t>.js files</a:t>
+            </a:r>
+            <a:endParaRPr/>
+          </a:p>
+        </p:txBody>
+      </p:sp>
+      <p:sp>
+        <p:nvSpPr>
+          <p:cNvPr id="156" name="Google Shape;156;p24"/>
+          <p:cNvSpPr txBox="1"/>
+          <p:nvPr/>
+        </p:nvSpPr>
+        <p:spPr>
+          <a:xfrm>
+            <a:off x="1611763" y="2636525"/>
+            <a:ext cx="1277700" cy="711600"/>
+          </a:xfrm>
+          <a:prstGeom prst="rect">
+            <a:avLst/>
+          </a:prstGeom>
+          <a:noFill/>
+          <a:ln>
+            <a:noFill/>
+          </a:ln>
+        </p:spPr>
+        <p:txBody>
+          <a:bodyPr anchorCtr="0" anchor="t" bIns="91425" lIns="91425" spcFirstLastPara="1" rIns="91425" wrap="square" tIns="91425">
+            <a:noAutofit/>
+          </a:bodyPr>
+          <a:lstStyle/>
+          <a:p>
+            <a:pPr indent="0" lvl="0" marL="0" rtl="0" algn="l">
+              <a:spcBef>
+                <a:spcPts val="0"/>
+              </a:spcBef>
+              <a:spcAft>
+                <a:spcPts val="0"/>
+              </a:spcAft>
+              <a:buNone/>
+            </a:pPr>
+            <a:r>
+              <a:rPr lang="en">
+                <a:solidFill>
+                  <a:srgbClr val="FFFFFF"/>
+                </a:solidFill>
+                <a:latin typeface="Nunito Sans"/>
+                <a:ea typeface="Nunito Sans"/>
+                <a:cs typeface="Nunito Sans"/>
+                <a:sym typeface="Nunito Sans"/>
+              </a:rPr>
+              <a:t>Run tsc command</a:t>
+            </a:r>
+            <a:endParaRPr>
+              <a:solidFill>
+                <a:srgbClr val="FFFFFF"/>
+              </a:solidFill>
+              <a:latin typeface="Nunito Sans"/>
+              <a:ea typeface="Nunito Sans"/>
+              <a:cs typeface="Nunito Sans"/>
+              <a:sym typeface="Nunito Sans"/>
+            </a:endParaRPr>
+          </a:p>
+        </p:txBody>
+      </p:sp>
+      <p:sp>
+        <p:nvSpPr>
+          <p:cNvPr id="157" name="Google Shape;157;p24"/>
+          <p:cNvSpPr txBox="1"/>
+          <p:nvPr/>
+        </p:nvSpPr>
+        <p:spPr>
+          <a:xfrm>
+            <a:off x="5822825" y="2741538"/>
+            <a:ext cx="954300" cy="436800"/>
+          </a:xfrm>
+          <a:prstGeom prst="rect">
+            <a:avLst/>
+          </a:prstGeom>
+          <a:noFill/>
+          <a:ln>
+            <a:noFill/>
+          </a:ln>
+        </p:spPr>
+        <p:txBody>
+          <a:bodyPr anchorCtr="0" anchor="t" bIns="91425" lIns="91425" spcFirstLastPara="1" rIns="91425" wrap="square" tIns="91425">
+            <a:noAutofit/>
+          </a:bodyPr>
+          <a:lstStyle/>
+          <a:p>
+            <a:pPr indent="0" lvl="0" marL="0" rtl="0" algn="l">
+              <a:spcBef>
+                <a:spcPts val="0"/>
+              </a:spcBef>
+              <a:spcAft>
+                <a:spcPts val="0"/>
+              </a:spcAft>
+              <a:buNone/>
+            </a:pPr>
+            <a:r>
+              <a:rPr lang="en">
+                <a:solidFill>
+                  <a:srgbClr val="FFFFFF"/>
+                </a:solidFill>
+                <a:latin typeface="Nunito Sans"/>
+                <a:ea typeface="Nunito Sans"/>
+                <a:cs typeface="Nunito Sans"/>
+                <a:sym typeface="Nunito Sans"/>
+              </a:rPr>
+              <a:t>Output</a:t>
+            </a:r>
+            <a:endParaRPr>
+              <a:solidFill>
+                <a:srgbClr val="FFFFFF"/>
+              </a:solidFill>
+              <a:latin typeface="Nunito Sans"/>
+              <a:ea typeface="Nunito Sans"/>
+              <a:cs typeface="Nunito Sans"/>
+              <a:sym typeface="Nunito Sans"/>
+            </a:endParaRPr>
+          </a:p>
+        </p:txBody>
+      </p:sp>
+      <p:cxnSp>
+        <p:nvCxnSpPr>
+          <p:cNvPr id="158" name="Google Shape;158;p24"/>
+          <p:cNvCxnSpPr>
+            <a:stCxn id="154" idx="3"/>
+            <a:endCxn id="153" idx="2"/>
+          </p:cNvCxnSpPr>
+          <p:nvPr/>
+        </p:nvCxnSpPr>
+        <p:spPr>
+          <a:xfrm>
+            <a:off x="1393125" y="2571750"/>
+            <a:ext cx="2282100" cy="0"/>
+          </a:xfrm>
+          <a:prstGeom prst="straightConnector1">
+            <a:avLst/>
+          </a:prstGeom>
+          <a:noFill/>
+          <a:ln cap="flat" cmpd="sng" w="38100">
+            <a:solidFill>
+              <a:srgbClr val="FFFFFF"/>
+            </a:solidFill>
+            <a:prstDash val="solid"/>
+            <a:round/>
+            <a:headEnd len="med" w="med" type="none"/>
+            <a:tailEnd len="med" w="med" type="stealth"/>
+          </a:ln>
+        </p:spPr>
+      </p:cxnSp>
+      <p:cxnSp>
+        <p:nvCxnSpPr>
+          <p:cNvPr id="159" name="Google Shape;159;p24"/>
+          <p:cNvCxnSpPr>
+            <a:stCxn id="153" idx="6"/>
+            <a:endCxn id="155" idx="1"/>
+          </p:cNvCxnSpPr>
+          <p:nvPr/>
+        </p:nvCxnSpPr>
+        <p:spPr>
+          <a:xfrm>
+            <a:off x="4952813" y="2571750"/>
+            <a:ext cx="2282100" cy="0"/>
+          </a:xfrm>
+          <a:prstGeom prst="straightConnector1">
+            <a:avLst/>
+          </a:prstGeom>
+          <a:noFill/>
+          <a:ln cap="flat" cmpd="sng" w="38100">
+            <a:solidFill>
+              <a:srgbClr val="FFFFFF"/>
+            </a:solidFill>
+            <a:prstDash val="solid"/>
+            <a:round/>
+            <a:headEnd len="med" w="med" type="none"/>
+            <a:tailEnd len="med" w="med" type="triangle"/>
+          </a:ln>
+        </p:spPr>
+      </p:cxnSp>
+      <p:sp>
+        <p:nvSpPr>
+          <p:cNvPr id="160" name="Google Shape;160;p24"/>
+          <p:cNvSpPr/>
+          <p:nvPr/>
+        </p:nvSpPr>
+        <p:spPr>
+          <a:xfrm>
+            <a:off x="3479275" y="1831900"/>
+            <a:ext cx="954300" cy="436800"/>
+          </a:xfrm>
+          <a:prstGeom prst="rect">
+            <a:avLst/>
+          </a:prstGeom>
+          <a:solidFill>
+            <a:srgbClr val="D9D9D9"/>
+          </a:solidFill>
+          <a:ln cap="flat" cmpd="sng" w="9525">
+            <a:solidFill>
+              <a:srgbClr val="666666"/>
+            </a:solidFill>
+            <a:prstDash val="solid"/>
+            <a:round/>
+            <a:headEnd len="sm" w="sm" type="none"/>
+            <a:tailEnd len="sm" w="sm" type="none"/>
+          </a:ln>
+        </p:spPr>
+        <p:txBody>
+          <a:bodyPr anchorCtr="0" anchor="ctr" bIns="91425" lIns="91425" spcFirstLastPara="1" rIns="91425" wrap="square" tIns="91425">
+            <a:noAutofit/>
+          </a:bodyPr>
+          <a:lstStyle/>
+          <a:p>
+            <a:pPr indent="0" lvl="0" marL="0" rtl="0" algn="l">
+              <a:spcBef>
+                <a:spcPts val="0"/>
+              </a:spcBef>
+              <a:spcAft>
+                <a:spcPts val="0"/>
+              </a:spcAft>
+              <a:buNone/>
+            </a:pPr>
+            <a:r>
+              <a:rPr lang="en"/>
+              <a:t>.tsconfig</a:t>
+            </a:r>
+            <a:endParaRPr/>
+          </a:p>
+        </p:txBody>
+      </p:sp>
+      <p:sp>
+        <p:nvSpPr>
+          <p:cNvPr id="161" name="Google Shape;161;p24"/>
+          <p:cNvSpPr txBox="1"/>
+          <p:nvPr/>
+        </p:nvSpPr>
+        <p:spPr>
+          <a:xfrm>
+            <a:off x="4059800" y="3348125"/>
+            <a:ext cx="7336800" cy="855900"/>
+          </a:xfrm>
+          <a:prstGeom prst="rect">
+            <a:avLst/>
+          </a:prstGeom>
+          <a:noFill/>
+          <a:ln>
+            <a:noFill/>
+          </a:ln>
+        </p:spPr>
+        <p:txBody>
+          <a:bodyPr anchorCtr="0" anchor="t" bIns="91425" lIns="91425" spcFirstLastPara="1" rIns="91425" wrap="square" tIns="91425">
+            <a:noAutofit/>
+          </a:bodyPr>
+          <a:lstStyle/>
+          <a:p>
+            <a:pPr indent="0" lvl="0" marL="0" rtl="0" algn="l">
+              <a:spcBef>
+                <a:spcPts val="0"/>
+              </a:spcBef>
+              <a:spcAft>
+                <a:spcPts val="0"/>
+              </a:spcAft>
+              <a:buNone/>
+            </a:pPr>
+            <a:r>
+              <a:t/>
+            </a:r>
+            <a:endParaRPr>
+              <a:latin typeface="Nunito Sans"/>
+              <a:ea typeface="Nunito Sans"/>
+              <a:cs typeface="Nunito Sans"/>
+              <a:sym typeface="Nunito Sans"/>
+            </a:endParaRPr>
+          </a:p>
+        </p:txBody>
+      </p:sp>
+      <p:sp>
+        <p:nvSpPr>
+          <p:cNvPr id="162" name="Google Shape;162;p24"/>
+          <p:cNvSpPr txBox="1"/>
+          <p:nvPr/>
+        </p:nvSpPr>
+        <p:spPr>
+          <a:xfrm>
+            <a:off x="3675125" y="3194400"/>
+            <a:ext cx="1277700" cy="855900"/>
+          </a:xfrm>
+          <a:prstGeom prst="rect">
+            <a:avLst/>
+          </a:prstGeom>
+          <a:noFill/>
+          <a:ln>
+            <a:noFill/>
+          </a:ln>
+        </p:spPr>
+        <p:txBody>
+          <a:bodyPr anchorCtr="0" anchor="t" bIns="91425" lIns="91425" spcFirstLastPara="1" rIns="91425" wrap="square" tIns="91425">
+            <a:noAutofit/>
+          </a:bodyPr>
+          <a:lstStyle/>
+          <a:p>
+            <a:pPr indent="0" lvl="0" marL="0" rtl="0" algn="l">
+              <a:spcBef>
+                <a:spcPts val="0"/>
+              </a:spcBef>
+              <a:spcAft>
+                <a:spcPts val="0"/>
+              </a:spcAft>
+              <a:buClr>
+                <a:schemeClr val="dk1"/>
+              </a:buClr>
+              <a:buSzPts val="1100"/>
+              <a:buFont typeface="Arial"/>
+              <a:buNone/>
+            </a:pPr>
+            <a:r>
+              <a:rPr lang="en">
+                <a:solidFill>
+                  <a:srgbClr val="FFFFFF"/>
+                </a:solidFill>
+                <a:latin typeface="Nunito Sans"/>
+                <a:ea typeface="Nunito Sans"/>
+                <a:cs typeface="Nunito Sans"/>
+                <a:sym typeface="Nunito Sans"/>
+              </a:rPr>
+              <a:t>Read tsconfig &amp; transform code</a:t>
+            </a:r>
+            <a:endParaRPr>
+              <a:solidFill>
+                <a:srgbClr val="FFFFFF"/>
+              </a:solidFill>
+              <a:latin typeface="Nunito Sans"/>
+              <a:ea typeface="Nunito Sans"/>
+              <a:cs typeface="Nunito Sans"/>
+              <a:sym typeface="Nunito Sans"/>
+            </a:endParaRPr>
           </a:p>
         </p:txBody>
       </p:sp>
@@ -11729,7 +12328,7 @@
   <p:cSld>
     <p:spTree>
       <p:nvGrpSpPr>
-        <p:cNvPr id="156" name="Shape 156"/>
+        <p:cNvPr id="166" name="Shape 166"/>
         <p:cNvGrpSpPr/>
         <p:nvPr/>
       </p:nvGrpSpPr>
@@ -11743,7 +12342,72 @@
       </p:grpSpPr>
       <p:sp>
         <p:nvSpPr>
-          <p:cNvPr id="157" name="Google Shape;157;p25"/>
+          <p:cNvPr id="167" name="Google Shape;167;p25"/>
+          <p:cNvSpPr txBox="1"/>
+          <p:nvPr>
+            <p:ph type="ctrTitle"/>
+          </p:nvPr>
+        </p:nvSpPr>
+        <p:spPr>
+          <a:xfrm>
+            <a:off x="311700" y="2184750"/>
+            <a:ext cx="8520600" cy="774000"/>
+          </a:xfrm>
+          <a:prstGeom prst="rect">
+            <a:avLst/>
+          </a:prstGeom>
+        </p:spPr>
+        <p:txBody>
+          <a:bodyPr anchorCtr="0" anchor="b" bIns="91425" lIns="91425" spcFirstLastPara="1" rIns="91425" wrap="square" tIns="91425">
+            <a:noAutofit/>
+          </a:bodyPr>
+          <a:lstStyle/>
+          <a:p>
+            <a:pPr indent="0" lvl="0" marL="0" rtl="0" algn="ctr">
+              <a:spcBef>
+                <a:spcPts val="0"/>
+              </a:spcBef>
+              <a:spcAft>
+                <a:spcPts val="0"/>
+              </a:spcAft>
+              <a:buNone/>
+            </a:pPr>
+            <a:r>
+              <a:rPr lang="en"/>
+              <a:t>Follow Along Exercises</a:t>
+            </a:r>
+            <a:endParaRPr/>
+          </a:p>
+        </p:txBody>
+      </p:sp>
+    </p:spTree>
+  </p:cSld>
+  <p:clrMapOvr>
+    <a:masterClrMapping/>
+  </p:clrMapOvr>
+</p:sld>
+</file>
+
+<file path=ppt/slides/slide14.xml><?xml version="1.0" encoding="utf-8"?>
+<p:sld xmlns:a="http://schemas.openxmlformats.org/drawingml/2006/main" xmlns:r="http://schemas.openxmlformats.org/officeDocument/2006/relationships" xmlns:mc="http://schemas.openxmlformats.org/markup-compatibility/2006" xmlns:mv="urn:schemas-microsoft-com:mac:vml" xmlns:p="http://schemas.openxmlformats.org/presentationml/2006/main" xmlns:c="http://schemas.openxmlformats.org/drawingml/2006/chart" xmlns:dgm="http://schemas.openxmlformats.org/drawingml/2006/diagram" xmlns:o="urn:schemas-microsoft-com:office:office" xmlns:v="urn:schemas-microsoft-com:vml" xmlns:pvml="urn:schemas-microsoft-com:office:powerpoint" xmlns:com="http://schemas.openxmlformats.org/drawingml/2006/compatibility" xmlns:p14="http://schemas.microsoft.com/office/powerpoint/2010/main" xmlns:p15="http://schemas.microsoft.com/office/powerpoint/2012/main" xmlns:ahyp="http://schemas.microsoft.com/office/drawing/2018/hyperlinkcolor">
+  <p:cSld>
+    <p:spTree>
+      <p:nvGrpSpPr>
+        <p:cNvPr id="171" name="Shape 171"/>
+        <p:cNvGrpSpPr/>
+        <p:nvPr/>
+      </p:nvGrpSpPr>
+      <p:grpSpPr>
+        <a:xfrm>
+          <a:off x="0" y="0"/>
+          <a:ext cx="0" cy="0"/>
+          <a:chOff x="0" y="0"/>
+          <a:chExt cx="0" cy="0"/>
+        </a:xfrm>
+      </p:grpSpPr>
+      <p:sp>
+        <p:nvSpPr>
+          <p:cNvPr id="172" name="Google Shape;172;p26"/>
           <p:cNvSpPr txBox="1"/>
           <p:nvPr>
             <p:ph type="title"/>
@@ -11783,7 +12447,7 @@
       </p:sp>
       <p:pic>
         <p:nvPicPr>
-          <p:cNvPr descr="To celebrate 100,000 views on my last countdown, I decided to make a brand new one for you to use at your church, youth group, school, or wherever you want!&#10;&#10;Music Used :&#10;TheFatRat - Time Lapse&#10;Tobu - Colors&#10;&#10;Programs used :&#10;Adobe After Effects CC 2014&#10;&#10;Expect more frequent uploads in the future!" id="158" name="Google Shape;158;p25" title="Electric  - 5 Minute Countdown">
+          <p:cNvPr descr="To celebrate 100,000 views on my last countdown, I decided to make a brand new one for you to use at your church, youth group, school, or wherever you want!&#10;&#10;Music Used :&#10;TheFatRat - Time Lapse&#10;Tobu - Colors&#10;&#10;Programs used :&#10;Adobe After Effects CC 2014&#10;&#10;Expect more frequent uploads in the future!" id="173" name="Google Shape;173;p26" title="Electric  - 5 Minute Countdown">
             <a:hlinkClick r:id="rId3"/>
           </p:cNvPr>
           <p:cNvPicPr preferRelativeResize="0"/>
@@ -11819,202 +12483,7 @@
 </p:sld>
 </file>
 
-<file path=ppt/slides/slide14.xml><?xml version="1.0" encoding="utf-8"?>
-<p:sld xmlns:a="http://schemas.openxmlformats.org/drawingml/2006/main" xmlns:r="http://schemas.openxmlformats.org/officeDocument/2006/relationships" xmlns:mc="http://schemas.openxmlformats.org/markup-compatibility/2006" xmlns:mv="urn:schemas-microsoft-com:mac:vml" xmlns:p="http://schemas.openxmlformats.org/presentationml/2006/main" xmlns:c="http://schemas.openxmlformats.org/drawingml/2006/chart" xmlns:dgm="http://schemas.openxmlformats.org/drawingml/2006/diagram" xmlns:o="urn:schemas-microsoft-com:office:office" xmlns:v="urn:schemas-microsoft-com:vml" xmlns:pvml="urn:schemas-microsoft-com:office:powerpoint" xmlns:com="http://schemas.openxmlformats.org/drawingml/2006/compatibility" xmlns:p14="http://schemas.microsoft.com/office/powerpoint/2010/main" xmlns:p15="http://schemas.microsoft.com/office/powerpoint/2012/main" xmlns:ahyp="http://schemas.microsoft.com/office/drawing/2018/hyperlinkcolor">
-  <p:cSld>
-    <p:spTree>
-      <p:nvGrpSpPr>
-        <p:cNvPr id="162" name="Shape 162"/>
-        <p:cNvGrpSpPr/>
-        <p:nvPr/>
-      </p:nvGrpSpPr>
-      <p:grpSpPr>
-        <a:xfrm>
-          <a:off x="0" y="0"/>
-          <a:ext cx="0" cy="0"/>
-          <a:chOff x="0" y="0"/>
-          <a:chExt cx="0" cy="0"/>
-        </a:xfrm>
-      </p:grpSpPr>
-      <p:sp>
-        <p:nvSpPr>
-          <p:cNvPr id="163" name="Google Shape;163;p26"/>
-          <p:cNvSpPr txBox="1"/>
-          <p:nvPr>
-            <p:ph type="ctrTitle"/>
-          </p:nvPr>
-        </p:nvSpPr>
-        <p:spPr>
-          <a:xfrm>
-            <a:off x="311700" y="2184750"/>
-            <a:ext cx="8520600" cy="774000"/>
-          </a:xfrm>
-          <a:prstGeom prst="rect">
-            <a:avLst/>
-          </a:prstGeom>
-        </p:spPr>
-        <p:txBody>
-          <a:bodyPr anchorCtr="0" anchor="b" bIns="91425" lIns="91425" spcFirstLastPara="1" rIns="91425" wrap="square" tIns="91425">
-            <a:noAutofit/>
-          </a:bodyPr>
-          <a:lstStyle/>
-          <a:p>
-            <a:pPr indent="0" lvl="0" marL="0" rtl="0" algn="ctr">
-              <a:spcBef>
-                <a:spcPts val="0"/>
-              </a:spcBef>
-              <a:spcAft>
-                <a:spcPts val="0"/>
-              </a:spcAft>
-              <a:buNone/>
-            </a:pPr>
-            <a:r>
-              <a:rPr lang="en"/>
-              <a:t>Build a React App w/ TypeScript</a:t>
-            </a:r>
-            <a:endParaRPr/>
-          </a:p>
-        </p:txBody>
-      </p:sp>
-    </p:spTree>
-  </p:cSld>
-  <p:clrMapOvr>
-    <a:masterClrMapping/>
-  </p:clrMapOvr>
-</p:sld>
-</file>
-
 <file path=ppt/slides/slide15.xml><?xml version="1.0" encoding="utf-8"?>
-<p:sld xmlns:a="http://schemas.openxmlformats.org/drawingml/2006/main" xmlns:r="http://schemas.openxmlformats.org/officeDocument/2006/relationships" xmlns:mc="http://schemas.openxmlformats.org/markup-compatibility/2006" xmlns:mv="urn:schemas-microsoft-com:mac:vml" xmlns:p="http://schemas.openxmlformats.org/presentationml/2006/main" xmlns:c="http://schemas.openxmlformats.org/drawingml/2006/chart" xmlns:dgm="http://schemas.openxmlformats.org/drawingml/2006/diagram" xmlns:o="urn:schemas-microsoft-com:office:office" xmlns:v="urn:schemas-microsoft-com:vml" xmlns:pvml="urn:schemas-microsoft-com:office:powerpoint" xmlns:com="http://schemas.openxmlformats.org/drawingml/2006/compatibility" xmlns:p14="http://schemas.microsoft.com/office/powerpoint/2010/main" xmlns:p15="http://schemas.microsoft.com/office/powerpoint/2012/main" xmlns:ahyp="http://schemas.microsoft.com/office/drawing/2018/hyperlinkcolor">
-  <p:cSld>
-    <p:spTree>
-      <p:nvGrpSpPr>
-        <p:cNvPr id="167" name="Shape 167"/>
-        <p:cNvGrpSpPr/>
-        <p:nvPr/>
-      </p:nvGrpSpPr>
-      <p:grpSpPr>
-        <a:xfrm>
-          <a:off x="0" y="0"/>
-          <a:ext cx="0" cy="0"/>
-          <a:chOff x="0" y="0"/>
-          <a:chExt cx="0" cy="0"/>
-        </a:xfrm>
-      </p:grpSpPr>
-      <p:sp>
-        <p:nvSpPr>
-          <p:cNvPr id="168" name="Google Shape;168;p27"/>
-          <p:cNvSpPr txBox="1"/>
-          <p:nvPr>
-            <p:ph type="ctrTitle"/>
-          </p:nvPr>
-        </p:nvSpPr>
-        <p:spPr>
-          <a:xfrm>
-            <a:off x="311700" y="2184750"/>
-            <a:ext cx="8520600" cy="774000"/>
-          </a:xfrm>
-          <a:prstGeom prst="rect">
-            <a:avLst/>
-          </a:prstGeom>
-        </p:spPr>
-        <p:txBody>
-          <a:bodyPr anchorCtr="0" anchor="b" bIns="91425" lIns="91425" spcFirstLastPara="1" rIns="91425" wrap="square" tIns="91425">
-            <a:noAutofit/>
-          </a:bodyPr>
-          <a:lstStyle/>
-          <a:p>
-            <a:pPr indent="0" lvl="0" marL="0" rtl="0" algn="ctr">
-              <a:spcBef>
-                <a:spcPts val="0"/>
-              </a:spcBef>
-              <a:spcAft>
-                <a:spcPts val="0"/>
-              </a:spcAft>
-              <a:buNone/>
-            </a:pPr>
-            <a:r>
-              <a:rPr lang="en"/>
-              <a:t>ReactJS Setup</a:t>
-            </a:r>
-            <a:endParaRPr/>
-          </a:p>
-        </p:txBody>
-      </p:sp>
-    </p:spTree>
-  </p:cSld>
-  <p:clrMapOvr>
-    <a:masterClrMapping/>
-  </p:clrMapOvr>
-</p:sld>
-</file>
-
-<file path=ppt/slides/slide16.xml><?xml version="1.0" encoding="utf-8"?>
-<p:sld xmlns:a="http://schemas.openxmlformats.org/drawingml/2006/main" xmlns:r="http://schemas.openxmlformats.org/officeDocument/2006/relationships" xmlns:mc="http://schemas.openxmlformats.org/markup-compatibility/2006" xmlns:mv="urn:schemas-microsoft-com:mac:vml" xmlns:p="http://schemas.openxmlformats.org/presentationml/2006/main" xmlns:c="http://schemas.openxmlformats.org/drawingml/2006/chart" xmlns:dgm="http://schemas.openxmlformats.org/drawingml/2006/diagram" xmlns:o="urn:schemas-microsoft-com:office:office" xmlns:v="urn:schemas-microsoft-com:vml" xmlns:pvml="urn:schemas-microsoft-com:office:powerpoint" xmlns:com="http://schemas.openxmlformats.org/drawingml/2006/compatibility" xmlns:p14="http://schemas.microsoft.com/office/powerpoint/2010/main" xmlns:p15="http://schemas.microsoft.com/office/powerpoint/2012/main" xmlns:ahyp="http://schemas.microsoft.com/office/drawing/2018/hyperlinkcolor">
-  <p:cSld>
-    <p:spTree>
-      <p:nvGrpSpPr>
-        <p:cNvPr id="172" name="Shape 172"/>
-        <p:cNvGrpSpPr/>
-        <p:nvPr/>
-      </p:nvGrpSpPr>
-      <p:grpSpPr>
-        <a:xfrm>
-          <a:off x="0" y="0"/>
-          <a:ext cx="0" cy="0"/>
-          <a:chOff x="0" y="0"/>
-          <a:chExt cx="0" cy="0"/>
-        </a:xfrm>
-      </p:grpSpPr>
-      <p:sp>
-        <p:nvSpPr>
-          <p:cNvPr id="173" name="Google Shape;173;p28"/>
-          <p:cNvSpPr txBox="1"/>
-          <p:nvPr>
-            <p:ph type="ctrTitle"/>
-          </p:nvPr>
-        </p:nvSpPr>
-        <p:spPr>
-          <a:xfrm>
-            <a:off x="311700" y="2184750"/>
-            <a:ext cx="8520600" cy="774000"/>
-          </a:xfrm>
-          <a:prstGeom prst="rect">
-            <a:avLst/>
-          </a:prstGeom>
-        </p:spPr>
-        <p:txBody>
-          <a:bodyPr anchorCtr="0" anchor="b" bIns="91425" lIns="91425" spcFirstLastPara="1" rIns="91425" wrap="square" tIns="91425">
-            <a:noAutofit/>
-          </a:bodyPr>
-          <a:lstStyle/>
-          <a:p>
-            <a:pPr indent="0" lvl="0" marL="0" rtl="0" algn="ctr">
-              <a:spcBef>
-                <a:spcPts val="0"/>
-              </a:spcBef>
-              <a:spcAft>
-                <a:spcPts val="0"/>
-              </a:spcAft>
-              <a:buNone/>
-            </a:pPr>
-            <a:r>
-              <a:rPr lang="en"/>
-              <a:t>Breaking Down an App into Components</a:t>
-            </a:r>
-            <a:endParaRPr/>
-          </a:p>
-        </p:txBody>
-      </p:sp>
-    </p:spTree>
-  </p:cSld>
-  <p:clrMapOvr>
-    <a:masterClrMapping/>
-  </p:clrMapOvr>
-</p:sld>
-</file>
-
-<file path=ppt/slides/slide17.xml><?xml version="1.0" encoding="utf-8"?>
 <p:sld xmlns:a="http://schemas.openxmlformats.org/drawingml/2006/main" xmlns:r="http://schemas.openxmlformats.org/officeDocument/2006/relationships" xmlns:mc="http://schemas.openxmlformats.org/markup-compatibility/2006" xmlns:mv="urn:schemas-microsoft-com:mac:vml" xmlns:p="http://schemas.openxmlformats.org/presentationml/2006/main" xmlns:c="http://schemas.openxmlformats.org/drawingml/2006/chart" xmlns:dgm="http://schemas.openxmlformats.org/drawingml/2006/diagram" xmlns:o="urn:schemas-microsoft-com:office:office" xmlns:v="urn:schemas-microsoft-com:vml" xmlns:pvml="urn:schemas-microsoft-com:office:powerpoint" xmlns:com="http://schemas.openxmlformats.org/drawingml/2006/compatibility" xmlns:p14="http://schemas.microsoft.com/office/powerpoint/2010/main" xmlns:p15="http://schemas.microsoft.com/office/powerpoint/2012/main" xmlns:ahyp="http://schemas.microsoft.com/office/drawing/2018/hyperlinkcolor">
   <p:cSld>
     <p:spTree>
@@ -12033,7 +12502,7 @@
       </p:grpSpPr>
       <p:sp>
         <p:nvSpPr>
-          <p:cNvPr id="178" name="Google Shape;178;p29"/>
+          <p:cNvPr id="178" name="Google Shape;178;p27"/>
           <p:cNvSpPr txBox="1"/>
           <p:nvPr>
             <p:ph type="ctrTitle"/>
@@ -12065,11 +12534,7 @@
             </a:pPr>
             <a:r>
               <a:rPr lang="en"/>
-              <a:t>Exercise</a:t>
-            </a:r>
-            <a:r>
-              <a:rPr lang="en"/>
-              <a:t>: Create Components</a:t>
+              <a:t>Build a React App w/ TypeScript</a:t>
             </a:r>
             <a:endParaRPr/>
           </a:p>
@@ -12083,7 +12548,7 @@
 </p:sld>
 </file>
 
-<file path=ppt/slides/slide18.xml><?xml version="1.0" encoding="utf-8"?>
+<file path=ppt/slides/slide16.xml><?xml version="1.0" encoding="utf-8"?>
 <p:sld xmlns:a="http://schemas.openxmlformats.org/drawingml/2006/main" xmlns:r="http://schemas.openxmlformats.org/officeDocument/2006/relationships" xmlns:mc="http://schemas.openxmlformats.org/markup-compatibility/2006" xmlns:mv="urn:schemas-microsoft-com:mac:vml" xmlns:p="http://schemas.openxmlformats.org/presentationml/2006/main" xmlns:c="http://schemas.openxmlformats.org/drawingml/2006/chart" xmlns:dgm="http://schemas.openxmlformats.org/drawingml/2006/diagram" xmlns:o="urn:schemas-microsoft-com:office:office" xmlns:v="urn:schemas-microsoft-com:vml" xmlns:pvml="urn:schemas-microsoft-com:office:powerpoint" xmlns:com="http://schemas.openxmlformats.org/drawingml/2006/compatibility" xmlns:p14="http://schemas.microsoft.com/office/powerpoint/2010/main" xmlns:p15="http://schemas.microsoft.com/office/powerpoint/2012/main" xmlns:ahyp="http://schemas.microsoft.com/office/drawing/2018/hyperlinkcolor">
   <p:cSld>
     <p:spTree>
@@ -12100,34 +12565,46 @@
           <a:chExt cx="0" cy="0"/>
         </a:xfrm>
       </p:grpSpPr>
-      <p:pic>
-        <p:nvPicPr>
-          <p:cNvPr id="183" name="Google Shape;183;p30"/>
-          <p:cNvPicPr preferRelativeResize="0"/>
-          <p:nvPr/>
-        </p:nvPicPr>
-        <p:blipFill>
-          <a:blip r:embed="rId3">
-            <a:alphaModFix/>
-          </a:blip>
-          <a:stretch>
-            <a:fillRect/>
-          </a:stretch>
-        </p:blipFill>
-        <p:spPr>
-          <a:xfrm>
-            <a:off x="152400" y="152400"/>
-            <a:ext cx="8839199" cy="3852014"/>
+      <p:sp>
+        <p:nvSpPr>
+          <p:cNvPr id="183" name="Google Shape;183;p28"/>
+          <p:cNvSpPr txBox="1"/>
+          <p:nvPr>
+            <p:ph type="ctrTitle"/>
+          </p:nvPr>
+        </p:nvSpPr>
+        <p:spPr>
+          <a:xfrm>
+            <a:off x="311700" y="2184750"/>
+            <a:ext cx="8520600" cy="774000"/>
           </a:xfrm>
           <a:prstGeom prst="rect">
             <a:avLst/>
           </a:prstGeom>
-          <a:noFill/>
-          <a:ln>
-            <a:noFill/>
-          </a:ln>
-        </p:spPr>
-      </p:pic>
+        </p:spPr>
+        <p:txBody>
+          <a:bodyPr anchorCtr="0" anchor="b" bIns="91425" lIns="91425" spcFirstLastPara="1" rIns="91425" wrap="square" tIns="91425">
+            <a:noAutofit/>
+          </a:bodyPr>
+          <a:lstStyle/>
+          <a:p>
+            <a:pPr indent="0" lvl="0" marL="0" rtl="0" algn="ctr">
+              <a:spcBef>
+                <a:spcPts val="0"/>
+              </a:spcBef>
+              <a:spcAft>
+                <a:spcPts val="0"/>
+              </a:spcAft>
+              <a:buNone/>
+            </a:pPr>
+            <a:r>
+              <a:rPr lang="en"/>
+              <a:t>ReactJS Setup</a:t>
+            </a:r>
+            <a:endParaRPr/>
+          </a:p>
+        </p:txBody>
+      </p:sp>
     </p:spTree>
   </p:cSld>
   <p:clrMapOvr>
@@ -12136,7 +12613,7 @@
 </p:sld>
 </file>
 
-<file path=ppt/slides/slide19.xml><?xml version="1.0" encoding="utf-8"?>
+<file path=ppt/slides/slide17.xml><?xml version="1.0" encoding="utf-8"?>
 <p:sld xmlns:a="http://schemas.openxmlformats.org/drawingml/2006/main" xmlns:r="http://schemas.openxmlformats.org/officeDocument/2006/relationships" xmlns:mc="http://schemas.openxmlformats.org/markup-compatibility/2006" xmlns:mv="urn:schemas-microsoft-com:mac:vml" xmlns:p="http://schemas.openxmlformats.org/presentationml/2006/main" xmlns:c="http://schemas.openxmlformats.org/drawingml/2006/chart" xmlns:dgm="http://schemas.openxmlformats.org/drawingml/2006/diagram" xmlns:o="urn:schemas-microsoft-com:office:office" xmlns:v="urn:schemas-microsoft-com:vml" xmlns:pvml="urn:schemas-microsoft-com:office:powerpoint" xmlns:com="http://schemas.openxmlformats.org/drawingml/2006/compatibility" xmlns:p14="http://schemas.microsoft.com/office/powerpoint/2010/main" xmlns:p15="http://schemas.microsoft.com/office/powerpoint/2012/main" xmlns:ahyp="http://schemas.microsoft.com/office/drawing/2018/hyperlinkcolor">
   <p:cSld>
     <p:spTree>
@@ -12153,9 +12630,143 @@
           <a:chExt cx="0" cy="0"/>
         </a:xfrm>
       </p:grpSpPr>
+      <p:sp>
+        <p:nvSpPr>
+          <p:cNvPr id="188" name="Google Shape;188;p29"/>
+          <p:cNvSpPr txBox="1"/>
+          <p:nvPr>
+            <p:ph type="ctrTitle"/>
+          </p:nvPr>
+        </p:nvSpPr>
+        <p:spPr>
+          <a:xfrm>
+            <a:off x="311700" y="2184750"/>
+            <a:ext cx="8520600" cy="774000"/>
+          </a:xfrm>
+          <a:prstGeom prst="rect">
+            <a:avLst/>
+          </a:prstGeom>
+        </p:spPr>
+        <p:txBody>
+          <a:bodyPr anchorCtr="0" anchor="b" bIns="91425" lIns="91425" spcFirstLastPara="1" rIns="91425" wrap="square" tIns="91425">
+            <a:noAutofit/>
+          </a:bodyPr>
+          <a:lstStyle/>
+          <a:p>
+            <a:pPr indent="0" lvl="0" marL="0" rtl="0" algn="ctr">
+              <a:spcBef>
+                <a:spcPts val="0"/>
+              </a:spcBef>
+              <a:spcAft>
+                <a:spcPts val="0"/>
+              </a:spcAft>
+              <a:buNone/>
+            </a:pPr>
+            <a:r>
+              <a:rPr lang="en"/>
+              <a:t>Breaking Down an App into Components</a:t>
+            </a:r>
+            <a:endParaRPr/>
+          </a:p>
+        </p:txBody>
+      </p:sp>
+    </p:spTree>
+  </p:cSld>
+  <p:clrMapOvr>
+    <a:masterClrMapping/>
+  </p:clrMapOvr>
+</p:sld>
+</file>
+
+<file path=ppt/slides/slide18.xml><?xml version="1.0" encoding="utf-8"?>
+<p:sld xmlns:a="http://schemas.openxmlformats.org/drawingml/2006/main" xmlns:r="http://schemas.openxmlformats.org/officeDocument/2006/relationships" xmlns:mc="http://schemas.openxmlformats.org/markup-compatibility/2006" xmlns:mv="urn:schemas-microsoft-com:mac:vml" xmlns:p="http://schemas.openxmlformats.org/presentationml/2006/main" xmlns:c="http://schemas.openxmlformats.org/drawingml/2006/chart" xmlns:dgm="http://schemas.openxmlformats.org/drawingml/2006/diagram" xmlns:o="urn:schemas-microsoft-com:office:office" xmlns:v="urn:schemas-microsoft-com:vml" xmlns:pvml="urn:schemas-microsoft-com:office:powerpoint" xmlns:com="http://schemas.openxmlformats.org/drawingml/2006/compatibility" xmlns:p14="http://schemas.microsoft.com/office/powerpoint/2010/main" xmlns:p15="http://schemas.microsoft.com/office/powerpoint/2012/main" xmlns:ahyp="http://schemas.microsoft.com/office/drawing/2018/hyperlinkcolor">
+  <p:cSld>
+    <p:spTree>
+      <p:nvGrpSpPr>
+        <p:cNvPr id="192" name="Shape 192"/>
+        <p:cNvGrpSpPr/>
+        <p:nvPr/>
+      </p:nvGrpSpPr>
+      <p:grpSpPr>
+        <a:xfrm>
+          <a:off x="0" y="0"/>
+          <a:ext cx="0" cy="0"/>
+          <a:chOff x="0" y="0"/>
+          <a:chExt cx="0" cy="0"/>
+        </a:xfrm>
+      </p:grpSpPr>
+      <p:sp>
+        <p:nvSpPr>
+          <p:cNvPr id="193" name="Google Shape;193;p30"/>
+          <p:cNvSpPr txBox="1"/>
+          <p:nvPr>
+            <p:ph type="ctrTitle"/>
+          </p:nvPr>
+        </p:nvSpPr>
+        <p:spPr>
+          <a:xfrm>
+            <a:off x="311700" y="2184750"/>
+            <a:ext cx="8520600" cy="774000"/>
+          </a:xfrm>
+          <a:prstGeom prst="rect">
+            <a:avLst/>
+          </a:prstGeom>
+        </p:spPr>
+        <p:txBody>
+          <a:bodyPr anchorCtr="0" anchor="b" bIns="91425" lIns="91425" spcFirstLastPara="1" rIns="91425" wrap="square" tIns="91425">
+            <a:noAutofit/>
+          </a:bodyPr>
+          <a:lstStyle/>
+          <a:p>
+            <a:pPr indent="0" lvl="0" marL="0" rtl="0" algn="ctr">
+              <a:spcBef>
+                <a:spcPts val="0"/>
+              </a:spcBef>
+              <a:spcAft>
+                <a:spcPts val="0"/>
+              </a:spcAft>
+              <a:buNone/>
+            </a:pPr>
+            <a:r>
+              <a:rPr lang="en"/>
+              <a:t>Exercise</a:t>
+            </a:r>
+            <a:r>
+              <a:rPr lang="en"/>
+              <a:t>: Create Components</a:t>
+            </a:r>
+            <a:endParaRPr/>
+          </a:p>
+        </p:txBody>
+      </p:sp>
+    </p:spTree>
+  </p:cSld>
+  <p:clrMapOvr>
+    <a:masterClrMapping/>
+  </p:clrMapOvr>
+</p:sld>
+</file>
+
+<file path=ppt/slides/slide19.xml><?xml version="1.0" encoding="utf-8"?>
+<p:sld xmlns:a="http://schemas.openxmlformats.org/drawingml/2006/main" xmlns:r="http://schemas.openxmlformats.org/officeDocument/2006/relationships" xmlns:mc="http://schemas.openxmlformats.org/markup-compatibility/2006" xmlns:mv="urn:schemas-microsoft-com:mac:vml" xmlns:p="http://schemas.openxmlformats.org/presentationml/2006/main" xmlns:c="http://schemas.openxmlformats.org/drawingml/2006/chart" xmlns:dgm="http://schemas.openxmlformats.org/drawingml/2006/diagram" xmlns:o="urn:schemas-microsoft-com:office:office" xmlns:v="urn:schemas-microsoft-com:vml" xmlns:pvml="urn:schemas-microsoft-com:office:powerpoint" xmlns:com="http://schemas.openxmlformats.org/drawingml/2006/compatibility" xmlns:p14="http://schemas.microsoft.com/office/powerpoint/2010/main" xmlns:p15="http://schemas.microsoft.com/office/powerpoint/2012/main" xmlns:ahyp="http://schemas.microsoft.com/office/drawing/2018/hyperlinkcolor">
+  <p:cSld>
+    <p:spTree>
+      <p:nvGrpSpPr>
+        <p:cNvPr id="197" name="Shape 197"/>
+        <p:cNvGrpSpPr/>
+        <p:nvPr/>
+      </p:nvGrpSpPr>
+      <p:grpSpPr>
+        <a:xfrm>
+          <a:off x="0" y="0"/>
+          <a:ext cx="0" cy="0"/>
+          <a:chOff x="0" y="0"/>
+          <a:chExt cx="0" cy="0"/>
+        </a:xfrm>
+      </p:grpSpPr>
       <p:pic>
         <p:nvPicPr>
-          <p:cNvPr id="188" name="Google Shape;188;p31"/>
+          <p:cNvPr id="198" name="Google Shape;198;p31"/>
           <p:cNvPicPr preferRelativeResize="0"/>
           <p:nvPr/>
         </p:nvPicPr>
@@ -12170,7 +12781,7 @@
         <p:spPr>
           <a:xfrm>
             <a:off x="152400" y="152400"/>
-            <a:ext cx="8839202" cy="3975111"/>
+            <a:ext cx="8839199" cy="3852014"/>
           </a:xfrm>
           <a:prstGeom prst="rect">
             <a:avLst/>
@@ -12718,7 +13329,7 @@
   <p:cSld>
     <p:spTree>
       <p:nvGrpSpPr>
-        <p:cNvPr id="192" name="Shape 192"/>
+        <p:cNvPr id="202" name="Shape 202"/>
         <p:cNvGrpSpPr/>
         <p:nvPr/>
       </p:nvGrpSpPr>
@@ -12730,46 +13341,34 @@
           <a:chExt cx="0" cy="0"/>
         </a:xfrm>
       </p:grpSpPr>
-      <p:sp>
-        <p:nvSpPr>
-          <p:cNvPr id="193" name="Google Shape;193;p32"/>
-          <p:cNvSpPr txBox="1"/>
-          <p:nvPr>
-            <p:ph type="ctrTitle"/>
-          </p:nvPr>
-        </p:nvSpPr>
-        <p:spPr>
-          <a:xfrm>
-            <a:off x="311700" y="2184750"/>
-            <a:ext cx="8520600" cy="774000"/>
+      <p:pic>
+        <p:nvPicPr>
+          <p:cNvPr id="203" name="Google Shape;203;p32"/>
+          <p:cNvPicPr preferRelativeResize="0"/>
+          <p:nvPr/>
+        </p:nvPicPr>
+        <p:blipFill>
+          <a:blip r:embed="rId3">
+            <a:alphaModFix/>
+          </a:blip>
+          <a:stretch>
+            <a:fillRect/>
+          </a:stretch>
+        </p:blipFill>
+        <p:spPr>
+          <a:xfrm>
+            <a:off x="152400" y="152400"/>
+            <a:ext cx="8839202" cy="3975111"/>
           </a:xfrm>
           <a:prstGeom prst="rect">
             <a:avLst/>
           </a:prstGeom>
-        </p:spPr>
-        <p:txBody>
-          <a:bodyPr anchorCtr="0" anchor="b" bIns="91425" lIns="91425" spcFirstLastPara="1" rIns="91425" wrap="square" tIns="91425">
-            <a:noAutofit/>
-          </a:bodyPr>
-          <a:lstStyle/>
-          <a:p>
-            <a:pPr indent="0" lvl="0" marL="0" rtl="0" algn="ctr">
-              <a:spcBef>
-                <a:spcPts val="0"/>
-              </a:spcBef>
-              <a:spcAft>
-                <a:spcPts val="0"/>
-              </a:spcAft>
-              <a:buNone/>
-            </a:pPr>
-            <a:r>
-              <a:rPr lang="en"/>
-              <a:t>Variables within Components</a:t>
-            </a:r>
-            <a:endParaRPr/>
-          </a:p>
-        </p:txBody>
-      </p:sp>
+          <a:noFill/>
+          <a:ln>
+            <a:noFill/>
+          </a:ln>
+        </p:spPr>
+      </p:pic>
     </p:spTree>
   </p:cSld>
   <p:clrMapOvr>
@@ -12783,7 +13382,7 @@
   <p:cSld>
     <p:spTree>
       <p:nvGrpSpPr>
-        <p:cNvPr id="197" name="Shape 197"/>
+        <p:cNvPr id="207" name="Shape 207"/>
         <p:cNvGrpSpPr/>
         <p:nvPr/>
       </p:nvGrpSpPr>
@@ -12797,7 +13396,7 @@
       </p:grpSpPr>
       <p:sp>
         <p:nvSpPr>
-          <p:cNvPr id="198" name="Google Shape;198;p33"/>
+          <p:cNvPr id="208" name="Google Shape;208;p33"/>
           <p:cNvSpPr txBox="1"/>
           <p:nvPr>
             <p:ph type="ctrTitle"/>
@@ -12805,7 +13404,7 @@
         </p:nvSpPr>
         <p:spPr>
           <a:xfrm>
-            <a:off x="241825" y="828975"/>
+            <a:off x="311700" y="2184750"/>
             <a:ext cx="8520600" cy="774000"/>
           </a:xfrm>
           <a:prstGeom prst="rect">
@@ -12829,40 +13428,12 @@
             </a:pPr>
             <a:r>
               <a:rPr lang="en"/>
-              <a:t>Lunchtime: Be back at 1pm</a:t>
+              <a:t>Variables within Components</a:t>
             </a:r>
             <a:endParaRPr/>
           </a:p>
         </p:txBody>
       </p:sp>
-      <p:pic>
-        <p:nvPicPr>
-          <p:cNvPr id="199" name="Google Shape;199;p33"/>
-          <p:cNvPicPr preferRelativeResize="0"/>
-          <p:nvPr/>
-        </p:nvPicPr>
-        <p:blipFill>
-          <a:blip r:embed="rId3">
-            <a:alphaModFix/>
-          </a:blip>
-          <a:stretch>
-            <a:fillRect/>
-          </a:stretch>
-        </p:blipFill>
-        <p:spPr>
-          <a:xfrm>
-            <a:off x="3413950" y="1984725"/>
-            <a:ext cx="2316100" cy="2669599"/>
-          </a:xfrm>
-          <a:prstGeom prst="rect">
-            <a:avLst/>
-          </a:prstGeom>
-          <a:noFill/>
-          <a:ln>
-            <a:noFill/>
-          </a:ln>
-        </p:spPr>
-      </p:pic>
     </p:spTree>
   </p:cSld>
   <p:clrMapOvr>
@@ -12876,7 +13447,7 @@
   <p:cSld>
     <p:spTree>
       <p:nvGrpSpPr>
-        <p:cNvPr id="203" name="Shape 203"/>
+        <p:cNvPr id="212" name="Shape 212"/>
         <p:cNvGrpSpPr/>
         <p:nvPr/>
       </p:nvGrpSpPr>
@@ -12890,7 +13461,7 @@
       </p:grpSpPr>
       <p:sp>
         <p:nvSpPr>
-          <p:cNvPr id="204" name="Google Shape;204;p34"/>
+          <p:cNvPr id="213" name="Google Shape;213;p34"/>
           <p:cNvSpPr txBox="1"/>
           <p:nvPr>
             <p:ph type="ctrTitle"/>
@@ -12898,7 +13469,7 @@
         </p:nvSpPr>
         <p:spPr>
           <a:xfrm>
-            <a:off x="311700" y="2184750"/>
+            <a:off x="241825" y="828975"/>
             <a:ext cx="8520600" cy="774000"/>
           </a:xfrm>
           <a:prstGeom prst="rect">
@@ -12922,12 +13493,40 @@
             </a:pPr>
             <a:r>
               <a:rPr lang="en"/>
-              <a:t>Exercise: Define Data Interfaces</a:t>
+              <a:t>Lunchtime: Be back at 1pm</a:t>
             </a:r>
             <a:endParaRPr/>
           </a:p>
         </p:txBody>
       </p:sp>
+      <p:pic>
+        <p:nvPicPr>
+          <p:cNvPr id="214" name="Google Shape;214;p34"/>
+          <p:cNvPicPr preferRelativeResize="0"/>
+          <p:nvPr/>
+        </p:nvPicPr>
+        <p:blipFill>
+          <a:blip r:embed="rId3">
+            <a:alphaModFix/>
+          </a:blip>
+          <a:stretch>
+            <a:fillRect/>
+          </a:stretch>
+        </p:blipFill>
+        <p:spPr>
+          <a:xfrm>
+            <a:off x="3413950" y="1984725"/>
+            <a:ext cx="2316100" cy="2669599"/>
+          </a:xfrm>
+          <a:prstGeom prst="rect">
+            <a:avLst/>
+          </a:prstGeom>
+          <a:noFill/>
+          <a:ln>
+            <a:noFill/>
+          </a:ln>
+        </p:spPr>
+      </p:pic>
     </p:spTree>
   </p:cSld>
   <p:clrMapOvr>
@@ -12937,136 +13536,6 @@
 </file>
 
 <file path=ppt/slides/slide23.xml><?xml version="1.0" encoding="utf-8"?>
-<p:sld xmlns:a="http://schemas.openxmlformats.org/drawingml/2006/main" xmlns:r="http://schemas.openxmlformats.org/officeDocument/2006/relationships" xmlns:mc="http://schemas.openxmlformats.org/markup-compatibility/2006" xmlns:mv="urn:schemas-microsoft-com:mac:vml" xmlns:p="http://schemas.openxmlformats.org/presentationml/2006/main" xmlns:c="http://schemas.openxmlformats.org/drawingml/2006/chart" xmlns:dgm="http://schemas.openxmlformats.org/drawingml/2006/diagram" xmlns:o="urn:schemas-microsoft-com:office:office" xmlns:v="urn:schemas-microsoft-com:vml" xmlns:pvml="urn:schemas-microsoft-com:office:powerpoint" xmlns:com="http://schemas.openxmlformats.org/drawingml/2006/compatibility" xmlns:p14="http://schemas.microsoft.com/office/powerpoint/2010/main" xmlns:p15="http://schemas.microsoft.com/office/powerpoint/2012/main" xmlns:ahyp="http://schemas.microsoft.com/office/drawing/2018/hyperlinkcolor">
-  <p:cSld>
-    <p:spTree>
-      <p:nvGrpSpPr>
-        <p:cNvPr id="208" name="Shape 208"/>
-        <p:cNvGrpSpPr/>
-        <p:nvPr/>
-      </p:nvGrpSpPr>
-      <p:grpSpPr>
-        <a:xfrm>
-          <a:off x="0" y="0"/>
-          <a:ext cx="0" cy="0"/>
-          <a:chOff x="0" y="0"/>
-          <a:chExt cx="0" cy="0"/>
-        </a:xfrm>
-      </p:grpSpPr>
-      <p:sp>
-        <p:nvSpPr>
-          <p:cNvPr id="209" name="Google Shape;209;p35"/>
-          <p:cNvSpPr txBox="1"/>
-          <p:nvPr>
-            <p:ph type="ctrTitle"/>
-          </p:nvPr>
-        </p:nvSpPr>
-        <p:spPr>
-          <a:xfrm>
-            <a:off x="311700" y="2184750"/>
-            <a:ext cx="8520600" cy="774000"/>
-          </a:xfrm>
-          <a:prstGeom prst="rect">
-            <a:avLst/>
-          </a:prstGeom>
-        </p:spPr>
-        <p:txBody>
-          <a:bodyPr anchorCtr="0" anchor="b" bIns="91425" lIns="91425" spcFirstLastPara="1" rIns="91425" wrap="square" tIns="91425">
-            <a:noAutofit/>
-          </a:bodyPr>
-          <a:lstStyle/>
-          <a:p>
-            <a:pPr indent="0" lvl="0" marL="0" rtl="0" algn="ctr">
-              <a:spcBef>
-                <a:spcPts val="0"/>
-              </a:spcBef>
-              <a:spcAft>
-                <a:spcPts val="0"/>
-              </a:spcAft>
-              <a:buNone/>
-            </a:pPr>
-            <a:r>
-              <a:rPr lang="en"/>
-              <a:t>Exercise: Mock Data</a:t>
-            </a:r>
-            <a:endParaRPr/>
-          </a:p>
-        </p:txBody>
-      </p:sp>
-    </p:spTree>
-  </p:cSld>
-  <p:clrMapOvr>
-    <a:masterClrMapping/>
-  </p:clrMapOvr>
-</p:sld>
-</file>
-
-<file path=ppt/slides/slide24.xml><?xml version="1.0" encoding="utf-8"?>
-<p:sld xmlns:a="http://schemas.openxmlformats.org/drawingml/2006/main" xmlns:r="http://schemas.openxmlformats.org/officeDocument/2006/relationships" xmlns:mc="http://schemas.openxmlformats.org/markup-compatibility/2006" xmlns:mv="urn:schemas-microsoft-com:mac:vml" xmlns:p="http://schemas.openxmlformats.org/presentationml/2006/main" xmlns:c="http://schemas.openxmlformats.org/drawingml/2006/chart" xmlns:dgm="http://schemas.openxmlformats.org/drawingml/2006/diagram" xmlns:o="urn:schemas-microsoft-com:office:office" xmlns:v="urn:schemas-microsoft-com:vml" xmlns:pvml="urn:schemas-microsoft-com:office:powerpoint" xmlns:com="http://schemas.openxmlformats.org/drawingml/2006/compatibility" xmlns:p14="http://schemas.microsoft.com/office/powerpoint/2010/main" xmlns:p15="http://schemas.microsoft.com/office/powerpoint/2012/main" xmlns:ahyp="http://schemas.microsoft.com/office/drawing/2018/hyperlinkcolor">
-  <p:cSld>
-    <p:spTree>
-      <p:nvGrpSpPr>
-        <p:cNvPr id="213" name="Shape 213"/>
-        <p:cNvGrpSpPr/>
-        <p:nvPr/>
-      </p:nvGrpSpPr>
-      <p:grpSpPr>
-        <a:xfrm>
-          <a:off x="0" y="0"/>
-          <a:ext cx="0" cy="0"/>
-          <a:chOff x="0" y="0"/>
-          <a:chExt cx="0" cy="0"/>
-        </a:xfrm>
-      </p:grpSpPr>
-      <p:sp>
-        <p:nvSpPr>
-          <p:cNvPr id="214" name="Google Shape;214;p36"/>
-          <p:cNvSpPr txBox="1"/>
-          <p:nvPr>
-            <p:ph type="ctrTitle"/>
-          </p:nvPr>
-        </p:nvSpPr>
-        <p:spPr>
-          <a:xfrm>
-            <a:off x="311700" y="2184750"/>
-            <a:ext cx="8520600" cy="774000"/>
-          </a:xfrm>
-          <a:prstGeom prst="rect">
-            <a:avLst/>
-          </a:prstGeom>
-        </p:spPr>
-        <p:txBody>
-          <a:bodyPr anchorCtr="0" anchor="b" bIns="91425" lIns="91425" spcFirstLastPara="1" rIns="91425" wrap="square" tIns="91425">
-            <a:noAutofit/>
-          </a:bodyPr>
-          <a:lstStyle/>
-          <a:p>
-            <a:pPr indent="0" lvl="0" marL="0" rtl="0" algn="ctr">
-              <a:spcBef>
-                <a:spcPts val="0"/>
-              </a:spcBef>
-              <a:spcAft>
-                <a:spcPts val="0"/>
-              </a:spcAft>
-              <a:buNone/>
-            </a:pPr>
-            <a:r>
-              <a:rPr lang="en"/>
-              <a:t>State and Props</a:t>
-            </a:r>
-            <a:endParaRPr/>
-          </a:p>
-        </p:txBody>
-      </p:sp>
-    </p:spTree>
-  </p:cSld>
-  <p:clrMapOvr>
-    <a:masterClrMapping/>
-  </p:clrMapOvr>
-</p:sld>
-</file>
-
-<file path=ppt/slides/slide25.xml><?xml version="1.0" encoding="utf-8"?>
 <p:sld xmlns:a="http://schemas.openxmlformats.org/drawingml/2006/main" xmlns:r="http://schemas.openxmlformats.org/officeDocument/2006/relationships" xmlns:mc="http://schemas.openxmlformats.org/markup-compatibility/2006" xmlns:mv="urn:schemas-microsoft-com:mac:vml" xmlns:p="http://schemas.openxmlformats.org/presentationml/2006/main" xmlns:c="http://schemas.openxmlformats.org/drawingml/2006/chart" xmlns:dgm="http://schemas.openxmlformats.org/drawingml/2006/diagram" xmlns:o="urn:schemas-microsoft-com:office:office" xmlns:v="urn:schemas-microsoft-com:vml" xmlns:pvml="urn:schemas-microsoft-com:office:powerpoint" xmlns:com="http://schemas.openxmlformats.org/drawingml/2006/compatibility" xmlns:p14="http://schemas.microsoft.com/office/powerpoint/2010/main" xmlns:p15="http://schemas.microsoft.com/office/powerpoint/2012/main" xmlns:ahyp="http://schemas.microsoft.com/office/drawing/2018/hyperlinkcolor">
   <p:cSld>
     <p:spTree>
@@ -13085,7 +13554,7 @@
       </p:grpSpPr>
       <p:sp>
         <p:nvSpPr>
-          <p:cNvPr id="219" name="Google Shape;219;p37"/>
+          <p:cNvPr id="219" name="Google Shape;219;p35"/>
           <p:cNvSpPr txBox="1"/>
           <p:nvPr>
             <p:ph type="ctrTitle"/>
@@ -13117,7 +13586,7 @@
             </a:pPr>
             <a:r>
               <a:rPr lang="en"/>
-              <a:t>Exercise: Add State to Components</a:t>
+              <a:t>Exercise: Define Data Interfaces</a:t>
             </a:r>
             <a:endParaRPr/>
           </a:p>
@@ -13131,7 +13600,7 @@
 </p:sld>
 </file>
 
-<file path=ppt/slides/slide26.xml><?xml version="1.0" encoding="utf-8"?>
+<file path=ppt/slides/slide24.xml><?xml version="1.0" encoding="utf-8"?>
 <p:sld xmlns:a="http://schemas.openxmlformats.org/drawingml/2006/main" xmlns:r="http://schemas.openxmlformats.org/officeDocument/2006/relationships" xmlns:mc="http://schemas.openxmlformats.org/markup-compatibility/2006" xmlns:mv="urn:schemas-microsoft-com:mac:vml" xmlns:p="http://schemas.openxmlformats.org/presentationml/2006/main" xmlns:c="http://schemas.openxmlformats.org/drawingml/2006/chart" xmlns:dgm="http://schemas.openxmlformats.org/drawingml/2006/diagram" xmlns:o="urn:schemas-microsoft-com:office:office" xmlns:v="urn:schemas-microsoft-com:vml" xmlns:pvml="urn:schemas-microsoft-com:office:powerpoint" xmlns:com="http://schemas.openxmlformats.org/drawingml/2006/compatibility" xmlns:p14="http://schemas.microsoft.com/office/powerpoint/2010/main" xmlns:p15="http://schemas.microsoft.com/office/powerpoint/2012/main" xmlns:ahyp="http://schemas.microsoft.com/office/drawing/2018/hyperlinkcolor">
   <p:cSld>
     <p:spTree>
@@ -13150,7 +13619,7 @@
       </p:grpSpPr>
       <p:sp>
         <p:nvSpPr>
-          <p:cNvPr id="224" name="Google Shape;224;p38"/>
+          <p:cNvPr id="224" name="Google Shape;224;p36"/>
           <p:cNvSpPr txBox="1"/>
           <p:nvPr>
             <p:ph type="ctrTitle"/>
@@ -13182,7 +13651,7 @@
             </a:pPr>
             <a:r>
               <a:rPr lang="en"/>
-              <a:t>Populate App with Data</a:t>
+              <a:t>Exercise: Mock Data</a:t>
             </a:r>
             <a:endParaRPr/>
           </a:p>
@@ -13196,7 +13665,7 @@
 </p:sld>
 </file>
 
-<file path=ppt/slides/slide27.xml><?xml version="1.0" encoding="utf-8"?>
+<file path=ppt/slides/slide25.xml><?xml version="1.0" encoding="utf-8"?>
 <p:sld xmlns:a="http://schemas.openxmlformats.org/drawingml/2006/main" xmlns:r="http://schemas.openxmlformats.org/officeDocument/2006/relationships" xmlns:mc="http://schemas.openxmlformats.org/markup-compatibility/2006" xmlns:mv="urn:schemas-microsoft-com:mac:vml" xmlns:p="http://schemas.openxmlformats.org/presentationml/2006/main" xmlns:c="http://schemas.openxmlformats.org/drawingml/2006/chart" xmlns:dgm="http://schemas.openxmlformats.org/drawingml/2006/diagram" xmlns:o="urn:schemas-microsoft-com:office:office" xmlns:v="urn:schemas-microsoft-com:vml" xmlns:pvml="urn:schemas-microsoft-com:office:powerpoint" xmlns:com="http://schemas.openxmlformats.org/drawingml/2006/compatibility" xmlns:p14="http://schemas.microsoft.com/office/powerpoint/2010/main" xmlns:p15="http://schemas.microsoft.com/office/powerpoint/2012/main" xmlns:ahyp="http://schemas.microsoft.com/office/drawing/2018/hyperlinkcolor">
   <p:cSld>
     <p:spTree>
@@ -13215,7 +13684,7 @@
       </p:grpSpPr>
       <p:sp>
         <p:nvSpPr>
-          <p:cNvPr id="229" name="Google Shape;229;p39"/>
+          <p:cNvPr id="229" name="Google Shape;229;p37"/>
           <p:cNvSpPr txBox="1"/>
           <p:nvPr>
             <p:ph type="ctrTitle"/>
@@ -13247,11 +13716,7 @@
             </a:pPr>
             <a:r>
               <a:rPr lang="en"/>
-              <a:t>Exercise: D</a:t>
-            </a:r>
-            <a:r>
-              <a:rPr lang="en"/>
-              <a:t>ynamically Populate Your Catalog</a:t>
+              <a:t>State and Props</a:t>
             </a:r>
             <a:endParaRPr/>
           </a:p>
@@ -13265,7 +13730,7 @@
 </p:sld>
 </file>
 
-<file path=ppt/slides/slide28.xml><?xml version="1.0" encoding="utf-8"?>
+<file path=ppt/slides/slide26.xml><?xml version="1.0" encoding="utf-8"?>
 <p:sld xmlns:a="http://schemas.openxmlformats.org/drawingml/2006/main" xmlns:r="http://schemas.openxmlformats.org/officeDocument/2006/relationships" xmlns:mc="http://schemas.openxmlformats.org/markup-compatibility/2006" xmlns:mv="urn:schemas-microsoft-com:mac:vml" xmlns:p="http://schemas.openxmlformats.org/presentationml/2006/main" xmlns:c="http://schemas.openxmlformats.org/drawingml/2006/chart" xmlns:dgm="http://schemas.openxmlformats.org/drawingml/2006/diagram" xmlns:o="urn:schemas-microsoft-com:office:office" xmlns:v="urn:schemas-microsoft-com:vml" xmlns:pvml="urn:schemas-microsoft-com:office:powerpoint" xmlns:com="http://schemas.openxmlformats.org/drawingml/2006/compatibility" xmlns:p14="http://schemas.microsoft.com/office/powerpoint/2010/main" xmlns:p15="http://schemas.microsoft.com/office/powerpoint/2012/main" xmlns:ahyp="http://schemas.microsoft.com/office/drawing/2018/hyperlinkcolor">
   <p:cSld>
     <p:spTree>
@@ -13284,7 +13749,206 @@
       </p:grpSpPr>
       <p:sp>
         <p:nvSpPr>
-          <p:cNvPr id="234" name="Google Shape;234;p40"/>
+          <p:cNvPr id="234" name="Google Shape;234;p38"/>
+          <p:cNvSpPr txBox="1"/>
+          <p:nvPr>
+            <p:ph type="ctrTitle"/>
+          </p:nvPr>
+        </p:nvSpPr>
+        <p:spPr>
+          <a:xfrm>
+            <a:off x="311700" y="2184750"/>
+            <a:ext cx="8520600" cy="774000"/>
+          </a:xfrm>
+          <a:prstGeom prst="rect">
+            <a:avLst/>
+          </a:prstGeom>
+        </p:spPr>
+        <p:txBody>
+          <a:bodyPr anchorCtr="0" anchor="b" bIns="91425" lIns="91425" spcFirstLastPara="1" rIns="91425" wrap="square" tIns="91425">
+            <a:noAutofit/>
+          </a:bodyPr>
+          <a:lstStyle/>
+          <a:p>
+            <a:pPr indent="0" lvl="0" marL="0" rtl="0" algn="ctr">
+              <a:spcBef>
+                <a:spcPts val="0"/>
+              </a:spcBef>
+              <a:spcAft>
+                <a:spcPts val="0"/>
+              </a:spcAft>
+              <a:buNone/>
+            </a:pPr>
+            <a:r>
+              <a:rPr lang="en"/>
+              <a:t>Exercise: Add State to Components</a:t>
+            </a:r>
+            <a:endParaRPr/>
+          </a:p>
+        </p:txBody>
+      </p:sp>
+    </p:spTree>
+  </p:cSld>
+  <p:clrMapOvr>
+    <a:masterClrMapping/>
+  </p:clrMapOvr>
+</p:sld>
+</file>
+
+<file path=ppt/slides/slide27.xml><?xml version="1.0" encoding="utf-8"?>
+<p:sld xmlns:a="http://schemas.openxmlformats.org/drawingml/2006/main" xmlns:r="http://schemas.openxmlformats.org/officeDocument/2006/relationships" xmlns:mc="http://schemas.openxmlformats.org/markup-compatibility/2006" xmlns:mv="urn:schemas-microsoft-com:mac:vml" xmlns:p="http://schemas.openxmlformats.org/presentationml/2006/main" xmlns:c="http://schemas.openxmlformats.org/drawingml/2006/chart" xmlns:dgm="http://schemas.openxmlformats.org/drawingml/2006/diagram" xmlns:o="urn:schemas-microsoft-com:office:office" xmlns:v="urn:schemas-microsoft-com:vml" xmlns:pvml="urn:schemas-microsoft-com:office:powerpoint" xmlns:com="http://schemas.openxmlformats.org/drawingml/2006/compatibility" xmlns:p14="http://schemas.microsoft.com/office/powerpoint/2010/main" xmlns:p15="http://schemas.microsoft.com/office/powerpoint/2012/main" xmlns:ahyp="http://schemas.microsoft.com/office/drawing/2018/hyperlinkcolor">
+  <p:cSld>
+    <p:spTree>
+      <p:nvGrpSpPr>
+        <p:cNvPr id="238" name="Shape 238"/>
+        <p:cNvGrpSpPr/>
+        <p:nvPr/>
+      </p:nvGrpSpPr>
+      <p:grpSpPr>
+        <a:xfrm>
+          <a:off x="0" y="0"/>
+          <a:ext cx="0" cy="0"/>
+          <a:chOff x="0" y="0"/>
+          <a:chExt cx="0" cy="0"/>
+        </a:xfrm>
+      </p:grpSpPr>
+      <p:sp>
+        <p:nvSpPr>
+          <p:cNvPr id="239" name="Google Shape;239;p39"/>
+          <p:cNvSpPr txBox="1"/>
+          <p:nvPr>
+            <p:ph type="ctrTitle"/>
+          </p:nvPr>
+        </p:nvSpPr>
+        <p:spPr>
+          <a:xfrm>
+            <a:off x="311700" y="2184750"/>
+            <a:ext cx="8520600" cy="774000"/>
+          </a:xfrm>
+          <a:prstGeom prst="rect">
+            <a:avLst/>
+          </a:prstGeom>
+        </p:spPr>
+        <p:txBody>
+          <a:bodyPr anchorCtr="0" anchor="b" bIns="91425" lIns="91425" spcFirstLastPara="1" rIns="91425" wrap="square" tIns="91425">
+            <a:noAutofit/>
+          </a:bodyPr>
+          <a:lstStyle/>
+          <a:p>
+            <a:pPr indent="0" lvl="0" marL="0" rtl="0" algn="ctr">
+              <a:spcBef>
+                <a:spcPts val="0"/>
+              </a:spcBef>
+              <a:spcAft>
+                <a:spcPts val="0"/>
+              </a:spcAft>
+              <a:buNone/>
+            </a:pPr>
+            <a:r>
+              <a:rPr lang="en"/>
+              <a:t>Populate App with Data</a:t>
+            </a:r>
+            <a:endParaRPr/>
+          </a:p>
+        </p:txBody>
+      </p:sp>
+    </p:spTree>
+  </p:cSld>
+  <p:clrMapOvr>
+    <a:masterClrMapping/>
+  </p:clrMapOvr>
+</p:sld>
+</file>
+
+<file path=ppt/slides/slide28.xml><?xml version="1.0" encoding="utf-8"?>
+<p:sld xmlns:a="http://schemas.openxmlformats.org/drawingml/2006/main" xmlns:r="http://schemas.openxmlformats.org/officeDocument/2006/relationships" xmlns:mc="http://schemas.openxmlformats.org/markup-compatibility/2006" xmlns:mv="urn:schemas-microsoft-com:mac:vml" xmlns:p="http://schemas.openxmlformats.org/presentationml/2006/main" xmlns:c="http://schemas.openxmlformats.org/drawingml/2006/chart" xmlns:dgm="http://schemas.openxmlformats.org/drawingml/2006/diagram" xmlns:o="urn:schemas-microsoft-com:office:office" xmlns:v="urn:schemas-microsoft-com:vml" xmlns:pvml="urn:schemas-microsoft-com:office:powerpoint" xmlns:com="http://schemas.openxmlformats.org/drawingml/2006/compatibility" xmlns:p14="http://schemas.microsoft.com/office/powerpoint/2010/main" xmlns:p15="http://schemas.microsoft.com/office/powerpoint/2012/main" xmlns:ahyp="http://schemas.microsoft.com/office/drawing/2018/hyperlinkcolor">
+  <p:cSld>
+    <p:spTree>
+      <p:nvGrpSpPr>
+        <p:cNvPr id="243" name="Shape 243"/>
+        <p:cNvGrpSpPr/>
+        <p:nvPr/>
+      </p:nvGrpSpPr>
+      <p:grpSpPr>
+        <a:xfrm>
+          <a:off x="0" y="0"/>
+          <a:ext cx="0" cy="0"/>
+          <a:chOff x="0" y="0"/>
+          <a:chExt cx="0" cy="0"/>
+        </a:xfrm>
+      </p:grpSpPr>
+      <p:sp>
+        <p:nvSpPr>
+          <p:cNvPr id="244" name="Google Shape;244;p40"/>
+          <p:cNvSpPr txBox="1"/>
+          <p:nvPr>
+            <p:ph type="ctrTitle"/>
+          </p:nvPr>
+        </p:nvSpPr>
+        <p:spPr>
+          <a:xfrm>
+            <a:off x="311700" y="2184750"/>
+            <a:ext cx="8520600" cy="774000"/>
+          </a:xfrm>
+          <a:prstGeom prst="rect">
+            <a:avLst/>
+          </a:prstGeom>
+        </p:spPr>
+        <p:txBody>
+          <a:bodyPr anchorCtr="0" anchor="b" bIns="91425" lIns="91425" spcFirstLastPara="1" rIns="91425" wrap="square" tIns="91425">
+            <a:noAutofit/>
+          </a:bodyPr>
+          <a:lstStyle/>
+          <a:p>
+            <a:pPr indent="0" lvl="0" marL="0" rtl="0" algn="ctr">
+              <a:spcBef>
+                <a:spcPts val="0"/>
+              </a:spcBef>
+              <a:spcAft>
+                <a:spcPts val="0"/>
+              </a:spcAft>
+              <a:buNone/>
+            </a:pPr>
+            <a:r>
+              <a:rPr lang="en"/>
+              <a:t>Exercise: D</a:t>
+            </a:r>
+            <a:r>
+              <a:rPr lang="en"/>
+              <a:t>ynamically Populate Your Catalog</a:t>
+            </a:r>
+            <a:endParaRPr/>
+          </a:p>
+        </p:txBody>
+      </p:sp>
+    </p:spTree>
+  </p:cSld>
+  <p:clrMapOvr>
+    <a:masterClrMapping/>
+  </p:clrMapOvr>
+</p:sld>
+</file>
+
+<file path=ppt/slides/slide29.xml><?xml version="1.0" encoding="utf-8"?>
+<p:sld xmlns:a="http://schemas.openxmlformats.org/drawingml/2006/main" xmlns:r="http://schemas.openxmlformats.org/officeDocument/2006/relationships" xmlns:mc="http://schemas.openxmlformats.org/markup-compatibility/2006" xmlns:mv="urn:schemas-microsoft-com:mac:vml" xmlns:p="http://schemas.openxmlformats.org/presentationml/2006/main" xmlns:c="http://schemas.openxmlformats.org/drawingml/2006/chart" xmlns:dgm="http://schemas.openxmlformats.org/drawingml/2006/diagram" xmlns:o="urn:schemas-microsoft-com:office:office" xmlns:v="urn:schemas-microsoft-com:vml" xmlns:pvml="urn:schemas-microsoft-com:office:powerpoint" xmlns:com="http://schemas.openxmlformats.org/drawingml/2006/compatibility" xmlns:p14="http://schemas.microsoft.com/office/powerpoint/2010/main" xmlns:p15="http://schemas.microsoft.com/office/powerpoint/2012/main" xmlns:ahyp="http://schemas.microsoft.com/office/drawing/2018/hyperlinkcolor">
+  <p:cSld>
+    <p:spTree>
+      <p:nvGrpSpPr>
+        <p:cNvPr id="248" name="Shape 248"/>
+        <p:cNvGrpSpPr/>
+        <p:nvPr/>
+      </p:nvGrpSpPr>
+      <p:grpSpPr>
+        <a:xfrm>
+          <a:off x="0" y="0"/>
+          <a:ext cx="0" cy="0"/>
+          <a:chOff x="0" y="0"/>
+          <a:chExt cx="0" cy="0"/>
+        </a:xfrm>
+      </p:grpSpPr>
+      <p:sp>
+        <p:nvSpPr>
+          <p:cNvPr id="249" name="Google Shape;249;p41"/>
           <p:cNvSpPr txBox="1"/>
           <p:nvPr>
             <p:ph type="title"/>
@@ -13324,7 +13988,7 @@
       </p:sp>
       <p:pic>
         <p:nvPicPr>
-          <p:cNvPr descr="To celebrate 100,000 views on my last countdown, I decided to make a brand new one for you to use at your church, youth group, school, or wherever you want!&#10;&#10;Music Used :&#10;TheFatRat - Time Lapse&#10;Tobu - Colors&#10;&#10;Programs used :&#10;Adobe After Effects CC 2014&#10;&#10;Expect more frequent uploads in the future!" id="235" name="Google Shape;235;p40" title="Electric  - 5 Minute Countdown">
+          <p:cNvPr descr="To celebrate 100,000 views on my last countdown, I decided to make a brand new one for you to use at your church, youth group, school, or wherever you want!&#10;&#10;Music Used :&#10;TheFatRat - Time Lapse&#10;Tobu - Colors&#10;&#10;Programs used :&#10;Adobe After Effects CC 2014&#10;&#10;Expect more frequent uploads in the future!" id="250" name="Google Shape;250;p41" title="Electric  - 5 Minute Countdown">
             <a:hlinkClick r:id="rId3"/>
           </p:cNvPr>
           <p:cNvPicPr preferRelativeResize="0"/>
@@ -13352,71 +14016,6 @@
           </a:ln>
         </p:spPr>
       </p:pic>
-    </p:spTree>
-  </p:cSld>
-  <p:clrMapOvr>
-    <a:masterClrMapping/>
-  </p:clrMapOvr>
-</p:sld>
-</file>
-
-<file path=ppt/slides/slide29.xml><?xml version="1.0" encoding="utf-8"?>
-<p:sld xmlns:a="http://schemas.openxmlformats.org/drawingml/2006/main" xmlns:r="http://schemas.openxmlformats.org/officeDocument/2006/relationships" xmlns:mc="http://schemas.openxmlformats.org/markup-compatibility/2006" xmlns:mv="urn:schemas-microsoft-com:mac:vml" xmlns:p="http://schemas.openxmlformats.org/presentationml/2006/main" xmlns:c="http://schemas.openxmlformats.org/drawingml/2006/chart" xmlns:dgm="http://schemas.openxmlformats.org/drawingml/2006/diagram" xmlns:o="urn:schemas-microsoft-com:office:office" xmlns:v="urn:schemas-microsoft-com:vml" xmlns:pvml="urn:schemas-microsoft-com:office:powerpoint" xmlns:com="http://schemas.openxmlformats.org/drawingml/2006/compatibility" xmlns:p14="http://schemas.microsoft.com/office/powerpoint/2010/main" xmlns:p15="http://schemas.microsoft.com/office/powerpoint/2012/main" xmlns:ahyp="http://schemas.microsoft.com/office/drawing/2018/hyperlinkcolor">
-  <p:cSld>
-    <p:spTree>
-      <p:nvGrpSpPr>
-        <p:cNvPr id="239" name="Shape 239"/>
-        <p:cNvGrpSpPr/>
-        <p:nvPr/>
-      </p:nvGrpSpPr>
-      <p:grpSpPr>
-        <a:xfrm>
-          <a:off x="0" y="0"/>
-          <a:ext cx="0" cy="0"/>
-          <a:chOff x="0" y="0"/>
-          <a:chExt cx="0" cy="0"/>
-        </a:xfrm>
-      </p:grpSpPr>
-      <p:sp>
-        <p:nvSpPr>
-          <p:cNvPr id="240" name="Google Shape;240;p41"/>
-          <p:cNvSpPr txBox="1"/>
-          <p:nvPr>
-            <p:ph type="ctrTitle"/>
-          </p:nvPr>
-        </p:nvSpPr>
-        <p:spPr>
-          <a:xfrm>
-            <a:off x="311700" y="2184750"/>
-            <a:ext cx="8520600" cy="774000"/>
-          </a:xfrm>
-          <a:prstGeom prst="rect">
-            <a:avLst/>
-          </a:prstGeom>
-        </p:spPr>
-        <p:txBody>
-          <a:bodyPr anchorCtr="0" anchor="b" bIns="91425" lIns="91425" spcFirstLastPara="1" rIns="91425" wrap="square" tIns="91425">
-            <a:noAutofit/>
-          </a:bodyPr>
-          <a:lstStyle/>
-          <a:p>
-            <a:pPr indent="0" lvl="0" marL="0" rtl="0" algn="ctr">
-              <a:spcBef>
-                <a:spcPts val="0"/>
-              </a:spcBef>
-              <a:spcAft>
-                <a:spcPts val="0"/>
-              </a:spcAft>
-              <a:buNone/>
-            </a:pPr>
-            <a:r>
-              <a:rPr lang="en"/>
-              <a:t>Exercise: Update Product Card UI</a:t>
-            </a:r>
-            <a:endParaRPr/>
-          </a:p>
-        </p:txBody>
-      </p:sp>
     </p:spTree>
   </p:cSld>
   <p:clrMapOvr>
@@ -13611,136 +14210,6 @@
   <p:cSld>
     <p:spTree>
       <p:nvGrpSpPr>
-        <p:cNvPr id="244" name="Shape 244"/>
-        <p:cNvGrpSpPr/>
-        <p:nvPr/>
-      </p:nvGrpSpPr>
-      <p:grpSpPr>
-        <a:xfrm>
-          <a:off x="0" y="0"/>
-          <a:ext cx="0" cy="0"/>
-          <a:chOff x="0" y="0"/>
-          <a:chExt cx="0" cy="0"/>
-        </a:xfrm>
-      </p:grpSpPr>
-      <p:sp>
-        <p:nvSpPr>
-          <p:cNvPr id="245" name="Google Shape;245;p42"/>
-          <p:cNvSpPr txBox="1"/>
-          <p:nvPr>
-            <p:ph type="ctrTitle"/>
-          </p:nvPr>
-        </p:nvSpPr>
-        <p:spPr>
-          <a:xfrm>
-            <a:off x="311700" y="2184750"/>
-            <a:ext cx="8520600" cy="774000"/>
-          </a:xfrm>
-          <a:prstGeom prst="rect">
-            <a:avLst/>
-          </a:prstGeom>
-        </p:spPr>
-        <p:txBody>
-          <a:bodyPr anchorCtr="0" anchor="b" bIns="91425" lIns="91425" spcFirstLastPara="1" rIns="91425" wrap="square" tIns="91425">
-            <a:noAutofit/>
-          </a:bodyPr>
-          <a:lstStyle/>
-          <a:p>
-            <a:pPr indent="0" lvl="0" marL="0" rtl="0" algn="ctr">
-              <a:spcBef>
-                <a:spcPts val="0"/>
-              </a:spcBef>
-              <a:spcAft>
-                <a:spcPts val="0"/>
-              </a:spcAft>
-              <a:buNone/>
-            </a:pPr>
-            <a:r>
-              <a:rPr lang="en"/>
-              <a:t>Passing Data Back to Parent</a:t>
-            </a:r>
-            <a:endParaRPr/>
-          </a:p>
-        </p:txBody>
-      </p:sp>
-    </p:spTree>
-  </p:cSld>
-  <p:clrMapOvr>
-    <a:masterClrMapping/>
-  </p:clrMapOvr>
-</p:sld>
-</file>
-
-<file path=ppt/slides/slide31.xml><?xml version="1.0" encoding="utf-8"?>
-<p:sld xmlns:a="http://schemas.openxmlformats.org/drawingml/2006/main" xmlns:r="http://schemas.openxmlformats.org/officeDocument/2006/relationships" xmlns:mc="http://schemas.openxmlformats.org/markup-compatibility/2006" xmlns:mv="urn:schemas-microsoft-com:mac:vml" xmlns:p="http://schemas.openxmlformats.org/presentationml/2006/main" xmlns:c="http://schemas.openxmlformats.org/drawingml/2006/chart" xmlns:dgm="http://schemas.openxmlformats.org/drawingml/2006/diagram" xmlns:o="urn:schemas-microsoft-com:office:office" xmlns:v="urn:schemas-microsoft-com:vml" xmlns:pvml="urn:schemas-microsoft-com:office:powerpoint" xmlns:com="http://schemas.openxmlformats.org/drawingml/2006/compatibility" xmlns:p14="http://schemas.microsoft.com/office/powerpoint/2010/main" xmlns:p15="http://schemas.microsoft.com/office/powerpoint/2012/main" xmlns:ahyp="http://schemas.microsoft.com/office/drawing/2018/hyperlinkcolor">
-  <p:cSld>
-    <p:spTree>
-      <p:nvGrpSpPr>
-        <p:cNvPr id="249" name="Shape 249"/>
-        <p:cNvGrpSpPr/>
-        <p:nvPr/>
-      </p:nvGrpSpPr>
-      <p:grpSpPr>
-        <a:xfrm>
-          <a:off x="0" y="0"/>
-          <a:ext cx="0" cy="0"/>
-          <a:chOff x="0" y="0"/>
-          <a:chExt cx="0" cy="0"/>
-        </a:xfrm>
-      </p:grpSpPr>
-      <p:sp>
-        <p:nvSpPr>
-          <p:cNvPr id="250" name="Google Shape;250;p43"/>
-          <p:cNvSpPr txBox="1"/>
-          <p:nvPr>
-            <p:ph type="ctrTitle"/>
-          </p:nvPr>
-        </p:nvSpPr>
-        <p:spPr>
-          <a:xfrm>
-            <a:off x="311700" y="2184750"/>
-            <a:ext cx="8520600" cy="774000"/>
-          </a:xfrm>
-          <a:prstGeom prst="rect">
-            <a:avLst/>
-          </a:prstGeom>
-        </p:spPr>
-        <p:txBody>
-          <a:bodyPr anchorCtr="0" anchor="b" bIns="91425" lIns="91425" spcFirstLastPara="1" rIns="91425" wrap="square" tIns="91425">
-            <a:noAutofit/>
-          </a:bodyPr>
-          <a:lstStyle/>
-          <a:p>
-            <a:pPr indent="0" lvl="0" marL="0" rtl="0" algn="ctr">
-              <a:spcBef>
-                <a:spcPts val="0"/>
-              </a:spcBef>
-              <a:spcAft>
-                <a:spcPts val="0"/>
-              </a:spcAft>
-              <a:buNone/>
-            </a:pPr>
-            <a:r>
-              <a:rPr lang="en"/>
-              <a:t>Passing Data to Siblings</a:t>
-            </a:r>
-            <a:endParaRPr/>
-          </a:p>
-        </p:txBody>
-      </p:sp>
-    </p:spTree>
-  </p:cSld>
-  <p:clrMapOvr>
-    <a:masterClrMapping/>
-  </p:clrMapOvr>
-</p:sld>
-</file>
-
-<file path=ppt/slides/slide32.xml><?xml version="1.0" encoding="utf-8"?>
-<p:sld xmlns:a="http://schemas.openxmlformats.org/drawingml/2006/main" xmlns:r="http://schemas.openxmlformats.org/officeDocument/2006/relationships" xmlns:mc="http://schemas.openxmlformats.org/markup-compatibility/2006" xmlns:mv="urn:schemas-microsoft-com:mac:vml" xmlns:p="http://schemas.openxmlformats.org/presentationml/2006/main" xmlns:c="http://schemas.openxmlformats.org/drawingml/2006/chart" xmlns:dgm="http://schemas.openxmlformats.org/drawingml/2006/diagram" xmlns:o="urn:schemas-microsoft-com:office:office" xmlns:v="urn:schemas-microsoft-com:vml" xmlns:pvml="urn:schemas-microsoft-com:office:powerpoint" xmlns:com="http://schemas.openxmlformats.org/drawingml/2006/compatibility" xmlns:p14="http://schemas.microsoft.com/office/powerpoint/2010/main" xmlns:p15="http://schemas.microsoft.com/office/powerpoint/2012/main" xmlns:ahyp="http://schemas.microsoft.com/office/drawing/2018/hyperlinkcolor">
-  <p:cSld>
-    <p:spTree>
-      <p:nvGrpSpPr>
         <p:cNvPr id="254" name="Shape 254"/>
         <p:cNvGrpSpPr/>
         <p:nvPr/>
@@ -13755,7 +14224,7 @@
       </p:grpSpPr>
       <p:sp>
         <p:nvSpPr>
-          <p:cNvPr id="255" name="Google Shape;255;p44"/>
+          <p:cNvPr id="255" name="Google Shape;255;p42"/>
           <p:cNvSpPr txBox="1"/>
           <p:nvPr>
             <p:ph type="ctrTitle"/>
@@ -13787,7 +14256,7 @@
             </a:pPr>
             <a:r>
               <a:rPr lang="en"/>
-              <a:t>Exercise: Update Cart to Show Items Added</a:t>
+              <a:t>Exercise: Update Product Card UI</a:t>
             </a:r>
             <a:endParaRPr/>
           </a:p>
@@ -13801,7 +14270,7 @@
 </p:sld>
 </file>
 
-<file path=ppt/slides/slide33.xml><?xml version="1.0" encoding="utf-8"?>
+<file path=ppt/slides/slide31.xml><?xml version="1.0" encoding="utf-8"?>
 <p:sld xmlns:a="http://schemas.openxmlformats.org/drawingml/2006/main" xmlns:r="http://schemas.openxmlformats.org/officeDocument/2006/relationships" xmlns:mc="http://schemas.openxmlformats.org/markup-compatibility/2006" xmlns:mv="urn:schemas-microsoft-com:mac:vml" xmlns:p="http://schemas.openxmlformats.org/presentationml/2006/main" xmlns:c="http://schemas.openxmlformats.org/drawingml/2006/chart" xmlns:dgm="http://schemas.openxmlformats.org/drawingml/2006/diagram" xmlns:o="urn:schemas-microsoft-com:office:office" xmlns:v="urn:schemas-microsoft-com:vml" xmlns:pvml="urn:schemas-microsoft-com:office:powerpoint" xmlns:com="http://schemas.openxmlformats.org/drawingml/2006/compatibility" xmlns:p14="http://schemas.microsoft.com/office/powerpoint/2010/main" xmlns:p15="http://schemas.microsoft.com/office/powerpoint/2012/main" xmlns:ahyp="http://schemas.microsoft.com/office/drawing/2018/hyperlinkcolor">
   <p:cSld>
     <p:spTree>
@@ -13820,7 +14289,202 @@
       </p:grpSpPr>
       <p:sp>
         <p:nvSpPr>
-          <p:cNvPr id="260" name="Google Shape;260;p45"/>
+          <p:cNvPr id="260" name="Google Shape;260;p43"/>
+          <p:cNvSpPr txBox="1"/>
+          <p:nvPr>
+            <p:ph type="ctrTitle"/>
+          </p:nvPr>
+        </p:nvSpPr>
+        <p:spPr>
+          <a:xfrm>
+            <a:off x="311700" y="2184750"/>
+            <a:ext cx="8520600" cy="774000"/>
+          </a:xfrm>
+          <a:prstGeom prst="rect">
+            <a:avLst/>
+          </a:prstGeom>
+        </p:spPr>
+        <p:txBody>
+          <a:bodyPr anchorCtr="0" anchor="b" bIns="91425" lIns="91425" spcFirstLastPara="1" rIns="91425" wrap="square" tIns="91425">
+            <a:noAutofit/>
+          </a:bodyPr>
+          <a:lstStyle/>
+          <a:p>
+            <a:pPr indent="0" lvl="0" marL="0" rtl="0" algn="ctr">
+              <a:spcBef>
+                <a:spcPts val="0"/>
+              </a:spcBef>
+              <a:spcAft>
+                <a:spcPts val="0"/>
+              </a:spcAft>
+              <a:buNone/>
+            </a:pPr>
+            <a:r>
+              <a:rPr lang="en"/>
+              <a:t>Passing Data Back to Parent</a:t>
+            </a:r>
+            <a:endParaRPr/>
+          </a:p>
+        </p:txBody>
+      </p:sp>
+    </p:spTree>
+  </p:cSld>
+  <p:clrMapOvr>
+    <a:masterClrMapping/>
+  </p:clrMapOvr>
+</p:sld>
+</file>
+
+<file path=ppt/slides/slide32.xml><?xml version="1.0" encoding="utf-8"?>
+<p:sld xmlns:a="http://schemas.openxmlformats.org/drawingml/2006/main" xmlns:r="http://schemas.openxmlformats.org/officeDocument/2006/relationships" xmlns:mc="http://schemas.openxmlformats.org/markup-compatibility/2006" xmlns:mv="urn:schemas-microsoft-com:mac:vml" xmlns:p="http://schemas.openxmlformats.org/presentationml/2006/main" xmlns:c="http://schemas.openxmlformats.org/drawingml/2006/chart" xmlns:dgm="http://schemas.openxmlformats.org/drawingml/2006/diagram" xmlns:o="urn:schemas-microsoft-com:office:office" xmlns:v="urn:schemas-microsoft-com:vml" xmlns:pvml="urn:schemas-microsoft-com:office:powerpoint" xmlns:com="http://schemas.openxmlformats.org/drawingml/2006/compatibility" xmlns:p14="http://schemas.microsoft.com/office/powerpoint/2010/main" xmlns:p15="http://schemas.microsoft.com/office/powerpoint/2012/main" xmlns:ahyp="http://schemas.microsoft.com/office/drawing/2018/hyperlinkcolor">
+  <p:cSld>
+    <p:spTree>
+      <p:nvGrpSpPr>
+        <p:cNvPr id="264" name="Shape 264"/>
+        <p:cNvGrpSpPr/>
+        <p:nvPr/>
+      </p:nvGrpSpPr>
+      <p:grpSpPr>
+        <a:xfrm>
+          <a:off x="0" y="0"/>
+          <a:ext cx="0" cy="0"/>
+          <a:chOff x="0" y="0"/>
+          <a:chExt cx="0" cy="0"/>
+        </a:xfrm>
+      </p:grpSpPr>
+      <p:sp>
+        <p:nvSpPr>
+          <p:cNvPr id="265" name="Google Shape;265;p44"/>
+          <p:cNvSpPr txBox="1"/>
+          <p:nvPr>
+            <p:ph type="ctrTitle"/>
+          </p:nvPr>
+        </p:nvSpPr>
+        <p:spPr>
+          <a:xfrm>
+            <a:off x="311700" y="2184750"/>
+            <a:ext cx="8520600" cy="774000"/>
+          </a:xfrm>
+          <a:prstGeom prst="rect">
+            <a:avLst/>
+          </a:prstGeom>
+        </p:spPr>
+        <p:txBody>
+          <a:bodyPr anchorCtr="0" anchor="b" bIns="91425" lIns="91425" spcFirstLastPara="1" rIns="91425" wrap="square" tIns="91425">
+            <a:noAutofit/>
+          </a:bodyPr>
+          <a:lstStyle/>
+          <a:p>
+            <a:pPr indent="0" lvl="0" marL="0" rtl="0" algn="ctr">
+              <a:spcBef>
+                <a:spcPts val="0"/>
+              </a:spcBef>
+              <a:spcAft>
+                <a:spcPts val="0"/>
+              </a:spcAft>
+              <a:buNone/>
+            </a:pPr>
+            <a:r>
+              <a:rPr lang="en"/>
+              <a:t>Passing Data to Siblings</a:t>
+            </a:r>
+            <a:endParaRPr/>
+          </a:p>
+        </p:txBody>
+      </p:sp>
+    </p:spTree>
+  </p:cSld>
+  <p:clrMapOvr>
+    <a:masterClrMapping/>
+  </p:clrMapOvr>
+</p:sld>
+</file>
+
+<file path=ppt/slides/slide33.xml><?xml version="1.0" encoding="utf-8"?>
+<p:sld xmlns:a="http://schemas.openxmlformats.org/drawingml/2006/main" xmlns:r="http://schemas.openxmlformats.org/officeDocument/2006/relationships" xmlns:mc="http://schemas.openxmlformats.org/markup-compatibility/2006" xmlns:mv="urn:schemas-microsoft-com:mac:vml" xmlns:p="http://schemas.openxmlformats.org/presentationml/2006/main" xmlns:c="http://schemas.openxmlformats.org/drawingml/2006/chart" xmlns:dgm="http://schemas.openxmlformats.org/drawingml/2006/diagram" xmlns:o="urn:schemas-microsoft-com:office:office" xmlns:v="urn:schemas-microsoft-com:vml" xmlns:pvml="urn:schemas-microsoft-com:office:powerpoint" xmlns:com="http://schemas.openxmlformats.org/drawingml/2006/compatibility" xmlns:p14="http://schemas.microsoft.com/office/powerpoint/2010/main" xmlns:p15="http://schemas.microsoft.com/office/powerpoint/2012/main" xmlns:ahyp="http://schemas.microsoft.com/office/drawing/2018/hyperlinkcolor">
+  <p:cSld>
+    <p:spTree>
+      <p:nvGrpSpPr>
+        <p:cNvPr id="269" name="Shape 269"/>
+        <p:cNvGrpSpPr/>
+        <p:nvPr/>
+      </p:nvGrpSpPr>
+      <p:grpSpPr>
+        <a:xfrm>
+          <a:off x="0" y="0"/>
+          <a:ext cx="0" cy="0"/>
+          <a:chOff x="0" y="0"/>
+          <a:chExt cx="0" cy="0"/>
+        </a:xfrm>
+      </p:grpSpPr>
+      <p:sp>
+        <p:nvSpPr>
+          <p:cNvPr id="270" name="Google Shape;270;p45"/>
+          <p:cNvSpPr txBox="1"/>
+          <p:nvPr>
+            <p:ph type="ctrTitle"/>
+          </p:nvPr>
+        </p:nvSpPr>
+        <p:spPr>
+          <a:xfrm>
+            <a:off x="311700" y="2184750"/>
+            <a:ext cx="8520600" cy="774000"/>
+          </a:xfrm>
+          <a:prstGeom prst="rect">
+            <a:avLst/>
+          </a:prstGeom>
+        </p:spPr>
+        <p:txBody>
+          <a:bodyPr anchorCtr="0" anchor="b" bIns="91425" lIns="91425" spcFirstLastPara="1" rIns="91425" wrap="square" tIns="91425">
+            <a:noAutofit/>
+          </a:bodyPr>
+          <a:lstStyle/>
+          <a:p>
+            <a:pPr indent="0" lvl="0" marL="0" rtl="0" algn="ctr">
+              <a:spcBef>
+                <a:spcPts val="0"/>
+              </a:spcBef>
+              <a:spcAft>
+                <a:spcPts val="0"/>
+              </a:spcAft>
+              <a:buNone/>
+            </a:pPr>
+            <a:r>
+              <a:rPr lang="en"/>
+              <a:t>Exercise: Update Cart to Show Items Added</a:t>
+            </a:r>
+            <a:endParaRPr/>
+          </a:p>
+        </p:txBody>
+      </p:sp>
+    </p:spTree>
+  </p:cSld>
+  <p:clrMapOvr>
+    <a:masterClrMapping/>
+  </p:clrMapOvr>
+</p:sld>
+</file>
+
+<file path=ppt/slides/slide34.xml><?xml version="1.0" encoding="utf-8"?>
+<p:sld xmlns:a="http://schemas.openxmlformats.org/drawingml/2006/main" xmlns:r="http://schemas.openxmlformats.org/officeDocument/2006/relationships" xmlns:mc="http://schemas.openxmlformats.org/markup-compatibility/2006" xmlns:mv="urn:schemas-microsoft-com:mac:vml" xmlns:p="http://schemas.openxmlformats.org/presentationml/2006/main" xmlns:c="http://schemas.openxmlformats.org/drawingml/2006/chart" xmlns:dgm="http://schemas.openxmlformats.org/drawingml/2006/diagram" xmlns:o="urn:schemas-microsoft-com:office:office" xmlns:v="urn:schemas-microsoft-com:vml" xmlns:pvml="urn:schemas-microsoft-com:office:powerpoint" xmlns:com="http://schemas.openxmlformats.org/drawingml/2006/compatibility" xmlns:p14="http://schemas.microsoft.com/office/powerpoint/2010/main" xmlns:p15="http://schemas.microsoft.com/office/powerpoint/2012/main" xmlns:ahyp="http://schemas.microsoft.com/office/drawing/2018/hyperlinkcolor">
+  <p:cSld>
+    <p:spTree>
+      <p:nvGrpSpPr>
+        <p:cNvPr id="274" name="Shape 274"/>
+        <p:cNvGrpSpPr/>
+        <p:nvPr/>
+      </p:nvGrpSpPr>
+      <p:grpSpPr>
+        <a:xfrm>
+          <a:off x="0" y="0"/>
+          <a:ext cx="0" cy="0"/>
+          <a:chOff x="0" y="0"/>
+          <a:chExt cx="0" cy="0"/>
+        </a:xfrm>
+      </p:grpSpPr>
+      <p:sp>
+        <p:nvSpPr>
+          <p:cNvPr id="275" name="Google Shape;275;p46"/>
           <p:cNvSpPr txBox="1"/>
           <p:nvPr>
             <p:ph type="title"/>
@@ -13860,7 +14524,7 @@
       </p:sp>
       <p:pic>
         <p:nvPicPr>
-          <p:cNvPr descr="To celebrate 100,000 views on my last countdown, I decided to make a brand new one for you to use at your church, youth group, school, or wherever you want!&#10;&#10;Music Used :&#10;TheFatRat - Time Lapse&#10;Tobu - Colors&#10;&#10;Programs used :&#10;Adobe After Effects CC 2014&#10;&#10;Expect more frequent uploads in the future!" id="261" name="Google Shape;261;p45" title="Electric  - 5 Minute Countdown">
+          <p:cNvPr descr="To celebrate 100,000 views on my last countdown, I decided to make a brand new one for you to use at your church, youth group, school, or wherever you want!&#10;&#10;Music Used :&#10;TheFatRat - Time Lapse&#10;Tobu - Colors&#10;&#10;Programs used :&#10;Adobe After Effects CC 2014&#10;&#10;Expect more frequent uploads in the future!" id="276" name="Google Shape;276;p46" title="Electric  - 5 Minute Countdown">
             <a:hlinkClick r:id="rId3"/>
           </p:cNvPr>
           <p:cNvPicPr preferRelativeResize="0"/>
@@ -13896,12 +14560,12 @@
 </p:sld>
 </file>
 
-<file path=ppt/slides/slide34.xml><?xml version="1.0" encoding="utf-8"?>
+<file path=ppt/slides/slide35.xml><?xml version="1.0" encoding="utf-8"?>
 <p:sld xmlns:a="http://schemas.openxmlformats.org/drawingml/2006/main" xmlns:r="http://schemas.openxmlformats.org/officeDocument/2006/relationships" xmlns:mc="http://schemas.openxmlformats.org/markup-compatibility/2006" xmlns:mv="urn:schemas-microsoft-com:mac:vml" xmlns:p="http://schemas.openxmlformats.org/presentationml/2006/main" xmlns:c="http://schemas.openxmlformats.org/drawingml/2006/chart" xmlns:dgm="http://schemas.openxmlformats.org/drawingml/2006/diagram" xmlns:o="urn:schemas-microsoft-com:office:office" xmlns:v="urn:schemas-microsoft-com:vml" xmlns:pvml="urn:schemas-microsoft-com:office:powerpoint" xmlns:com="http://schemas.openxmlformats.org/drawingml/2006/compatibility" xmlns:p14="http://schemas.microsoft.com/office/powerpoint/2010/main" xmlns:p15="http://schemas.microsoft.com/office/powerpoint/2012/main" xmlns:ahyp="http://schemas.microsoft.com/office/drawing/2018/hyperlinkcolor">
   <p:cSld>
     <p:spTree>
       <p:nvGrpSpPr>
-        <p:cNvPr id="265" name="Shape 265"/>
+        <p:cNvPr id="280" name="Shape 280"/>
         <p:cNvGrpSpPr/>
         <p:nvPr/>
       </p:nvGrpSpPr>
@@ -13915,7 +14579,7 @@
       </p:grpSpPr>
       <p:sp>
         <p:nvSpPr>
-          <p:cNvPr id="266" name="Google Shape;266;p46"/>
+          <p:cNvPr id="281" name="Google Shape;281;p47"/>
           <p:cNvSpPr txBox="1"/>
           <p:nvPr>
             <p:ph type="ctrTitle"/>
@@ -13948,71 +14612,6 @@
             <a:r>
               <a:rPr lang="en"/>
               <a:t>Update State Based on Props</a:t>
-            </a:r>
-            <a:endParaRPr/>
-          </a:p>
-        </p:txBody>
-      </p:sp>
-    </p:spTree>
-  </p:cSld>
-  <p:clrMapOvr>
-    <a:masterClrMapping/>
-  </p:clrMapOvr>
-</p:sld>
-</file>
-
-<file path=ppt/slides/slide35.xml><?xml version="1.0" encoding="utf-8"?>
-<p:sld xmlns:a="http://schemas.openxmlformats.org/drawingml/2006/main" xmlns:r="http://schemas.openxmlformats.org/officeDocument/2006/relationships" xmlns:mc="http://schemas.openxmlformats.org/markup-compatibility/2006" xmlns:mv="urn:schemas-microsoft-com:mac:vml" xmlns:p="http://schemas.openxmlformats.org/presentationml/2006/main" xmlns:c="http://schemas.openxmlformats.org/drawingml/2006/chart" xmlns:dgm="http://schemas.openxmlformats.org/drawingml/2006/diagram" xmlns:o="urn:schemas-microsoft-com:office:office" xmlns:v="urn:schemas-microsoft-com:vml" xmlns:pvml="urn:schemas-microsoft-com:office:powerpoint" xmlns:com="http://schemas.openxmlformats.org/drawingml/2006/compatibility" xmlns:p14="http://schemas.microsoft.com/office/powerpoint/2010/main" xmlns:p15="http://schemas.microsoft.com/office/powerpoint/2012/main" xmlns:ahyp="http://schemas.microsoft.com/office/drawing/2018/hyperlinkcolor">
-  <p:cSld>
-    <p:spTree>
-      <p:nvGrpSpPr>
-        <p:cNvPr id="270" name="Shape 270"/>
-        <p:cNvGrpSpPr/>
-        <p:nvPr/>
-      </p:nvGrpSpPr>
-      <p:grpSpPr>
-        <a:xfrm>
-          <a:off x="0" y="0"/>
-          <a:ext cx="0" cy="0"/>
-          <a:chOff x="0" y="0"/>
-          <a:chExt cx="0" cy="0"/>
-        </a:xfrm>
-      </p:grpSpPr>
-      <p:sp>
-        <p:nvSpPr>
-          <p:cNvPr id="271" name="Google Shape;271;p47"/>
-          <p:cNvSpPr txBox="1"/>
-          <p:nvPr>
-            <p:ph type="ctrTitle"/>
-          </p:nvPr>
-        </p:nvSpPr>
-        <p:spPr>
-          <a:xfrm>
-            <a:off x="311700" y="2184750"/>
-            <a:ext cx="8520600" cy="774000"/>
-          </a:xfrm>
-          <a:prstGeom prst="rect">
-            <a:avLst/>
-          </a:prstGeom>
-        </p:spPr>
-        <p:txBody>
-          <a:bodyPr anchorCtr="0" anchor="b" bIns="91425" lIns="91425" spcFirstLastPara="1" rIns="91425" wrap="square" tIns="91425">
-            <a:noAutofit/>
-          </a:bodyPr>
-          <a:lstStyle/>
-          <a:p>
-            <a:pPr indent="0" lvl="0" marL="0" rtl="0" algn="ctr">
-              <a:spcBef>
-                <a:spcPts val="0"/>
-              </a:spcBef>
-              <a:spcAft>
-                <a:spcPts val="0"/>
-              </a:spcAft>
-              <a:buNone/>
-            </a:pPr>
-            <a:r>
-              <a:rPr lang="en"/>
-              <a:t>Exercise: Update Order Summary</a:t>
             </a:r>
             <a:endParaRPr/>
           </a:p>
@@ -14031,7 +14630,7 @@
   <p:cSld>
     <p:spTree>
       <p:nvGrpSpPr>
-        <p:cNvPr id="275" name="Shape 275"/>
+        <p:cNvPr id="285" name="Shape 285"/>
         <p:cNvGrpSpPr/>
         <p:nvPr/>
       </p:nvGrpSpPr>
@@ -14045,7 +14644,72 @@
       </p:grpSpPr>
       <p:sp>
         <p:nvSpPr>
-          <p:cNvPr id="276" name="Google Shape;276;p48"/>
+          <p:cNvPr id="286" name="Google Shape;286;p48"/>
+          <p:cNvSpPr txBox="1"/>
+          <p:nvPr>
+            <p:ph type="ctrTitle"/>
+          </p:nvPr>
+        </p:nvSpPr>
+        <p:spPr>
+          <a:xfrm>
+            <a:off x="311700" y="2184750"/>
+            <a:ext cx="8520600" cy="774000"/>
+          </a:xfrm>
+          <a:prstGeom prst="rect">
+            <a:avLst/>
+          </a:prstGeom>
+        </p:spPr>
+        <p:txBody>
+          <a:bodyPr anchorCtr="0" anchor="b" bIns="91425" lIns="91425" spcFirstLastPara="1" rIns="91425" wrap="square" tIns="91425">
+            <a:noAutofit/>
+          </a:bodyPr>
+          <a:lstStyle/>
+          <a:p>
+            <a:pPr indent="0" lvl="0" marL="0" rtl="0" algn="ctr">
+              <a:spcBef>
+                <a:spcPts val="0"/>
+              </a:spcBef>
+              <a:spcAft>
+                <a:spcPts val="0"/>
+              </a:spcAft>
+              <a:buNone/>
+            </a:pPr>
+            <a:r>
+              <a:rPr lang="en"/>
+              <a:t>Exercise: Update Order Summary</a:t>
+            </a:r>
+            <a:endParaRPr/>
+          </a:p>
+        </p:txBody>
+      </p:sp>
+    </p:spTree>
+  </p:cSld>
+  <p:clrMapOvr>
+    <a:masterClrMapping/>
+  </p:clrMapOvr>
+</p:sld>
+</file>
+
+<file path=ppt/slides/slide37.xml><?xml version="1.0" encoding="utf-8"?>
+<p:sld xmlns:a="http://schemas.openxmlformats.org/drawingml/2006/main" xmlns:r="http://schemas.openxmlformats.org/officeDocument/2006/relationships" xmlns:mc="http://schemas.openxmlformats.org/markup-compatibility/2006" xmlns:mv="urn:schemas-microsoft-com:mac:vml" xmlns:p="http://schemas.openxmlformats.org/presentationml/2006/main" xmlns:c="http://schemas.openxmlformats.org/drawingml/2006/chart" xmlns:dgm="http://schemas.openxmlformats.org/drawingml/2006/diagram" xmlns:o="urn:schemas-microsoft-com:office:office" xmlns:v="urn:schemas-microsoft-com:vml" xmlns:pvml="urn:schemas-microsoft-com:office:powerpoint" xmlns:com="http://schemas.openxmlformats.org/drawingml/2006/compatibility" xmlns:p14="http://schemas.microsoft.com/office/powerpoint/2010/main" xmlns:p15="http://schemas.microsoft.com/office/powerpoint/2012/main" xmlns:ahyp="http://schemas.microsoft.com/office/drawing/2018/hyperlinkcolor">
+  <p:cSld>
+    <p:spTree>
+      <p:nvGrpSpPr>
+        <p:cNvPr id="290" name="Shape 290"/>
+        <p:cNvGrpSpPr/>
+        <p:nvPr/>
+      </p:nvGrpSpPr>
+      <p:grpSpPr>
+        <a:xfrm>
+          <a:off x="0" y="0"/>
+          <a:ext cx="0" cy="0"/>
+          <a:chOff x="0" y="0"/>
+          <a:chExt cx="0" cy="0"/>
+        </a:xfrm>
+      </p:grpSpPr>
+      <p:sp>
+        <p:nvSpPr>
+          <p:cNvPr id="291" name="Google Shape;291;p49"/>
           <p:cNvSpPr txBox="1"/>
           <p:nvPr>
             <p:ph type="title"/>
@@ -14085,7 +14749,7 @@
       </p:sp>
       <p:pic>
         <p:nvPicPr>
-          <p:cNvPr descr="To celebrate 100,000 views on my last countdown, I decided to make a brand new one for you to use at your church, youth group, school, or wherever you want!&#10;&#10;Music Used :&#10;TheFatRat - Time Lapse&#10;Tobu - Colors&#10;&#10;Programs used :&#10;Adobe After Effects CC 2014&#10;&#10;Expect more frequent uploads in the future!" id="277" name="Google Shape;277;p48" title="Electric  - 5 Minute Countdown">
+          <p:cNvPr descr="To celebrate 100,000 views on my last countdown, I decided to make a brand new one for you to use at your church, youth group, school, or wherever you want!&#10;&#10;Music Used :&#10;TheFatRat - Time Lapse&#10;Tobu - Colors&#10;&#10;Programs used :&#10;Adobe After Effects CC 2014&#10;&#10;Expect more frequent uploads in the future!" id="292" name="Google Shape;292;p49" title="Electric  - 5 Minute Countdown">
             <a:hlinkClick r:id="rId3"/>
           </p:cNvPr>
           <p:cNvPicPr preferRelativeResize="0"/>
@@ -14121,12 +14785,12 @@
 </p:sld>
 </file>
 
-<file path=ppt/slides/slide37.xml><?xml version="1.0" encoding="utf-8"?>
+<file path=ppt/slides/slide38.xml><?xml version="1.0" encoding="utf-8"?>
 <p:sld xmlns:a="http://schemas.openxmlformats.org/drawingml/2006/main" xmlns:r="http://schemas.openxmlformats.org/officeDocument/2006/relationships" xmlns:mc="http://schemas.openxmlformats.org/markup-compatibility/2006" xmlns:mv="urn:schemas-microsoft-com:mac:vml" xmlns:p="http://schemas.openxmlformats.org/presentationml/2006/main" xmlns:c="http://schemas.openxmlformats.org/drawingml/2006/chart" xmlns:dgm="http://schemas.openxmlformats.org/drawingml/2006/diagram" xmlns:o="urn:schemas-microsoft-com:office:office" xmlns:v="urn:schemas-microsoft-com:vml" xmlns:pvml="urn:schemas-microsoft-com:office:powerpoint" xmlns:com="http://schemas.openxmlformats.org/drawingml/2006/compatibility" xmlns:p14="http://schemas.microsoft.com/office/powerpoint/2010/main" xmlns:p15="http://schemas.microsoft.com/office/powerpoint/2012/main" xmlns:ahyp="http://schemas.microsoft.com/office/drawing/2018/hyperlinkcolor">
   <p:cSld>
     <p:spTree>
       <p:nvGrpSpPr>
-        <p:cNvPr id="281" name="Shape 281"/>
+        <p:cNvPr id="296" name="Shape 296"/>
         <p:cNvGrpSpPr/>
         <p:nvPr/>
       </p:nvGrpSpPr>
@@ -14140,7 +14804,7 @@
       </p:grpSpPr>
       <p:sp>
         <p:nvSpPr>
-          <p:cNvPr id="282" name="Google Shape;282;p49"/>
+          <p:cNvPr id="297" name="Google Shape;297;p50"/>
           <p:cNvSpPr txBox="1"/>
           <p:nvPr>
             <p:ph type="ctrTitle"/>
@@ -14173,129 +14837,6 @@
             <a:r>
               <a:rPr lang="en"/>
               <a:t>Exercise: Update CartItem Quantities</a:t>
-            </a:r>
-            <a:endParaRPr/>
-          </a:p>
-        </p:txBody>
-      </p:sp>
-    </p:spTree>
-  </p:cSld>
-  <p:clrMapOvr>
-    <a:masterClrMapping/>
-  </p:clrMapOvr>
-</p:sld>
-</file>
-
-<file path=ppt/slides/slide38.xml><?xml version="1.0" encoding="utf-8"?>
-<p:sld xmlns:a="http://schemas.openxmlformats.org/drawingml/2006/main" xmlns:r="http://schemas.openxmlformats.org/officeDocument/2006/relationships" xmlns:mc="http://schemas.openxmlformats.org/markup-compatibility/2006" xmlns:mv="urn:schemas-microsoft-com:mac:vml" xmlns:p="http://schemas.openxmlformats.org/presentationml/2006/main" xmlns:c="http://schemas.openxmlformats.org/drawingml/2006/chart" xmlns:dgm="http://schemas.openxmlformats.org/drawingml/2006/diagram" xmlns:o="urn:schemas-microsoft-com:office:office" xmlns:v="urn:schemas-microsoft-com:vml" xmlns:pvml="urn:schemas-microsoft-com:office:powerpoint" xmlns:com="http://schemas.openxmlformats.org/drawingml/2006/compatibility" xmlns:p14="http://schemas.microsoft.com/office/powerpoint/2010/main" xmlns:p15="http://schemas.microsoft.com/office/powerpoint/2012/main" xmlns:ahyp="http://schemas.microsoft.com/office/drawing/2018/hyperlinkcolor">
-  <p:cSld>
-    <p:spTree>
-      <p:nvGrpSpPr>
-        <p:cNvPr id="286" name="Shape 286"/>
-        <p:cNvGrpSpPr/>
-        <p:nvPr/>
-      </p:nvGrpSpPr>
-      <p:grpSpPr>
-        <a:xfrm>
-          <a:off x="0" y="0"/>
-          <a:ext cx="0" cy="0"/>
-          <a:chOff x="0" y="0"/>
-          <a:chExt cx="0" cy="0"/>
-        </a:xfrm>
-      </p:grpSpPr>
-      <p:sp>
-        <p:nvSpPr>
-          <p:cNvPr id="287" name="Google Shape;287;p50"/>
-          <p:cNvSpPr txBox="1"/>
-          <p:nvPr>
-            <p:ph type="title"/>
-          </p:nvPr>
-        </p:nvSpPr>
-        <p:spPr>
-          <a:xfrm>
-            <a:off x="265500" y="301101"/>
-            <a:ext cx="4045200" cy="816000"/>
-          </a:xfrm>
-          <a:prstGeom prst="rect">
-            <a:avLst/>
-          </a:prstGeom>
-        </p:spPr>
-        <p:txBody>
-          <a:bodyPr anchorCtr="0" anchor="t" bIns="91425" lIns="91425" spcFirstLastPara="1" rIns="91425" wrap="square" tIns="91425">
-            <a:noAutofit/>
-          </a:bodyPr>
-          <a:lstStyle/>
-          <a:p>
-            <a:pPr indent="0" lvl="0" marL="0" rtl="0" algn="l">
-              <a:spcBef>
-                <a:spcPts val="0"/>
-              </a:spcBef>
-              <a:spcAft>
-                <a:spcPts val="0"/>
-              </a:spcAft>
-              <a:buNone/>
-            </a:pPr>
-            <a:r>
-              <a:rPr lang="en"/>
-              <a:t>More Features</a:t>
-            </a:r>
-            <a:endParaRPr/>
-          </a:p>
-        </p:txBody>
-      </p:sp>
-      <p:sp>
-        <p:nvSpPr>
-          <p:cNvPr id="288" name="Google Shape;288;p50"/>
-          <p:cNvSpPr txBox="1"/>
-          <p:nvPr>
-            <p:ph idx="1" type="body"/>
-          </p:nvPr>
-        </p:nvSpPr>
-        <p:spPr>
-          <a:xfrm>
-            <a:off x="4883750" y="515125"/>
-            <a:ext cx="4045200" cy="4113000"/>
-          </a:xfrm>
-          <a:prstGeom prst="rect">
-            <a:avLst/>
-          </a:prstGeom>
-        </p:spPr>
-        <p:txBody>
-          <a:bodyPr anchorCtr="0" anchor="ctr" bIns="91425" lIns="91425" spcFirstLastPara="1" rIns="91425" wrap="square" tIns="91425">
-            <a:noAutofit/>
-          </a:bodyPr>
-          <a:lstStyle/>
-          <a:p>
-            <a:pPr indent="-342900" lvl="0" marL="457200" rtl="0" algn="l">
-              <a:spcBef>
-                <a:spcPts val="0"/>
-              </a:spcBef>
-              <a:spcAft>
-                <a:spcPts val="0"/>
-              </a:spcAft>
-              <a:buSzPts val="1800"/>
-              <a:buChar char="●"/>
-            </a:pPr>
-            <a:r>
-              <a:rPr lang="en"/>
-              <a:t>Be able to add a rating to products in that show in the Catalog Product Card</a:t>
-            </a:r>
-            <a:endParaRPr/>
-          </a:p>
-          <a:p>
-            <a:pPr indent="-342900" lvl="0" marL="457200" rtl="0" algn="l">
-              <a:spcBef>
-                <a:spcPts val="0"/>
-              </a:spcBef>
-              <a:spcAft>
-                <a:spcPts val="0"/>
-              </a:spcAft>
-              <a:buSzPts val="1800"/>
-              <a:buChar char="●"/>
-            </a:pPr>
-            <a:r>
-              <a:rPr lang="en"/>
-              <a:t>Be able to add products to a favorites list from both the Catalog and the Cart</a:t>
             </a:r>
             <a:endParaRPr/>
           </a:p>
@@ -14314,7 +14855,7 @@
   <p:cSld>
     <p:spTree>
       <p:nvGrpSpPr>
-        <p:cNvPr id="292" name="Shape 292"/>
+        <p:cNvPr id="301" name="Shape 301"/>
         <p:cNvGrpSpPr/>
         <p:nvPr/>
       </p:nvGrpSpPr>
@@ -14328,7 +14869,47 @@
       </p:grpSpPr>
       <p:sp>
         <p:nvSpPr>
-          <p:cNvPr id="293" name="Google Shape;293;p51"/>
+          <p:cNvPr id="302" name="Google Shape;302;p51"/>
+          <p:cNvSpPr txBox="1"/>
+          <p:nvPr>
+            <p:ph type="title"/>
+          </p:nvPr>
+        </p:nvSpPr>
+        <p:spPr>
+          <a:xfrm>
+            <a:off x="265500" y="301101"/>
+            <a:ext cx="4045200" cy="816000"/>
+          </a:xfrm>
+          <a:prstGeom prst="rect">
+            <a:avLst/>
+          </a:prstGeom>
+        </p:spPr>
+        <p:txBody>
+          <a:bodyPr anchorCtr="0" anchor="t" bIns="91425" lIns="91425" spcFirstLastPara="1" rIns="91425" wrap="square" tIns="91425">
+            <a:noAutofit/>
+          </a:bodyPr>
+          <a:lstStyle/>
+          <a:p>
+            <a:pPr indent="0" lvl="0" marL="0" rtl="0" algn="l">
+              <a:spcBef>
+                <a:spcPts val="0"/>
+              </a:spcBef>
+              <a:spcAft>
+                <a:spcPts val="0"/>
+              </a:spcAft>
+              <a:buNone/>
+            </a:pPr>
+            <a:r>
+              <a:rPr lang="en"/>
+              <a:t>More Features</a:t>
+            </a:r>
+            <a:endParaRPr/>
+          </a:p>
+        </p:txBody>
+      </p:sp>
+      <p:sp>
+        <p:nvSpPr>
+          <p:cNvPr id="303" name="Google Shape;303;p51"/>
           <p:cNvSpPr txBox="1"/>
           <p:nvPr>
             <p:ph idx="1" type="body"/>
@@ -14349,201 +14930,36 @@
           </a:bodyPr>
           <a:lstStyle/>
           <a:p>
-            <a:pPr indent="-330200" lvl="0" marL="457200" rtl="0" algn="l">
-              <a:spcBef>
-                <a:spcPts val="0"/>
-              </a:spcBef>
-              <a:spcAft>
-                <a:spcPts val="0"/>
-              </a:spcAft>
-              <a:buSzPts val="1600"/>
+            <a:pPr indent="-342900" lvl="0" marL="457200" rtl="0" algn="l">
+              <a:spcBef>
+                <a:spcPts val="0"/>
+              </a:spcBef>
+              <a:spcAft>
+                <a:spcPts val="0"/>
+              </a:spcAft>
+              <a:buSzPts val="1800"/>
               <a:buChar char="●"/>
             </a:pPr>
             <a:r>
-              <a:rPr lang="en" sz="1600"/>
-              <a:t>Dynamic Catalog Search</a:t>
-            </a:r>
-            <a:endParaRPr sz="1600"/>
-          </a:p>
-          <a:p>
-            <a:pPr indent="-330200" lvl="1" marL="914400" rtl="0" algn="l">
-              <a:spcBef>
-                <a:spcPts val="0"/>
-              </a:spcBef>
-              <a:spcAft>
-                <a:spcPts val="0"/>
-              </a:spcAft>
-              <a:buSzPts val="1600"/>
-              <a:buChar char="○"/>
-            </a:pPr>
-            <a:r>
-              <a:rPr lang="en" sz="1600"/>
-              <a:t>Add a text field to the top of the Catalog component</a:t>
-            </a:r>
-            <a:endParaRPr sz="1600"/>
-          </a:p>
-          <a:p>
-            <a:pPr indent="-330200" lvl="1" marL="914400" rtl="0" algn="l">
-              <a:spcBef>
-                <a:spcPts val="0"/>
-              </a:spcBef>
-              <a:spcAft>
-                <a:spcPts val="0"/>
-              </a:spcAft>
-              <a:buSzPts val="1600"/>
-              <a:buChar char="○"/>
-            </a:pPr>
-            <a:r>
-              <a:rPr lang="en" sz="1600"/>
-              <a:t>Dynamically filter Products by the text contained on the Product's associated card</a:t>
-            </a:r>
-            <a:endParaRPr sz="1600"/>
-          </a:p>
-          <a:p>
-            <a:pPr indent="-330200" lvl="0" marL="457200" rtl="0" algn="l">
-              <a:spcBef>
-                <a:spcPts val="0"/>
-              </a:spcBef>
-              <a:spcAft>
-                <a:spcPts val="0"/>
-              </a:spcAft>
-              <a:buSzPts val="1600"/>
+              <a:rPr lang="en"/>
+              <a:t>Be able to add a rating to products in that show in the Catalog Product Card</a:t>
+            </a:r>
+            <a:endParaRPr/>
+          </a:p>
+          <a:p>
+            <a:pPr indent="-342900" lvl="0" marL="457200" rtl="0" algn="l">
+              <a:spcBef>
+                <a:spcPts val="0"/>
+              </a:spcBef>
+              <a:spcAft>
+                <a:spcPts val="0"/>
+              </a:spcAft>
+              <a:buSzPts val="1800"/>
               <a:buChar char="●"/>
             </a:pPr>
             <a:r>
-              <a:rPr lang="en" sz="1600"/>
-              <a:t>Consider what other parts of the app could become their own React components</a:t>
-            </a:r>
-            <a:endParaRPr sz="1600"/>
-          </a:p>
-          <a:p>
-            <a:pPr indent="-330200" lvl="1" marL="914400" rtl="0" algn="l">
-              <a:spcBef>
-                <a:spcPts val="0"/>
-              </a:spcBef>
-              <a:spcAft>
-                <a:spcPts val="0"/>
-              </a:spcAft>
-              <a:buSzPts val="1600"/>
-              <a:buChar char="○"/>
-            </a:pPr>
-            <a:r>
-              <a:rPr lang="en" sz="1600"/>
-              <a:t>Turn the quantity selector into its own component</a:t>
-            </a:r>
-            <a:endParaRPr sz="1600"/>
-          </a:p>
-          <a:p>
-            <a:pPr indent="-330200" lvl="1" marL="914400" rtl="0" algn="l">
-              <a:spcBef>
-                <a:spcPts val="0"/>
-              </a:spcBef>
-              <a:spcAft>
-                <a:spcPts val="0"/>
-              </a:spcAft>
-              <a:buSzPts val="1600"/>
-              <a:buChar char="○"/>
-            </a:pPr>
-            <a:r>
-              <a:rPr lang="en" sz="1600"/>
-              <a:t>Order summary could be its own component</a:t>
-            </a:r>
-            <a:endParaRPr sz="1600"/>
-          </a:p>
-          <a:p>
-            <a:pPr indent="-330200" lvl="1" marL="914400" rtl="0" algn="l">
-              <a:spcBef>
-                <a:spcPts val="0"/>
-              </a:spcBef>
-              <a:spcAft>
-                <a:spcPts val="0"/>
-              </a:spcAft>
-              <a:buSzPts val="1600"/>
-              <a:buChar char="○"/>
-            </a:pPr>
-            <a:r>
-              <a:rPr lang="en" sz="1600"/>
-              <a:t>Dynamically pass user's name to the header</a:t>
-            </a:r>
-            <a:endParaRPr sz="1600"/>
-          </a:p>
-        </p:txBody>
-      </p:sp>
-      <p:sp>
-        <p:nvSpPr>
-          <p:cNvPr id="294" name="Google Shape;294;p51"/>
-          <p:cNvSpPr txBox="1"/>
-          <p:nvPr>
-            <p:ph type="title"/>
-          </p:nvPr>
-        </p:nvSpPr>
-        <p:spPr>
-          <a:xfrm>
-            <a:off x="265500" y="301101"/>
-            <a:ext cx="4045200" cy="816000"/>
-          </a:xfrm>
-          <a:prstGeom prst="rect">
-            <a:avLst/>
-          </a:prstGeom>
-        </p:spPr>
-        <p:txBody>
-          <a:bodyPr anchorCtr="0" anchor="t" bIns="91425" lIns="91425" spcFirstLastPara="1" rIns="91425" wrap="square" tIns="91425">
-            <a:noAutofit/>
-          </a:bodyPr>
-          <a:lstStyle/>
-          <a:p>
-            <a:pPr indent="0" lvl="0" marL="0" rtl="0" algn="l">
-              <a:spcBef>
-                <a:spcPts val="0"/>
-              </a:spcBef>
-              <a:spcAft>
-                <a:spcPts val="0"/>
-              </a:spcAft>
-              <a:buNone/>
-            </a:pPr>
-            <a:r>
               <a:rPr lang="en"/>
-              <a:t>Continued Learning</a:t>
-            </a:r>
-            <a:endParaRPr/>
-          </a:p>
-        </p:txBody>
-      </p:sp>
-      <p:sp>
-        <p:nvSpPr>
-          <p:cNvPr id="295" name="Google Shape;295;p51"/>
-          <p:cNvSpPr txBox="1"/>
-          <p:nvPr>
-            <p:ph idx="2" type="subTitle"/>
-          </p:nvPr>
-        </p:nvSpPr>
-        <p:spPr>
-          <a:xfrm>
-            <a:off x="325175" y="1802025"/>
-            <a:ext cx="4045200" cy="2296800"/>
-          </a:xfrm>
-          <a:prstGeom prst="rect">
-            <a:avLst/>
-          </a:prstGeom>
-        </p:spPr>
-        <p:txBody>
-          <a:bodyPr anchorCtr="0" anchor="t" bIns="91425" lIns="91425" spcFirstLastPara="1" rIns="91425" wrap="square" tIns="91425">
-            <a:noAutofit/>
-          </a:bodyPr>
-          <a:lstStyle/>
-          <a:p>
-            <a:pPr indent="0" lvl="0" marL="0" rtl="0" algn="l">
-              <a:spcBef>
-                <a:spcPts val="0"/>
-              </a:spcBef>
-              <a:spcAft>
-                <a:spcPts val="0"/>
-              </a:spcAft>
-              <a:buNone/>
-            </a:pPr>
-            <a:r>
-              <a:rPr lang="en"/>
-              <a:t>Beyond the Workshop</a:t>
+              <a:t>Be able to add products to a favorites list from both the Catalog and the Cart</a:t>
             </a:r>
             <a:endParaRPr/>
           </a:p>
@@ -14719,7 +15135,7 @@
   <p:cSld>
     <p:spTree>
       <p:nvGrpSpPr>
-        <p:cNvPr id="299" name="Shape 299"/>
+        <p:cNvPr id="307" name="Shape 307"/>
         <p:cNvGrpSpPr/>
         <p:nvPr/>
       </p:nvGrpSpPr>
@@ -14733,7 +15149,150 @@
       </p:grpSpPr>
       <p:sp>
         <p:nvSpPr>
-          <p:cNvPr id="300" name="Google Shape;300;p52"/>
+          <p:cNvPr id="308" name="Google Shape;308;p52"/>
+          <p:cNvSpPr txBox="1"/>
+          <p:nvPr>
+            <p:ph idx="1" type="body"/>
+          </p:nvPr>
+        </p:nvSpPr>
+        <p:spPr>
+          <a:xfrm>
+            <a:off x="4883750" y="515125"/>
+            <a:ext cx="4045200" cy="4113000"/>
+          </a:xfrm>
+          <a:prstGeom prst="rect">
+            <a:avLst/>
+          </a:prstGeom>
+        </p:spPr>
+        <p:txBody>
+          <a:bodyPr anchorCtr="0" anchor="ctr" bIns="91425" lIns="91425" spcFirstLastPara="1" rIns="91425" wrap="square" tIns="91425">
+            <a:noAutofit/>
+          </a:bodyPr>
+          <a:lstStyle/>
+          <a:p>
+            <a:pPr indent="-330200" lvl="0" marL="457200" rtl="0" algn="l">
+              <a:spcBef>
+                <a:spcPts val="0"/>
+              </a:spcBef>
+              <a:spcAft>
+                <a:spcPts val="0"/>
+              </a:spcAft>
+              <a:buSzPts val="1600"/>
+              <a:buChar char="●"/>
+            </a:pPr>
+            <a:r>
+              <a:rPr lang="en" sz="1600"/>
+              <a:t>Dynamic Catalog Search</a:t>
+            </a:r>
+            <a:endParaRPr sz="1600"/>
+          </a:p>
+          <a:p>
+            <a:pPr indent="-330200" lvl="1" marL="914400" rtl="0" algn="l">
+              <a:spcBef>
+                <a:spcPts val="0"/>
+              </a:spcBef>
+              <a:spcAft>
+                <a:spcPts val="0"/>
+              </a:spcAft>
+              <a:buSzPts val="1600"/>
+              <a:buChar char="○"/>
+            </a:pPr>
+            <a:r>
+              <a:rPr lang="en" sz="1600"/>
+              <a:t>Add a text field to the top of the Catalog component</a:t>
+            </a:r>
+            <a:endParaRPr sz="1600"/>
+          </a:p>
+          <a:p>
+            <a:pPr indent="-330200" lvl="1" marL="914400" rtl="0" algn="l">
+              <a:spcBef>
+                <a:spcPts val="0"/>
+              </a:spcBef>
+              <a:spcAft>
+                <a:spcPts val="0"/>
+              </a:spcAft>
+              <a:buSzPts val="1600"/>
+              <a:buChar char="○"/>
+            </a:pPr>
+            <a:r>
+              <a:rPr lang="en" sz="1600"/>
+              <a:t>Dynamically filter Products by the text contained on the Product's associated card</a:t>
+            </a:r>
+            <a:endParaRPr sz="1600"/>
+          </a:p>
+          <a:p>
+            <a:pPr indent="-330200" lvl="0" marL="457200" rtl="0" algn="l">
+              <a:spcBef>
+                <a:spcPts val="0"/>
+              </a:spcBef>
+              <a:spcAft>
+                <a:spcPts val="0"/>
+              </a:spcAft>
+              <a:buSzPts val="1600"/>
+              <a:buChar char="●"/>
+            </a:pPr>
+            <a:r>
+              <a:rPr lang="en" sz="1600"/>
+              <a:t>Consider what other parts of the app could become their own React components</a:t>
+            </a:r>
+            <a:endParaRPr sz="1600"/>
+          </a:p>
+          <a:p>
+            <a:pPr indent="-330200" lvl="1" marL="914400" rtl="0" algn="l">
+              <a:spcBef>
+                <a:spcPts val="0"/>
+              </a:spcBef>
+              <a:spcAft>
+                <a:spcPts val="0"/>
+              </a:spcAft>
+              <a:buSzPts val="1600"/>
+              <a:buChar char="○"/>
+            </a:pPr>
+            <a:r>
+              <a:rPr lang="en" sz="1600"/>
+              <a:t>Turn the quantity selector into its own component</a:t>
+            </a:r>
+            <a:endParaRPr sz="1600"/>
+          </a:p>
+          <a:p>
+            <a:pPr indent="-330200" lvl="1" marL="914400" rtl="0" algn="l">
+              <a:spcBef>
+                <a:spcPts val="0"/>
+              </a:spcBef>
+              <a:spcAft>
+                <a:spcPts val="0"/>
+              </a:spcAft>
+              <a:buSzPts val="1600"/>
+              <a:buChar char="○"/>
+            </a:pPr>
+            <a:r>
+              <a:rPr lang="en" sz="1600"/>
+              <a:t>Order summary could be its own component</a:t>
+            </a:r>
+            <a:endParaRPr sz="1600"/>
+          </a:p>
+          <a:p>
+            <a:pPr indent="-330200" lvl="1" marL="914400" rtl="0" algn="l">
+              <a:spcBef>
+                <a:spcPts val="0"/>
+              </a:spcBef>
+              <a:spcAft>
+                <a:spcPts val="0"/>
+              </a:spcAft>
+              <a:buSzPts val="1600"/>
+              <a:buChar char="○"/>
+            </a:pPr>
+            <a:r>
+              <a:rPr lang="en" sz="1600"/>
+              <a:t>Dynamically pass user's name to the header</a:t>
+            </a:r>
+            <a:endParaRPr sz="1600"/>
+          </a:p>
+        </p:txBody>
+      </p:sp>
+      <p:sp>
+        <p:nvSpPr>
+          <p:cNvPr id="309" name="Google Shape;309;p52"/>
           <p:cNvSpPr txBox="1"/>
           <p:nvPr>
             <p:ph type="title"/>
@@ -14765,6 +15324,111 @@
             </a:pPr>
             <a:r>
               <a:rPr lang="en"/>
+              <a:t>Continued Learning</a:t>
+            </a:r>
+            <a:endParaRPr/>
+          </a:p>
+        </p:txBody>
+      </p:sp>
+      <p:sp>
+        <p:nvSpPr>
+          <p:cNvPr id="310" name="Google Shape;310;p52"/>
+          <p:cNvSpPr txBox="1"/>
+          <p:nvPr>
+            <p:ph idx="2" type="subTitle"/>
+          </p:nvPr>
+        </p:nvSpPr>
+        <p:spPr>
+          <a:xfrm>
+            <a:off x="325175" y="1802025"/>
+            <a:ext cx="4045200" cy="2296800"/>
+          </a:xfrm>
+          <a:prstGeom prst="rect">
+            <a:avLst/>
+          </a:prstGeom>
+        </p:spPr>
+        <p:txBody>
+          <a:bodyPr anchorCtr="0" anchor="t" bIns="91425" lIns="91425" spcFirstLastPara="1" rIns="91425" wrap="square" tIns="91425">
+            <a:noAutofit/>
+          </a:bodyPr>
+          <a:lstStyle/>
+          <a:p>
+            <a:pPr indent="0" lvl="0" marL="0" rtl="0" algn="l">
+              <a:spcBef>
+                <a:spcPts val="0"/>
+              </a:spcBef>
+              <a:spcAft>
+                <a:spcPts val="0"/>
+              </a:spcAft>
+              <a:buNone/>
+            </a:pPr>
+            <a:r>
+              <a:rPr lang="en"/>
+              <a:t>Beyond the Workshop</a:t>
+            </a:r>
+            <a:endParaRPr/>
+          </a:p>
+        </p:txBody>
+      </p:sp>
+    </p:spTree>
+  </p:cSld>
+  <p:clrMapOvr>
+    <a:masterClrMapping/>
+  </p:clrMapOvr>
+</p:sld>
+</file>
+
+<file path=ppt/slides/slide41.xml><?xml version="1.0" encoding="utf-8"?>
+<p:sld xmlns:a="http://schemas.openxmlformats.org/drawingml/2006/main" xmlns:r="http://schemas.openxmlformats.org/officeDocument/2006/relationships" xmlns:mc="http://schemas.openxmlformats.org/markup-compatibility/2006" xmlns:mv="urn:schemas-microsoft-com:mac:vml" xmlns:p="http://schemas.openxmlformats.org/presentationml/2006/main" xmlns:c="http://schemas.openxmlformats.org/drawingml/2006/chart" xmlns:dgm="http://schemas.openxmlformats.org/drawingml/2006/diagram" xmlns:o="urn:schemas-microsoft-com:office:office" xmlns:v="urn:schemas-microsoft-com:vml" xmlns:pvml="urn:schemas-microsoft-com:office:powerpoint" xmlns:com="http://schemas.openxmlformats.org/drawingml/2006/compatibility" xmlns:p14="http://schemas.microsoft.com/office/powerpoint/2010/main" xmlns:p15="http://schemas.microsoft.com/office/powerpoint/2012/main" xmlns:ahyp="http://schemas.microsoft.com/office/drawing/2018/hyperlinkcolor">
+  <p:cSld>
+    <p:spTree>
+      <p:nvGrpSpPr>
+        <p:cNvPr id="314" name="Shape 314"/>
+        <p:cNvGrpSpPr/>
+        <p:nvPr/>
+      </p:nvGrpSpPr>
+      <p:grpSpPr>
+        <a:xfrm>
+          <a:off x="0" y="0"/>
+          <a:ext cx="0" cy="0"/>
+          <a:chOff x="0" y="0"/>
+          <a:chExt cx="0" cy="0"/>
+        </a:xfrm>
+      </p:grpSpPr>
+      <p:sp>
+        <p:nvSpPr>
+          <p:cNvPr id="315" name="Google Shape;315;p53"/>
+          <p:cNvSpPr txBox="1"/>
+          <p:nvPr>
+            <p:ph type="title"/>
+          </p:nvPr>
+        </p:nvSpPr>
+        <p:spPr>
+          <a:xfrm>
+            <a:off x="265500" y="301101"/>
+            <a:ext cx="4045200" cy="816000"/>
+          </a:xfrm>
+          <a:prstGeom prst="rect">
+            <a:avLst/>
+          </a:prstGeom>
+        </p:spPr>
+        <p:txBody>
+          <a:bodyPr anchorCtr="0" anchor="t" bIns="91425" lIns="91425" spcFirstLastPara="1" rIns="91425" wrap="square" tIns="91425">
+            <a:noAutofit/>
+          </a:bodyPr>
+          <a:lstStyle/>
+          <a:p>
+            <a:pPr indent="0" lvl="0" marL="0" rtl="0" algn="l">
+              <a:spcBef>
+                <a:spcPts val="0"/>
+              </a:spcBef>
+              <a:spcAft>
+                <a:spcPts val="0"/>
+              </a:spcAft>
+              <a:buNone/>
+            </a:pPr>
+            <a:r>
+              <a:rPr lang="en"/>
               <a:t>The End</a:t>
             </a:r>
             <a:endParaRPr/>
@@ -14773,7 +15437,7 @@
       </p:sp>
       <p:sp>
         <p:nvSpPr>
-          <p:cNvPr id="301" name="Google Shape;301;p52"/>
+          <p:cNvPr id="316" name="Google Shape;316;p53"/>
           <p:cNvSpPr txBox="1"/>
           <p:nvPr>
             <p:ph idx="1" type="body"/>
@@ -14793,6 +15457,23 @@
             <a:noAutofit/>
           </a:bodyPr>
           <a:lstStyle/>
+          <a:p>
+            <a:pPr indent="-342900" lvl="0" marL="457200" rtl="0" algn="l">
+              <a:spcBef>
+                <a:spcPts val="0"/>
+              </a:spcBef>
+              <a:spcAft>
+                <a:spcPts val="0"/>
+              </a:spcAft>
+              <a:buSzPts val="1800"/>
+              <a:buChar char="●"/>
+            </a:pPr>
+            <a:r>
+              <a:rPr lang="en"/>
+              <a:t>Thank you for joining!</a:t>
+            </a:r>
+            <a:endParaRPr/>
+          </a:p>
           <a:p>
             <a:pPr indent="-342900" lvl="0" marL="457200" rtl="0" algn="l">
               <a:spcBef>
@@ -15813,6 +16494,285 @@
 </file>
 
 <file path=ppt/theme/theme1.xml><?xml version="1.0" encoding="utf-8"?>
+<a:theme xmlns:a="http://schemas.openxmlformats.org/drawingml/2006/main" xmlns:r="http://schemas.openxmlformats.org/officeDocument/2006/relationships">
+  <a:themeElements>
+    <a:clrScheme name="Default">
+      <a:dk1>
+        <a:srgbClr val="000000"/>
+      </a:dk1>
+      <a:lt1>
+        <a:srgbClr val="FFFFFF"/>
+      </a:lt1>
+      <a:dk2>
+        <a:srgbClr val="158158"/>
+      </a:dk2>
+      <a:lt2>
+        <a:srgbClr val="F3F3F3"/>
+      </a:lt2>
+      <a:accent1>
+        <a:srgbClr val="058DC7"/>
+      </a:accent1>
+      <a:accent2>
+        <a:srgbClr val="50B432"/>
+      </a:accent2>
+      <a:accent3>
+        <a:srgbClr val="ED561B"/>
+      </a:accent3>
+      <a:accent4>
+        <a:srgbClr val="EDEF00"/>
+      </a:accent4>
+      <a:accent5>
+        <a:srgbClr val="24CBE5"/>
+      </a:accent5>
+      <a:accent6>
+        <a:srgbClr val="64E572"/>
+      </a:accent6>
+      <a:hlink>
+        <a:srgbClr val="2200CC"/>
+      </a:hlink>
+      <a:folHlink>
+        <a:srgbClr val="551A8B"/>
+      </a:folHlink>
+    </a:clrScheme>
+    <a:fontScheme name="Office">
+      <a:majorFont>
+        <a:latin typeface="Arial"/>
+        <a:ea typeface=""/>
+        <a:cs typeface=""/>
+        <a:font script="Jpan" typeface="ＭＳ Ｐゴシック"/>
+        <a:font script="Hang" typeface="맑은 고딕"/>
+        <a:font script="Hans" typeface="宋体"/>
+        <a:font script="Hant" typeface="新細明體"/>
+        <a:font script="Arab" typeface="Times New Roman"/>
+        <a:font script="Hebr" typeface="Times New Roman"/>
+        <a:font script="Thai" typeface="Angsana New"/>
+        <a:font script="Ethi" typeface="Nyala"/>
+        <a:font script="Beng" typeface="Vrinda"/>
+        <a:font script="Gujr" typeface="Shruti"/>
+        <a:font script="Khmr" typeface="MoolBoran"/>
+        <a:font script="Knda" typeface="Tunga"/>
+        <a:font script="Guru" typeface="Raavi"/>
+        <a:font script="Cans" typeface="Euphemia"/>
+        <a:font script="Cher" typeface="Plantagenet Cherokee"/>
+        <a:font script="Yiii" typeface="Microsoft Yi Baiti"/>
+        <a:font script="Tibt" typeface="Microsoft Himalaya"/>
+        <a:font script="Thaa" typeface="MV Boli"/>
+        <a:font script="Deva" typeface="Mangal"/>
+        <a:font script="Telu" typeface="Gautami"/>
+        <a:font script="Taml" typeface="Latha"/>
+        <a:font script="Syrc" typeface="Estrangelo Edessa"/>
+        <a:font script="Orya" typeface="Kalinga"/>
+        <a:font script="Mlym" typeface="Kartika"/>
+        <a:font script="Laoo" typeface="DokChampa"/>
+        <a:font script="Sinh" typeface="Iskoola Pota"/>
+        <a:font script="Mong" typeface="Mongolian Baiti"/>
+        <a:font script="Viet" typeface="Times New Roman"/>
+        <a:font script="Uigh" typeface="Microsoft Uighur"/>
+        <a:font script="Geor" typeface="Sylfaen"/>
+      </a:majorFont>
+      <a:minorFont>
+        <a:latin typeface="Arial"/>
+        <a:ea typeface=""/>
+        <a:cs typeface=""/>
+        <a:font script="Jpan" typeface="ＭＳ Ｐゴシック"/>
+        <a:font script="Hang" typeface="맑은 고딕"/>
+        <a:font script="Hans" typeface="宋体"/>
+        <a:font script="Hant" typeface="新細明體"/>
+        <a:font script="Arab" typeface="Arial"/>
+        <a:font script="Hebr" typeface="Arial"/>
+        <a:font script="Thai" typeface="Cordia New"/>
+        <a:font script="Ethi" typeface="Nyala"/>
+        <a:font script="Beng" typeface="Vrinda"/>
+        <a:font script="Gujr" typeface="Shruti"/>
+        <a:font script="Khmr" typeface="DaunPenh"/>
+        <a:font script="Knda" typeface="Tunga"/>
+        <a:font script="Guru" typeface="Raavi"/>
+        <a:font script="Cans" typeface="Euphemia"/>
+        <a:font script="Cher" typeface="Plantagenet Cherokee"/>
+        <a:font script="Yiii" typeface="Microsoft Yi Baiti"/>
+        <a:font script="Tibt" typeface="Microsoft Himalaya"/>
+        <a:font script="Thaa" typeface="MV Boli"/>
+        <a:font script="Deva" typeface="Mangal"/>
+        <a:font script="Telu" typeface="Gautami"/>
+        <a:font script="Taml" typeface="Latha"/>
+        <a:font script="Syrc" typeface="Estrangelo Edessa"/>
+        <a:font script="Orya" typeface="Kalinga"/>
+        <a:font script="Mlym" typeface="Kartika"/>
+        <a:font script="Laoo" typeface="DokChampa"/>
+        <a:font script="Sinh" typeface="Iskoola Pota"/>
+        <a:font script="Mong" typeface="Mongolian Baiti"/>
+        <a:font script="Viet" typeface="Arial"/>
+        <a:font script="Uigh" typeface="Microsoft Uighur"/>
+        <a:font script="Geor" typeface="Sylfaen"/>
+      </a:minorFont>
+    </a:fontScheme>
+    <a:fmtScheme name="Office">
+      <a:fillStyleLst>
+        <a:solidFill>
+          <a:schemeClr val="phClr"/>
+        </a:solidFill>
+        <a:gradFill rotWithShape="1">
+          <a:gsLst>
+            <a:gs pos="0">
+              <a:schemeClr val="phClr">
+                <a:tint val="50000"/>
+                <a:satMod val="300000"/>
+              </a:schemeClr>
+            </a:gs>
+            <a:gs pos="35000">
+              <a:schemeClr val="phClr">
+                <a:tint val="37000"/>
+                <a:satMod val="300000"/>
+              </a:schemeClr>
+            </a:gs>
+            <a:gs pos="100000">
+              <a:schemeClr val="phClr">
+                <a:tint val="15000"/>
+                <a:satMod val="350000"/>
+              </a:schemeClr>
+            </a:gs>
+          </a:gsLst>
+          <a:lin ang="16200000" scaled="1"/>
+        </a:gradFill>
+        <a:gradFill rotWithShape="1">
+          <a:gsLst>
+            <a:gs pos="0">
+              <a:schemeClr val="phClr">
+                <a:tint val="100000"/>
+                <a:shade val="100000"/>
+                <a:satMod val="130000"/>
+              </a:schemeClr>
+            </a:gs>
+            <a:gs pos="100000">
+              <a:schemeClr val="phClr">
+                <a:tint val="50000"/>
+                <a:shade val="100000"/>
+                <a:satMod val="350000"/>
+              </a:schemeClr>
+            </a:gs>
+          </a:gsLst>
+          <a:lin ang="16200000" scaled="0"/>
+        </a:gradFill>
+      </a:fillStyleLst>
+      <a:lnStyleLst>
+        <a:ln w="9525" cap="flat" cmpd="sng" algn="ctr">
+          <a:solidFill>
+            <a:schemeClr val="phClr">
+              <a:shade val="95000"/>
+              <a:satMod val="105000"/>
+            </a:schemeClr>
+          </a:solidFill>
+          <a:prstDash val="solid"/>
+        </a:ln>
+        <a:ln w="25400" cap="flat" cmpd="sng" algn="ctr">
+          <a:solidFill>
+            <a:schemeClr val="phClr"/>
+          </a:solidFill>
+          <a:prstDash val="solid"/>
+        </a:ln>
+        <a:ln w="38100" cap="flat" cmpd="sng" algn="ctr">
+          <a:solidFill>
+            <a:schemeClr val="phClr"/>
+          </a:solidFill>
+          <a:prstDash val="solid"/>
+        </a:ln>
+      </a:lnStyleLst>
+      <a:effectStyleLst>
+        <a:effectStyle>
+          <a:effectLst>
+            <a:outerShdw blurRad="40000" dist="20000" dir="5400000" rotWithShape="0">
+              <a:srgbClr val="000000">
+                <a:alpha val="38000"/>
+              </a:srgbClr>
+            </a:outerShdw>
+          </a:effectLst>
+        </a:effectStyle>
+        <a:effectStyle>
+          <a:effectLst>
+            <a:outerShdw blurRad="40000" dist="23000" dir="5400000" rotWithShape="0">
+              <a:srgbClr val="000000">
+                <a:alpha val="35000"/>
+              </a:srgbClr>
+            </a:outerShdw>
+          </a:effectLst>
+        </a:effectStyle>
+        <a:effectStyle>
+          <a:effectLst>
+            <a:outerShdw blurRad="40000" dist="23000" dir="5400000" rotWithShape="0">
+              <a:srgbClr val="000000">
+                <a:alpha val="35000"/>
+              </a:srgbClr>
+            </a:outerShdw>
+          </a:effectLst>
+          <a:scene3d>
+            <a:camera prst="orthographicFront">
+              <a:rot lat="0" lon="0" rev="0"/>
+            </a:camera>
+            <a:lightRig rig="threePt" dir="t">
+              <a:rot lat="0" lon="0" rev="1200000"/>
+            </a:lightRig>
+          </a:scene3d>
+          <a:sp3d>
+            <a:bevelT w="63500" h="25400"/>
+          </a:sp3d>
+        </a:effectStyle>
+      </a:effectStyleLst>
+      <a:bgFillStyleLst>
+        <a:solidFill>
+          <a:schemeClr val="phClr"/>
+        </a:solidFill>
+        <a:gradFill rotWithShape="1">
+          <a:gsLst>
+            <a:gs pos="0">
+              <a:schemeClr val="phClr">
+                <a:tint val="40000"/>
+                <a:satMod val="350000"/>
+              </a:schemeClr>
+            </a:gs>
+            <a:gs pos="40000">
+              <a:schemeClr val="phClr">
+                <a:tint val="45000"/>
+                <a:shade val="99000"/>
+                <a:satMod val="350000"/>
+              </a:schemeClr>
+            </a:gs>
+            <a:gs pos="100000">
+              <a:schemeClr val="phClr">
+                <a:shade val="20000"/>
+                <a:satMod val="255000"/>
+              </a:schemeClr>
+            </a:gs>
+          </a:gsLst>
+          <a:path path="circle">
+            <a:fillToRect l="50000" t="-80000" r="50000" b="180000"/>
+          </a:path>
+        </a:gradFill>
+        <a:gradFill rotWithShape="1">
+          <a:gsLst>
+            <a:gs pos="0">
+              <a:schemeClr val="phClr">
+                <a:tint val="80000"/>
+                <a:satMod val="300000"/>
+              </a:schemeClr>
+            </a:gs>
+            <a:gs pos="100000">
+              <a:schemeClr val="phClr">
+                <a:shade val="30000"/>
+                <a:satMod val="200000"/>
+              </a:schemeClr>
+            </a:gs>
+          </a:gsLst>
+          <a:path path="circle">
+            <a:fillToRect l="50000" t="50000" r="50000" b="50000"/>
+          </a:path>
+        </a:gradFill>
+      </a:bgFillStyleLst>
+    </a:fmtScheme>
+  </a:themeElements>
+</a:theme>
+</file>
+
+<file path=ppt/theme/theme2.xml><?xml version="1.0" encoding="utf-8"?>
 <a:theme xmlns:a="http://schemas.openxmlformats.org/drawingml/2006/main" xmlns:r="http://schemas.openxmlformats.org/officeDocument/2006/relationships" name="Digital Crafts">
   <a:themeElements>
     <a:clrScheme name="Simple Light">
@@ -16089,283 +17049,4 @@
     </a:fmtScheme>
   </a:themeElements>
 </a:theme>
-</file>
-
-<file path=ppt/theme/theme2.xml><?xml version="1.0" encoding="utf-8"?>
-<a:theme xmlns:a="http://schemas.openxmlformats.org/drawingml/2006/main" xmlns:r="http://schemas.openxmlformats.org/officeDocument/2006/relationships">
-  <a:themeElements>
-    <a:clrScheme name="Default">
-      <a:dk1>
-        <a:srgbClr val="000000"/>
-      </a:dk1>
-      <a:lt1>
-        <a:srgbClr val="FFFFFF"/>
-      </a:lt1>
-      <a:dk2>
-        <a:srgbClr val="158158"/>
-      </a:dk2>
-      <a:lt2>
-        <a:srgbClr val="F3F3F3"/>
-      </a:lt2>
-      <a:accent1>
-        <a:srgbClr val="058DC7"/>
-      </a:accent1>
-      <a:accent2>
-        <a:srgbClr val="50B432"/>
-      </a:accent2>
-      <a:accent3>
-        <a:srgbClr val="ED561B"/>
-      </a:accent3>
-      <a:accent4>
-        <a:srgbClr val="EDEF00"/>
-      </a:accent4>
-      <a:accent5>
-        <a:srgbClr val="24CBE5"/>
-      </a:accent5>
-      <a:accent6>
-        <a:srgbClr val="64E572"/>
-      </a:accent6>
-      <a:hlink>
-        <a:srgbClr val="2200CC"/>
-      </a:hlink>
-      <a:folHlink>
-        <a:srgbClr val="551A8B"/>
-      </a:folHlink>
-    </a:clrScheme>
-    <a:fontScheme name="Office">
-      <a:majorFont>
-        <a:latin typeface="Arial"/>
-        <a:ea typeface=""/>
-        <a:cs typeface=""/>
-        <a:font script="Jpan" typeface="ＭＳ Ｐゴシック"/>
-        <a:font script="Hang" typeface="맑은 고딕"/>
-        <a:font script="Hans" typeface="宋体"/>
-        <a:font script="Hant" typeface="新細明體"/>
-        <a:font script="Arab" typeface="Times New Roman"/>
-        <a:font script="Hebr" typeface="Times New Roman"/>
-        <a:font script="Thai" typeface="Angsana New"/>
-        <a:font script="Ethi" typeface="Nyala"/>
-        <a:font script="Beng" typeface="Vrinda"/>
-        <a:font script="Gujr" typeface="Shruti"/>
-        <a:font script="Khmr" typeface="MoolBoran"/>
-        <a:font script="Knda" typeface="Tunga"/>
-        <a:font script="Guru" typeface="Raavi"/>
-        <a:font script="Cans" typeface="Euphemia"/>
-        <a:font script="Cher" typeface="Plantagenet Cherokee"/>
-        <a:font script="Yiii" typeface="Microsoft Yi Baiti"/>
-        <a:font script="Tibt" typeface="Microsoft Himalaya"/>
-        <a:font script="Thaa" typeface="MV Boli"/>
-        <a:font script="Deva" typeface="Mangal"/>
-        <a:font script="Telu" typeface="Gautami"/>
-        <a:font script="Taml" typeface="Latha"/>
-        <a:font script="Syrc" typeface="Estrangelo Edessa"/>
-        <a:font script="Orya" typeface="Kalinga"/>
-        <a:font script="Mlym" typeface="Kartika"/>
-        <a:font script="Laoo" typeface="DokChampa"/>
-        <a:font script="Sinh" typeface="Iskoola Pota"/>
-        <a:font script="Mong" typeface="Mongolian Baiti"/>
-        <a:font script="Viet" typeface="Times New Roman"/>
-        <a:font script="Uigh" typeface="Microsoft Uighur"/>
-        <a:font script="Geor" typeface="Sylfaen"/>
-      </a:majorFont>
-      <a:minorFont>
-        <a:latin typeface="Arial"/>
-        <a:ea typeface=""/>
-        <a:cs typeface=""/>
-        <a:font script="Jpan" typeface="ＭＳ Ｐゴシック"/>
-        <a:font script="Hang" typeface="맑은 고딕"/>
-        <a:font script="Hans" typeface="宋体"/>
-        <a:font script="Hant" typeface="新細明體"/>
-        <a:font script="Arab" typeface="Arial"/>
-        <a:font script="Hebr" typeface="Arial"/>
-        <a:font script="Thai" typeface="Cordia New"/>
-        <a:font script="Ethi" typeface="Nyala"/>
-        <a:font script="Beng" typeface="Vrinda"/>
-        <a:font script="Gujr" typeface="Shruti"/>
-        <a:font script="Khmr" typeface="DaunPenh"/>
-        <a:font script="Knda" typeface="Tunga"/>
-        <a:font script="Guru" typeface="Raavi"/>
-        <a:font script="Cans" typeface="Euphemia"/>
-        <a:font script="Cher" typeface="Plantagenet Cherokee"/>
-        <a:font script="Yiii" typeface="Microsoft Yi Baiti"/>
-        <a:font script="Tibt" typeface="Microsoft Himalaya"/>
-        <a:font script="Thaa" typeface="MV Boli"/>
-        <a:font script="Deva" typeface="Mangal"/>
-        <a:font script="Telu" typeface="Gautami"/>
-        <a:font script="Taml" typeface="Latha"/>
-        <a:font script="Syrc" typeface="Estrangelo Edessa"/>
-        <a:font script="Orya" typeface="Kalinga"/>
-        <a:font script="Mlym" typeface="Kartika"/>
-        <a:font script="Laoo" typeface="DokChampa"/>
-        <a:font script="Sinh" typeface="Iskoola Pota"/>
-        <a:font script="Mong" typeface="Mongolian Baiti"/>
-        <a:font script="Viet" typeface="Arial"/>
-        <a:font script="Uigh" typeface="Microsoft Uighur"/>
-        <a:font script="Geor" typeface="Sylfaen"/>
-      </a:minorFont>
-    </a:fontScheme>
-    <a:fmtScheme name="Office">
-      <a:fillStyleLst>
-        <a:solidFill>
-          <a:schemeClr val="phClr"/>
-        </a:solidFill>
-        <a:gradFill rotWithShape="1">
-          <a:gsLst>
-            <a:gs pos="0">
-              <a:schemeClr val="phClr">
-                <a:tint val="50000"/>
-                <a:satMod val="300000"/>
-              </a:schemeClr>
-            </a:gs>
-            <a:gs pos="35000">
-              <a:schemeClr val="phClr">
-                <a:tint val="37000"/>
-                <a:satMod val="300000"/>
-              </a:schemeClr>
-            </a:gs>
-            <a:gs pos="100000">
-              <a:schemeClr val="phClr">
-                <a:tint val="15000"/>
-                <a:satMod val="350000"/>
-              </a:schemeClr>
-            </a:gs>
-          </a:gsLst>
-          <a:lin ang="16200000" scaled="1"/>
-        </a:gradFill>
-        <a:gradFill rotWithShape="1">
-          <a:gsLst>
-            <a:gs pos="0">
-              <a:schemeClr val="phClr">
-                <a:tint val="100000"/>
-                <a:shade val="100000"/>
-                <a:satMod val="130000"/>
-              </a:schemeClr>
-            </a:gs>
-            <a:gs pos="100000">
-              <a:schemeClr val="phClr">
-                <a:tint val="50000"/>
-                <a:shade val="100000"/>
-                <a:satMod val="350000"/>
-              </a:schemeClr>
-            </a:gs>
-          </a:gsLst>
-          <a:lin ang="16200000" scaled="0"/>
-        </a:gradFill>
-      </a:fillStyleLst>
-      <a:lnStyleLst>
-        <a:ln w="9525" cap="flat" cmpd="sng" algn="ctr">
-          <a:solidFill>
-            <a:schemeClr val="phClr">
-              <a:shade val="95000"/>
-              <a:satMod val="105000"/>
-            </a:schemeClr>
-          </a:solidFill>
-          <a:prstDash val="solid"/>
-        </a:ln>
-        <a:ln w="25400" cap="flat" cmpd="sng" algn="ctr">
-          <a:solidFill>
-            <a:schemeClr val="phClr"/>
-          </a:solidFill>
-          <a:prstDash val="solid"/>
-        </a:ln>
-        <a:ln w="38100" cap="flat" cmpd="sng" algn="ctr">
-          <a:solidFill>
-            <a:schemeClr val="phClr"/>
-          </a:solidFill>
-          <a:prstDash val="solid"/>
-        </a:ln>
-      </a:lnStyleLst>
-      <a:effectStyleLst>
-        <a:effectStyle>
-          <a:effectLst>
-            <a:outerShdw blurRad="40000" dist="20000" dir="5400000" rotWithShape="0">
-              <a:srgbClr val="000000">
-                <a:alpha val="38000"/>
-              </a:srgbClr>
-            </a:outerShdw>
-          </a:effectLst>
-        </a:effectStyle>
-        <a:effectStyle>
-          <a:effectLst>
-            <a:outerShdw blurRad="40000" dist="23000" dir="5400000" rotWithShape="0">
-              <a:srgbClr val="000000">
-                <a:alpha val="35000"/>
-              </a:srgbClr>
-            </a:outerShdw>
-          </a:effectLst>
-        </a:effectStyle>
-        <a:effectStyle>
-          <a:effectLst>
-            <a:outerShdw blurRad="40000" dist="23000" dir="5400000" rotWithShape="0">
-              <a:srgbClr val="000000">
-                <a:alpha val="35000"/>
-              </a:srgbClr>
-            </a:outerShdw>
-          </a:effectLst>
-          <a:scene3d>
-            <a:camera prst="orthographicFront">
-              <a:rot lat="0" lon="0" rev="0"/>
-            </a:camera>
-            <a:lightRig rig="threePt" dir="t">
-              <a:rot lat="0" lon="0" rev="1200000"/>
-            </a:lightRig>
-          </a:scene3d>
-          <a:sp3d>
-            <a:bevelT w="63500" h="25400"/>
-          </a:sp3d>
-        </a:effectStyle>
-      </a:effectStyleLst>
-      <a:bgFillStyleLst>
-        <a:solidFill>
-          <a:schemeClr val="phClr"/>
-        </a:solidFill>
-        <a:gradFill rotWithShape="1">
-          <a:gsLst>
-            <a:gs pos="0">
-              <a:schemeClr val="phClr">
-                <a:tint val="40000"/>
-                <a:satMod val="350000"/>
-              </a:schemeClr>
-            </a:gs>
-            <a:gs pos="40000">
-              <a:schemeClr val="phClr">
-                <a:tint val="45000"/>
-                <a:shade val="99000"/>
-                <a:satMod val="350000"/>
-              </a:schemeClr>
-            </a:gs>
-            <a:gs pos="100000">
-              <a:schemeClr val="phClr">
-                <a:shade val="20000"/>
-                <a:satMod val="255000"/>
-              </a:schemeClr>
-            </a:gs>
-          </a:gsLst>
-          <a:path path="circle">
-            <a:fillToRect l="50000" t="-80000" r="50000" b="180000"/>
-          </a:path>
-        </a:gradFill>
-        <a:gradFill rotWithShape="1">
-          <a:gsLst>
-            <a:gs pos="0">
-              <a:schemeClr val="phClr">
-                <a:tint val="80000"/>
-                <a:satMod val="300000"/>
-              </a:schemeClr>
-            </a:gs>
-            <a:gs pos="100000">
-              <a:schemeClr val="phClr">
-                <a:shade val="30000"/>
-                <a:satMod val="200000"/>
-              </a:schemeClr>
-            </a:gs>
-          </a:gsLst>
-          <a:path path="circle">
-            <a:fillToRect l="50000" t="50000" r="50000" b="50000"/>
-          </a:path>
-        </a:gradFill>
-      </a:bgFillStyleLst>
-    </a:fmtScheme>
-  </a:themeElements>
-</a:theme>
 </file>
</xml_diff>